<commit_message>
[CONC] Working on presentation/Work enhancements
</commit_message>
<xml_diff>
--- a/presentation/banner-1.0.0.pptx
+++ b/presentation/banner-1.0.0.pptx
@@ -367,7 +367,7 @@
     </p:spTree>
     <p:extLst>
       <p:ext uri="{BB962C8B-B14F-4D97-AF65-F5344CB8AC3E}">
-        <p14:creationId xmlns="" xmlns:p14="http://schemas.microsoft.com/office/powerpoint/2010/main" val="1072203350"/>
+        <p14:creationId xmlns:p14="http://schemas.microsoft.com/office/powerpoint/2010/main" xmlns="" val="1072203350"/>
       </p:ext>
     </p:extLst>
   </p:cSld>
@@ -579,7 +579,7 @@
     </p:spTree>
     <p:extLst>
       <p:ext uri="{BB962C8B-B14F-4D97-AF65-F5344CB8AC3E}">
-        <p14:creationId xmlns="" xmlns:p14="http://schemas.microsoft.com/office/powerpoint/2010/main" val="2372154417"/>
+        <p14:creationId xmlns:p14="http://schemas.microsoft.com/office/powerpoint/2010/main" xmlns="" val="2372154417"/>
       </p:ext>
     </p:extLst>
   </p:cSld>
@@ -775,7 +775,7 @@
     </p:spTree>
     <p:extLst>
       <p:ext uri="{BB962C8B-B14F-4D97-AF65-F5344CB8AC3E}">
-        <p14:creationId xmlns="" xmlns:p14="http://schemas.microsoft.com/office/powerpoint/2010/main" val="190023816"/>
+        <p14:creationId xmlns:p14="http://schemas.microsoft.com/office/powerpoint/2010/main" xmlns="" val="190023816"/>
       </p:ext>
     </p:extLst>
   </p:cSld>
@@ -981,7 +981,7 @@
     </p:spTree>
     <p:extLst>
       <p:ext uri="{BB962C8B-B14F-4D97-AF65-F5344CB8AC3E}">
-        <p14:creationId xmlns="" xmlns:p14="http://schemas.microsoft.com/office/powerpoint/2010/main" val="1479007073"/>
+        <p14:creationId xmlns:p14="http://schemas.microsoft.com/office/powerpoint/2010/main" xmlns="" val="1479007073"/>
       </p:ext>
     </p:extLst>
   </p:cSld>
@@ -1177,7 +1177,7 @@
     </p:spTree>
     <p:extLst>
       <p:ext uri="{BB962C8B-B14F-4D97-AF65-F5344CB8AC3E}">
-        <p14:creationId xmlns="" xmlns:p14="http://schemas.microsoft.com/office/powerpoint/2010/main" val="61954085"/>
+        <p14:creationId xmlns:p14="http://schemas.microsoft.com/office/powerpoint/2010/main" xmlns="" val="61954085"/>
       </p:ext>
     </p:extLst>
   </p:cSld>
@@ -1395,7 +1395,7 @@
     </p:spTree>
     <p:extLst>
       <p:ext uri="{BB962C8B-B14F-4D97-AF65-F5344CB8AC3E}">
-        <p14:creationId xmlns="" xmlns:p14="http://schemas.microsoft.com/office/powerpoint/2010/main" val="3179605967"/>
+        <p14:creationId xmlns:p14="http://schemas.microsoft.com/office/powerpoint/2010/main" xmlns="" val="3179605967"/>
       </p:ext>
     </p:extLst>
   </p:cSld>
@@ -1709,7 +1709,7 @@
     </p:spTree>
     <p:extLst>
       <p:ext uri="{BB962C8B-B14F-4D97-AF65-F5344CB8AC3E}">
-        <p14:creationId xmlns="" xmlns:p14="http://schemas.microsoft.com/office/powerpoint/2010/main" val="4047622757"/>
+        <p14:creationId xmlns:p14="http://schemas.microsoft.com/office/powerpoint/2010/main" xmlns="" val="4047622757"/>
       </p:ext>
     </p:extLst>
   </p:cSld>
@@ -2162,7 +2162,7 @@
     </p:spTree>
     <p:extLst>
       <p:ext uri="{BB962C8B-B14F-4D97-AF65-F5344CB8AC3E}">
-        <p14:creationId xmlns="" xmlns:p14="http://schemas.microsoft.com/office/powerpoint/2010/main" val="3934125589"/>
+        <p14:creationId xmlns:p14="http://schemas.microsoft.com/office/powerpoint/2010/main" xmlns="" val="3934125589"/>
       </p:ext>
     </p:extLst>
   </p:cSld>
@@ -2306,7 +2306,7 @@
     </p:spTree>
     <p:extLst>
       <p:ext uri="{BB962C8B-B14F-4D97-AF65-F5344CB8AC3E}">
-        <p14:creationId xmlns="" xmlns:p14="http://schemas.microsoft.com/office/powerpoint/2010/main" val="202173028"/>
+        <p14:creationId xmlns:p14="http://schemas.microsoft.com/office/powerpoint/2010/main" xmlns="" val="202173028"/>
       </p:ext>
     </p:extLst>
   </p:cSld>
@@ -2427,7 +2427,7 @@
     </p:spTree>
     <p:extLst>
       <p:ext uri="{BB962C8B-B14F-4D97-AF65-F5344CB8AC3E}">
-        <p14:creationId xmlns="" xmlns:p14="http://schemas.microsoft.com/office/powerpoint/2010/main" val="807254810"/>
+        <p14:creationId xmlns:p14="http://schemas.microsoft.com/office/powerpoint/2010/main" xmlns="" val="807254810"/>
       </p:ext>
     </p:extLst>
   </p:cSld>
@@ -2730,7 +2730,7 @@
     </p:spTree>
     <p:extLst>
       <p:ext uri="{BB962C8B-B14F-4D97-AF65-F5344CB8AC3E}">
-        <p14:creationId xmlns="" xmlns:p14="http://schemas.microsoft.com/office/powerpoint/2010/main" val="950236474"/>
+        <p14:creationId xmlns:p14="http://schemas.microsoft.com/office/powerpoint/2010/main" xmlns="" val="950236474"/>
       </p:ext>
     </p:extLst>
   </p:cSld>
@@ -3010,7 +3010,7 @@
     </p:spTree>
     <p:extLst>
       <p:ext uri="{BB962C8B-B14F-4D97-AF65-F5344CB8AC3E}">
-        <p14:creationId xmlns="" xmlns:p14="http://schemas.microsoft.com/office/powerpoint/2010/main" val="3039278202"/>
+        <p14:creationId xmlns:p14="http://schemas.microsoft.com/office/powerpoint/2010/main" xmlns="" val="3039278202"/>
       </p:ext>
     </p:extLst>
   </p:cSld>
@@ -3085,14 +3085,14 @@
           </a:ln>
           <a:extLst>
             <a:ext uri="{909E8E84-426E-40DD-AFC4-6F175D3DCCD1}">
-              <a14:hiddenFill xmlns="" xmlns:a14="http://schemas.microsoft.com/office/drawing/2010/main">
+              <a14:hiddenFill xmlns:a14="http://schemas.microsoft.com/office/drawing/2010/main" xmlns="">
                 <a:solidFill>
                   <a:srgbClr val="FFFFFF"/>
                 </a:solidFill>
               </a14:hiddenFill>
             </a:ext>
             <a:ext uri="{91240B29-F687-4F45-9708-019B960494DF}">
-              <a14:hiddenLine xmlns="" xmlns:a14="http://schemas.microsoft.com/office/drawing/2010/main" w="9525">
+              <a14:hiddenLine xmlns:a14="http://schemas.microsoft.com/office/drawing/2010/main" xmlns="" w="9525">
                 <a:solidFill>
                   <a:srgbClr val="000000"/>
                 </a:solidFill>
@@ -3143,14 +3143,14 @@
           </a:ln>
           <a:extLst>
             <a:ext uri="{909E8E84-426E-40DD-AFC4-6F175D3DCCD1}">
-              <a14:hiddenFill xmlns="" xmlns:a14="http://schemas.microsoft.com/office/drawing/2010/main">
+              <a14:hiddenFill xmlns:a14="http://schemas.microsoft.com/office/drawing/2010/main" xmlns="">
                 <a:solidFill>
                   <a:srgbClr val="FFFFFF"/>
                 </a:solidFill>
               </a14:hiddenFill>
             </a:ext>
             <a:ext uri="{91240B29-F687-4F45-9708-019B960494DF}">
-              <a14:hiddenLine xmlns="" xmlns:a14="http://schemas.microsoft.com/office/drawing/2010/main" w="9525">
+              <a14:hiddenLine xmlns:a14="http://schemas.microsoft.com/office/drawing/2010/main" xmlns="" w="9525">
                 <a:solidFill>
                   <a:srgbClr val="000000"/>
                 </a:solidFill>
@@ -3782,227 +3782,6 @@
       </p:grpSpPr>
       <p:sp>
         <p:nvSpPr>
-          <p:cNvPr id="125" name="Retângulo 124"/>
-          <p:cNvSpPr/>
-          <p:nvPr/>
-        </p:nvSpPr>
-        <p:spPr>
-          <a:xfrm>
-            <a:off x="17916537" y="10983209"/>
-            <a:ext cx="13479176" cy="2554545"/>
-          </a:xfrm>
-          <a:prstGeom prst="rect">
-            <a:avLst/>
-          </a:prstGeom>
-          <a:solidFill>
-            <a:schemeClr val="bg1">
-              <a:alpha val="42000"/>
-            </a:schemeClr>
-          </a:solidFill>
-          <a:ln w="9525">
-            <a:solidFill>
-              <a:schemeClr val="tx1"/>
-            </a:solidFill>
-          </a:ln>
-        </p:spPr>
-        <p:txBody>
-          <a:bodyPr wrap="square">
-            <a:spAutoFit/>
-          </a:bodyPr>
-          <a:lstStyle/>
-          <a:p>
-            <a:pPr marL="514350" indent="-514350" algn="just"/>
-            <a:r>
-              <a:rPr lang="pt-BR" sz="3200" b="1" dirty="0" smtClean="0">
-                <a:latin typeface="Arial" charset="0"/>
-              </a:rPr>
-              <a:t>2. Reconhecimento</a:t>
-            </a:r>
-          </a:p>
-          <a:p>
-            <a:pPr marL="514350" indent="-514350" algn="just"/>
-            <a:r>
-              <a:rPr lang="pt-BR" sz="3200" dirty="0" smtClean="0">
-                <a:latin typeface="Arial" charset="0"/>
-              </a:rPr>
-              <a:t>		O reconhecimento dos caracteres, é feito através de busca por </a:t>
-            </a:r>
-            <a:r>
-              <a:rPr lang="pt-BR" sz="3200" i="1" dirty="0" smtClean="0">
-                <a:latin typeface="Arial" charset="0"/>
-              </a:rPr>
-              <a:t>template, </a:t>
-            </a:r>
-            <a:r>
-              <a:rPr lang="pt-BR" sz="3200" dirty="0" smtClean="0">
-                <a:latin typeface="Arial" charset="0"/>
-              </a:rPr>
-              <a:t>utilizando uma base de imagens </a:t>
-            </a:r>
-            <a:r>
-              <a:rPr lang="pt-BR" sz="3200" i="1" dirty="0" smtClean="0">
-                <a:latin typeface="Arial" charset="0"/>
-              </a:rPr>
-              <a:t>(templates),</a:t>
-            </a:r>
-            <a:r>
-              <a:rPr lang="pt-BR" sz="3200" dirty="0" smtClean="0">
-                <a:latin typeface="Arial" charset="0"/>
-              </a:rPr>
-              <a:t> catalogada. Em seguida e realizado a validação dos resultados obtidos pela busca por </a:t>
-            </a:r>
-            <a:r>
-              <a:rPr lang="pt-BR" sz="3200" i="1" dirty="0" smtClean="0">
-                <a:latin typeface="Arial" charset="0"/>
-              </a:rPr>
-              <a:t>template, </a:t>
-            </a:r>
-            <a:r>
-              <a:rPr lang="pt-BR" sz="3200" dirty="0" smtClean="0">
-                <a:latin typeface="Arial" charset="0"/>
-              </a:rPr>
-              <a:t>com base em algumas heurísticas.</a:t>
-            </a:r>
-            <a:endParaRPr lang="pt-BR" sz="3200" dirty="0"/>
-          </a:p>
-        </p:txBody>
-      </p:sp>
-      <p:sp>
-        <p:nvSpPr>
-          <p:cNvPr id="121" name="Retângulo 120"/>
-          <p:cNvSpPr/>
-          <p:nvPr/>
-        </p:nvSpPr>
-        <p:spPr bwMode="auto">
-          <a:xfrm>
-            <a:off x="17930217" y="13681770"/>
-            <a:ext cx="13465495" cy="8568952"/>
-          </a:xfrm>
-          <a:prstGeom prst="rect">
-            <a:avLst/>
-          </a:prstGeom>
-          <a:solidFill>
-            <a:schemeClr val="bg1">
-              <a:alpha val="0"/>
-            </a:schemeClr>
-          </a:solidFill>
-          <a:ln w="9525" cap="flat" cmpd="sng" algn="ctr">
-            <a:solidFill>
-              <a:schemeClr val="tx1"/>
-            </a:solidFill>
-            <a:prstDash val="solid"/>
-            <a:round/>
-            <a:headEnd type="none" w="med" len="med"/>
-            <a:tailEnd type="none" w="med" len="med"/>
-          </a:ln>
-          <a:effectLst/>
-        </p:spPr>
-        <p:txBody>
-          <a:bodyPr vert="horz" wrap="square" lIns="91440" tIns="45720" rIns="91440" bIns="45720" numCol="1" rtlCol="0" anchor="t" anchorCtr="0" compatLnSpc="1">
-            <a:prstTxWarp prst="textNoShape">
-              <a:avLst/>
-            </a:prstTxWarp>
-          </a:bodyPr>
-          <a:lstStyle/>
-          <a:p>
-            <a:pPr marL="0" marR="0" indent="0" algn="l" defTabSz="863600" rtl="0" eaLnBrk="0" fontAlgn="base" latinLnBrk="0" hangingPunct="0">
-              <a:lnSpc>
-                <a:spcPct val="100000"/>
-              </a:lnSpc>
-              <a:spcBef>
-                <a:spcPct val="0"/>
-              </a:spcBef>
-              <a:spcAft>
-                <a:spcPct val="0"/>
-              </a:spcAft>
-              <a:buClrTx/>
-              <a:buSzTx/>
-              <a:buFontTx/>
-              <a:buNone/>
-              <a:tabLst/>
-            </a:pPr>
-            <a:endParaRPr kumimoji="0" lang="pt-BR" sz="2300" b="0" i="0" u="none" strike="noStrike" cap="none" normalizeH="0" baseline="0" smtClean="0">
-              <a:ln>
-                <a:noFill/>
-              </a:ln>
-              <a:solidFill>
-                <a:schemeClr val="tx1"/>
-              </a:solidFill>
-              <a:effectLst/>
-              <a:latin typeface="Times New Roman" pitchFamily="18" charset="0"/>
-            </a:endParaRPr>
-          </a:p>
-        </p:txBody>
-      </p:sp>
-      <p:sp>
-        <p:nvSpPr>
-          <p:cNvPr id="112" name="Retângulo 111"/>
-          <p:cNvSpPr/>
-          <p:nvPr/>
-        </p:nvSpPr>
-        <p:spPr bwMode="auto">
-          <a:xfrm>
-            <a:off x="1296369" y="22220786"/>
-            <a:ext cx="16273808" cy="12712270"/>
-          </a:xfrm>
-          <a:prstGeom prst="rect">
-            <a:avLst/>
-          </a:prstGeom>
-          <a:solidFill>
-            <a:schemeClr val="bg1">
-              <a:alpha val="0"/>
-            </a:schemeClr>
-          </a:solidFill>
-          <a:ln w="9525" cap="flat" cmpd="sng" algn="ctr">
-            <a:solidFill>
-              <a:schemeClr val="tx1"/>
-            </a:solidFill>
-            <a:prstDash val="solid"/>
-            <a:round/>
-            <a:headEnd type="none" w="med" len="med"/>
-            <a:tailEnd type="none" w="med" len="med"/>
-          </a:ln>
-          <a:effectLst/>
-        </p:spPr>
-        <p:txBody>
-          <a:bodyPr vert="horz" wrap="square" lIns="91440" tIns="45720" rIns="91440" bIns="45720" numCol="1" rtlCol="0" anchor="t" anchorCtr="0" compatLnSpc="1">
-            <a:prstTxWarp prst="textNoShape">
-              <a:avLst/>
-            </a:prstTxWarp>
-          </a:bodyPr>
-          <a:lstStyle/>
-          <a:p>
-            <a:pPr marL="0" marR="0" indent="0" algn="l" defTabSz="863600" rtl="0" eaLnBrk="0" fontAlgn="base" latinLnBrk="0" hangingPunct="0">
-              <a:lnSpc>
-                <a:spcPct val="100000"/>
-              </a:lnSpc>
-              <a:spcBef>
-                <a:spcPct val="0"/>
-              </a:spcBef>
-              <a:spcAft>
-                <a:spcPct val="0"/>
-              </a:spcAft>
-              <a:buClrTx/>
-              <a:buSzTx/>
-              <a:buFontTx/>
-              <a:buNone/>
-              <a:tabLst/>
-            </a:pPr>
-            <a:endParaRPr kumimoji="0" lang="pt-BR" sz="2300" b="0" i="0" u="none" strike="noStrike" cap="none" normalizeH="0" baseline="0" smtClean="0">
-              <a:ln>
-                <a:noFill/>
-              </a:ln>
-              <a:solidFill>
-                <a:schemeClr val="tx1"/>
-              </a:solidFill>
-              <a:effectLst/>
-              <a:latin typeface="Times New Roman" pitchFamily="18" charset="0"/>
-            </a:endParaRPr>
-          </a:p>
-        </p:txBody>
-      </p:sp>
-      <p:sp>
-        <p:nvSpPr>
           <p:cNvPr id="2050" name="Text Box 28"/>
           <p:cNvSpPr txBox="1">
             <a:spLocks noChangeArrowheads="1"/>
@@ -4012,7 +3791,7 @@
         <p:spPr bwMode="auto">
           <a:xfrm>
             <a:off x="1414359" y="2214452"/>
-            <a:ext cx="29789646" cy="2857243"/>
+            <a:ext cx="29789646" cy="2303245"/>
           </a:xfrm>
           <a:prstGeom prst="rect">
             <a:avLst/>
@@ -4023,14 +3802,14 @@
           </a:ln>
           <a:extLst>
             <a:ext uri="{909E8E84-426E-40DD-AFC4-6F175D3DCCD1}">
-              <a14:hiddenFill xmlns="" xmlns:a14="http://schemas.microsoft.com/office/drawing/2010/main">
+              <a14:hiddenFill xmlns:a14="http://schemas.microsoft.com/office/drawing/2010/main" xmlns="">
                 <a:solidFill>
                   <a:srgbClr val="FFFFFF"/>
                 </a:solidFill>
               </a14:hiddenFill>
             </a:ext>
             <a:ext uri="{91240B29-F687-4F45-9708-019B960494DF}">
-              <a14:hiddenLine xmlns="" xmlns:a14="http://schemas.microsoft.com/office/drawing/2010/main" w="9525">
+              <a14:hiddenLine xmlns:a14="http://schemas.microsoft.com/office/drawing/2010/main" xmlns="" w="9525">
                 <a:solidFill>
                   <a:srgbClr val="000000"/>
                 </a:solidFill>
@@ -4146,12 +3925,21 @@
           <a:p>
             <a:pPr algn="ctr"/>
             <a:r>
-              <a:rPr lang="pt-BR" sz="6000" b="1" dirty="0">
+              <a:rPr lang="pt-BR" sz="7200" b="1" dirty="0" smtClean="0">
                 <a:latin typeface="Arial" charset="0"/>
               </a:rPr>
-              <a:t>LOCALIZAÇÃO E RECONHECIMENTO DE PLACAS DE LICENCIAMENTO VEÍCULAR UTILIZANDO OPERADORES MORFOLÓGICOS E BUSCA POR TEMPLATE</a:t>
-            </a:r>
-            <a:endParaRPr lang="en-GB" sz="6000" b="1" dirty="0">
+              <a:t>UMA PROPOSTA PARA GARANTIA DA QUALIDADE </a:t>
+            </a:r>
+          </a:p>
+          <a:p>
+            <a:pPr algn="ctr"/>
+            <a:r>
+              <a:rPr lang="pt-BR" sz="7200" b="1" dirty="0" smtClean="0">
+                <a:latin typeface="Arial" charset="0"/>
+              </a:rPr>
+              <a:t>ALINHADA COM O CMMI</a:t>
+            </a:r>
+            <a:endParaRPr lang="en-GB" sz="7200" b="1" dirty="0">
               <a:latin typeface="Arial" charset="0"/>
             </a:endParaRPr>
           </a:p>
@@ -4167,14 +3955,14 @@
         </p:nvSpPr>
         <p:spPr bwMode="auto">
           <a:xfrm>
-            <a:off x="1271483" y="8429558"/>
-            <a:ext cx="30124230" cy="2334023"/>
+            <a:off x="1800425" y="8672125"/>
+            <a:ext cx="28803200" cy="5334844"/>
           </a:xfrm>
           <a:prstGeom prst="rect">
             <a:avLst/>
           </a:prstGeom>
           <a:noFill/>
-          <a:ln w="31750">
+          <a:ln w="44450">
             <a:solidFill>
               <a:schemeClr val="tx1"/>
             </a:solidFill>
@@ -4287,57 +4075,92 @@
             </a:lvl9pPr>
           </a:lstStyle>
           <a:p>
-            <a:pPr algn="ctr"/>
+            <a:pPr algn="ctr">
+              <a:spcAft>
+                <a:spcPts val="4200"/>
+              </a:spcAft>
+            </a:pPr>
             <a:r>
               <a:rPr lang="pt-BR" sz="5000" b="1" dirty="0" smtClean="0">
                 <a:latin typeface="Arial" charset="0"/>
               </a:rPr>
               <a:t>Introdução</a:t>
             </a:r>
-            <a:endParaRPr lang="pt-BR" sz="3600" b="1" dirty="0">
+            <a:endParaRPr lang="pt-BR" sz="3600" b="1" dirty="0" smtClean="0">
               <a:latin typeface="Arial" charset="0"/>
             </a:endParaRPr>
           </a:p>
           <a:p>
-            <a:pPr algn="just">
-              <a:buFont typeface="Wingdings" pitchFamily="2" charset="2"/>
-              <a:buNone/>
-            </a:pPr>
+            <a:pPr algn="just"/>
             <a:r>
               <a:rPr lang="pt-BR" sz="3200" dirty="0" smtClean="0">
-                <a:latin typeface="Arial" charset="0"/>
-              </a:rPr>
-              <a:t>	O </a:t>
-            </a:r>
-            <a:r>
-              <a:rPr lang="pt-BR" sz="3200" dirty="0">
-                <a:latin typeface="Arial" charset="0"/>
-              </a:rPr>
-              <a:t>reconhecimento de placas de licenciamento (LPR, </a:t>
-            </a:r>
-            <a:r>
-              <a:rPr lang="pt-BR" sz="3200" i="1" dirty="0">
-                <a:latin typeface="Arial" charset="0"/>
-              </a:rPr>
-              <a:t>License Plate Recognition</a:t>
-            </a:r>
-            <a:r>
-              <a:rPr lang="pt-BR" sz="3200" dirty="0">
-                <a:latin typeface="Arial" charset="0"/>
-              </a:rPr>
-              <a:t>) em imagens e vídeo é um problema importante em visão computacional que está presente em muitas </a:t>
+                <a:latin typeface="Arial" pitchFamily="34" charset="0"/>
+                <a:cs typeface="Arial" pitchFamily="34" charset="0"/>
+              </a:rPr>
+              <a:t>	</a:t>
             </a:r>
             <a:r>
               <a:rPr lang="pt-BR" sz="3200" dirty="0" smtClean="0">
-                <a:latin typeface="Arial" charset="0"/>
-              </a:rPr>
-              <a:t>aplicações.  Contudo, não é fácil projetar um método geral, pois o LPR pode ser composto de 3 subproblemas como: (1) Localização da placa do veículo, (2) Segmentação dos caracteres e (3) Reconhecimento dos caracteres. </a:t>
-            </a:r>
-            <a:endParaRPr lang="pt-BR" sz="3200" dirty="0">
-              <a:solidFill>
-                <a:srgbClr val="C00000"/>
-              </a:solidFill>
-              <a:latin typeface="Arial" charset="0"/>
+                <a:latin typeface="Arial" pitchFamily="34" charset="0"/>
+                <a:cs typeface="Arial" pitchFamily="34" charset="0"/>
+              </a:rPr>
+              <a:t>Dentro de um cenário de grande competitividade, e cada vez mais acirrada, as organizações buscam diferenciais para os seus produtos ou </a:t>
+            </a:r>
+            <a:r>
+              <a:rPr lang="pt-BR" sz="3200" dirty="0" smtClean="0">
+                <a:latin typeface="Arial" pitchFamily="34" charset="0"/>
+                <a:cs typeface="Arial" pitchFamily="34" charset="0"/>
+              </a:rPr>
+              <a:t>serviços. </a:t>
+            </a:r>
+            <a:r>
+              <a:rPr lang="pt-BR" sz="3200" dirty="0" smtClean="0">
+                <a:latin typeface="Arial" pitchFamily="34" charset="0"/>
+                <a:cs typeface="Arial" pitchFamily="34" charset="0"/>
+              </a:rPr>
+              <a:t>Obter um processo de qualidade que promove uma cultura organizacional de garantia e controle da qualidade dos seus produtos torna-se essencial</a:t>
+            </a:r>
+            <a:r>
+              <a:rPr lang="pt-BR" sz="3200" dirty="0" smtClean="0">
+                <a:latin typeface="Arial" pitchFamily="34" charset="0"/>
+                <a:cs typeface="Arial" pitchFamily="34" charset="0"/>
+              </a:rPr>
+              <a:t>. </a:t>
+            </a:r>
+            <a:r>
+              <a:rPr lang="pt-BR" sz="3200" dirty="0" smtClean="0">
+                <a:latin typeface="Arial" pitchFamily="34" charset="0"/>
+                <a:cs typeface="Arial" pitchFamily="34" charset="0"/>
+              </a:rPr>
+              <a:t>Empresas com esse tipo de certificado podem usufruir de um processo seguro, eficaz e controlado, capaz de disseminar uma cultura organizacional para gestão racional do desenvolvimento de seus produtos de software, além explorarem como apelo comercial</a:t>
+            </a:r>
+            <a:r>
+              <a:rPr lang="pt-BR" sz="3200" dirty="0" smtClean="0">
+                <a:latin typeface="Arial" pitchFamily="34" charset="0"/>
+                <a:cs typeface="Arial" pitchFamily="34" charset="0"/>
+              </a:rPr>
+              <a:t>.</a:t>
+            </a:r>
+          </a:p>
+          <a:p>
+            <a:pPr algn="just"/>
+            <a:r>
+              <a:rPr lang="pt-BR" sz="3200" dirty="0" smtClean="0">
+                <a:latin typeface="Arial" pitchFamily="34" charset="0"/>
+                <a:cs typeface="Arial" pitchFamily="34" charset="0"/>
+              </a:rPr>
+              <a:t>	A qualidade de software é um processo sistemático que focaliza todas as etapas e artefatos produzidos com o objetivo de garantir conformidade de processos e produtos prevenindo e eliminando defeitos (BARTIÉ, 2002). De acordo com BARTIÉ é impossível obter um software de qualidade com processos de desenvolvimento frágeis e deficientes. Vemos então que qualidade de software está intrinsecamente ligada a qualidade dos processos de produção deste produto. Podemos estabelecer então duas dimensões fundamentais da qualidade do software: qualidade de processo e qualidade do </a:t>
+            </a:r>
+            <a:r>
+              <a:rPr lang="pt-BR" sz="3200" dirty="0" smtClean="0">
+                <a:latin typeface="Arial" pitchFamily="34" charset="0"/>
+                <a:cs typeface="Arial" pitchFamily="34" charset="0"/>
+              </a:rPr>
+              <a:t>produto.</a:t>
+            </a:r>
+            <a:endParaRPr lang="pt-BR" sz="3200" dirty="0" smtClean="0">
+              <a:latin typeface="Arial" pitchFamily="34" charset="0"/>
+              <a:cs typeface="Arial" pitchFamily="34" charset="0"/>
             </a:endParaRPr>
           </a:p>
         </p:txBody>
@@ -4364,14 +4187,14 @@
           </a:ln>
           <a:extLst>
             <a:ext uri="{909E8E84-426E-40DD-AFC4-6F175D3DCCD1}">
-              <a14:hiddenFill xmlns="" xmlns:a14="http://schemas.microsoft.com/office/drawing/2010/main">
+              <a14:hiddenFill xmlns:a14="http://schemas.microsoft.com/office/drawing/2010/main" xmlns="">
                 <a:solidFill>
                   <a:srgbClr val="FFFFFF"/>
                 </a:solidFill>
               </a14:hiddenFill>
             </a:ext>
             <a:ext uri="{91240B29-F687-4F45-9708-019B960494DF}">
-              <a14:hiddenLine xmlns="" xmlns:a14="http://schemas.microsoft.com/office/drawing/2010/main" w="9525">
+              <a14:hiddenLine xmlns:a14="http://schemas.microsoft.com/office/drawing/2010/main" xmlns="" w="9525">
                 <a:solidFill>
                   <a:srgbClr val="000000"/>
                 </a:solidFill>
@@ -4415,14 +4238,14 @@
           </a:ln>
           <a:extLst>
             <a:ext uri="{909E8E84-426E-40DD-AFC4-6F175D3DCCD1}">
-              <a14:hiddenFill xmlns="" xmlns:a14="http://schemas.microsoft.com/office/drawing/2010/main">
+              <a14:hiddenFill xmlns:a14="http://schemas.microsoft.com/office/drawing/2010/main" xmlns="">
                 <a:solidFill>
                   <a:srgbClr val="FFFFFF"/>
                 </a:solidFill>
               </a14:hiddenFill>
             </a:ext>
             <a:ext uri="{91240B29-F687-4F45-9708-019B960494DF}">
-              <a14:hiddenLine xmlns="" xmlns:a14="http://schemas.microsoft.com/office/drawing/2010/main" w="9525">
+              <a14:hiddenLine xmlns:a14="http://schemas.microsoft.com/office/drawing/2010/main" xmlns="" w="9525">
                 <a:solidFill>
                   <a:srgbClr val="000000"/>
                 </a:solidFill>
@@ -4454,8 +4277,8 @@
         </p:nvSpPr>
         <p:spPr bwMode="auto">
           <a:xfrm>
-            <a:off x="7488238" y="5000534"/>
-            <a:ext cx="19083337" cy="2889250"/>
+            <a:off x="7366070" y="4642292"/>
+            <a:ext cx="19083337" cy="2918798"/>
           </a:xfrm>
           <a:prstGeom prst="rect">
             <a:avLst/>
@@ -4466,14 +4289,14 @@
           </a:ln>
           <a:extLst>
             <a:ext uri="{909E8E84-426E-40DD-AFC4-6F175D3DCCD1}">
-              <a14:hiddenFill xmlns="" xmlns:a14="http://schemas.microsoft.com/office/drawing/2010/main">
+              <a14:hiddenFill xmlns:a14="http://schemas.microsoft.com/office/drawing/2010/main" xmlns="">
                 <a:solidFill>
                   <a:srgbClr val="FFFFFF"/>
                 </a:solidFill>
               </a14:hiddenFill>
             </a:ext>
             <a:ext uri="{91240B29-F687-4F45-9708-019B960494DF}">
-              <a14:hiddenLine xmlns="" xmlns:a14="http://schemas.microsoft.com/office/drawing/2010/main" w="9525">
+              <a14:hiddenLine xmlns:a14="http://schemas.microsoft.com/office/drawing/2010/main" xmlns="" w="9525">
                 <a:solidFill>
                   <a:srgbClr val="000000"/>
                 </a:solidFill>
@@ -4592,8 +4415,17 @@
               <a:rPr lang="pt-BR" sz="5000" b="1" dirty="0">
                 <a:latin typeface="Arial" charset="0"/>
               </a:rPr>
-              <a:t>Danilo de Sousa Abreu e Ricardo Germano da Graça Souza</a:t>
-            </a:r>
+              <a:t>Danilo de Sousa </a:t>
+            </a:r>
+            <a:r>
+              <a:rPr lang="pt-BR" sz="5000" b="1" dirty="0" smtClean="0">
+                <a:latin typeface="Arial" charset="0"/>
+              </a:rPr>
+              <a:t>Abreu</a:t>
+            </a:r>
+            <a:endParaRPr lang="pt-BR" sz="5000" b="1" dirty="0">
+              <a:latin typeface="Arial" charset="0"/>
+            </a:endParaRPr>
           </a:p>
           <a:p>
             <a:pPr algn="ctr"/>
@@ -4610,11 +4442,26 @@
               <a:t> </a:t>
             </a:r>
             <a:r>
-              <a:rPr lang="pt-BR" sz="4000" b="1" dirty="0">
+              <a:rPr lang="pt-BR" sz="4000" b="1" dirty="0" smtClean="0">
                 <a:latin typeface="Arial" charset="0"/>
               </a:rPr>
-              <a:t>Prof. Wonder Alexandre Luz Alves </a:t>
-            </a:r>
+              <a:t>Professor Marcos Antonio Ribeiro</a:t>
+            </a:r>
+            <a:endParaRPr lang="pt-BR" sz="4000" b="1" dirty="0">
+              <a:latin typeface="Arial" charset="0"/>
+            </a:endParaRPr>
+          </a:p>
+          <a:p>
+            <a:pPr algn="ctr"/>
+            <a:r>
+              <a:rPr lang="pt-BR" sz="3200" dirty="0" smtClean="0">
+                <a:latin typeface="Arial" charset="0"/>
+              </a:rPr>
+              <a:t>Centro de Pós-graduação</a:t>
+            </a:r>
+            <a:endParaRPr lang="pt-BR" sz="3200" dirty="0">
+              <a:latin typeface="Arial" charset="0"/>
+            </a:endParaRPr>
           </a:p>
           <a:p>
             <a:pPr algn="ctr"/>
@@ -4622,26 +4469,20 @@
               <a:rPr lang="pt-BR" sz="3200" dirty="0">
                 <a:latin typeface="Arial" charset="0"/>
               </a:rPr>
-              <a:t>Diretoria dos Cursos de Informática</a:t>
+              <a:t>Universidade Nove de Julho - Uninove</a:t>
             </a:r>
           </a:p>
           <a:p>
             <a:pPr algn="ctr"/>
             <a:r>
-              <a:rPr lang="pt-BR" sz="3200" dirty="0">
+              <a:rPr lang="pt-BR" sz="3000" b="1" dirty="0" smtClean="0">
                 <a:latin typeface="Arial" charset="0"/>
               </a:rPr>
-              <a:t>Universidade Nove de Julho - Uninove</a:t>
-            </a:r>
-          </a:p>
-          <a:p>
-            <a:pPr algn="ctr"/>
-            <a:r>
-              <a:rPr lang="pt-BR" sz="3000" b="1" dirty="0">
-                <a:latin typeface="Arial" charset="0"/>
-              </a:rPr>
-              <a:t>danilo.danilosousa@gmail.com, ricky.souza@gmail.com, wonder@gmail.com </a:t>
-            </a:r>
+              <a:t>danilo.danilosousa@gmail.com</a:t>
+            </a:r>
+            <a:endParaRPr lang="pt-BR" sz="3000" b="1" dirty="0">
+              <a:latin typeface="Arial" charset="0"/>
+            </a:endParaRPr>
           </a:p>
         </p:txBody>
       </p:sp>
@@ -4657,7 +4498,7 @@
           <a:blip r:embed="rId2" cstate="print">
             <a:extLst>
               <a:ext uri="{28A0092B-C50C-407E-A947-70E740481C1C}">
-                <a14:useLocalDpi xmlns="" xmlns:a14="http://schemas.microsoft.com/office/drawing/2010/main" val="0"/>
+                <a14:useLocalDpi xmlns:a14="http://schemas.microsoft.com/office/drawing/2010/main" xmlns="" val="0"/>
               </a:ext>
             </a:extLst>
           </a:blip>
@@ -4668,7 +4509,7 @@
         </p:blipFill>
         <p:spPr bwMode="auto">
           <a:xfrm>
-            <a:off x="1628673" y="5009987"/>
+            <a:off x="1944441" y="4651745"/>
             <a:ext cx="6286544" cy="2776629"/>
           </a:xfrm>
           <a:prstGeom prst="rect">
@@ -4680,14 +4521,14 @@
           </a:ln>
           <a:extLst>
             <a:ext uri="{909E8E84-426E-40DD-AFC4-6F175D3DCCD1}">
-              <a14:hiddenFill xmlns="" xmlns:a14="http://schemas.microsoft.com/office/drawing/2010/main">
+              <a14:hiddenFill xmlns:a14="http://schemas.microsoft.com/office/drawing/2010/main" xmlns="">
                 <a:solidFill>
                   <a:srgbClr val="FFFFFF"/>
                 </a:solidFill>
               </a14:hiddenFill>
             </a:ext>
             <a:ext uri="{91240B29-F687-4F45-9708-019B960494DF}">
-              <a14:hiddenLine xmlns="" xmlns:a14="http://schemas.microsoft.com/office/drawing/2010/main" w="9525">
+              <a14:hiddenLine xmlns:a14="http://schemas.microsoft.com/office/drawing/2010/main" xmlns="" w="9525">
                 <a:solidFill>
                   <a:srgbClr val="000000"/>
                 </a:solidFill>
@@ -4723,14 +4564,14 @@
           </a:ln>
           <a:extLst>
             <a:ext uri="{909E8E84-426E-40DD-AFC4-6F175D3DCCD1}">
-              <a14:hiddenFill xmlns="" xmlns:a14="http://schemas.microsoft.com/office/drawing/2010/main">
+              <a14:hiddenFill xmlns:a14="http://schemas.microsoft.com/office/drawing/2010/main" xmlns="">
                 <a:solidFill>
                   <a:srgbClr val="FFFFFF"/>
                 </a:solidFill>
               </a14:hiddenFill>
             </a:ext>
             <a:ext uri="{91240B29-F687-4F45-9708-019B960494DF}">
-              <a14:hiddenLine xmlns="" xmlns:a14="http://schemas.microsoft.com/office/drawing/2010/main" w="9525" algn="ctr">
+              <a14:hiddenLine xmlns:a14="http://schemas.microsoft.com/office/drawing/2010/main" xmlns="" w="9525" algn="ctr">
                 <a:solidFill>
                   <a:srgbClr val="000000"/>
                 </a:solidFill>
@@ -4890,13 +4731,7 @@
               <a:rPr lang="en-US" sz="2100" dirty="0" smtClean="0">
                 <a:latin typeface="Arial" charset="0"/>
               </a:rPr>
-              <a:t>2002</a:t>
-            </a:r>
-            <a:r>
-              <a:rPr lang="en-US" sz="2100" dirty="0" smtClean="0">
-                <a:latin typeface="Arial" charset="0"/>
-              </a:rPr>
-              <a:t>.</a:t>
+              <a:t>2002.</a:t>
             </a:r>
           </a:p>
           <a:p>
@@ -4936,21 +4771,7 @@
                 <a:latin typeface="Arial" pitchFamily="34" charset="0"/>
                 <a:cs typeface="Arial" pitchFamily="34" charset="0"/>
               </a:rPr>
-              <a:t>[</a:t>
-            </a:r>
-            <a:r>
-              <a:rPr lang="en-US" sz="2100" dirty="0" smtClean="0">
-                <a:latin typeface="Arial" pitchFamily="34" charset="0"/>
-                <a:cs typeface="Arial" pitchFamily="34" charset="0"/>
-              </a:rPr>
-              <a:t>3] </a:t>
-            </a:r>
-            <a:r>
-              <a:rPr lang="en-US" sz="2100" dirty="0" smtClean="0">
-                <a:latin typeface="Arial" pitchFamily="34" charset="0"/>
-                <a:cs typeface="Arial" pitchFamily="34" charset="0"/>
-              </a:rPr>
-              <a:t>	</a:t>
+              <a:t>[3] 	</a:t>
             </a:r>
             <a:r>
               <a:rPr lang="en-US" sz="2100" dirty="0" err="1" smtClean="0">
@@ -5095,61 +4916,40 @@
                 <a:latin typeface="Arial" pitchFamily="34" charset="0"/>
                 <a:cs typeface="Arial" pitchFamily="34" charset="0"/>
               </a:rPr>
-              <a:t>. American Journal of Applied Sciences 6 (12): 2066-2070, 2009</a:t>
-            </a:r>
+              <a:t>. American Journal of Applied Sciences 6 (12): 2066-2070, 2009.</a:t>
+            </a:r>
+          </a:p>
+          <a:p>
+            <a:endParaRPr lang="en-US" sz="2000" dirty="0" smtClean="0"/>
+          </a:p>
+          <a:p>
             <a:r>
               <a:rPr lang="en-US" sz="2100" dirty="0" smtClean="0">
                 <a:latin typeface="Arial" pitchFamily="34" charset="0"/>
                 <a:cs typeface="Arial" pitchFamily="34" charset="0"/>
               </a:rPr>
-              <a:t>.</a:t>
-            </a:r>
-          </a:p>
-          <a:p>
-            <a:endParaRPr lang="en-US" sz="2000" dirty="0" smtClean="0"/>
-          </a:p>
-          <a:p>
+              <a:t>[5]	Gonzalez, R.C. and Woods, R. E., </a:t>
+            </a:r>
+            <a:r>
+              <a:rPr lang="en-US" sz="2100" i="1" dirty="0" smtClean="0">
+                <a:latin typeface="Arial" pitchFamily="34" charset="0"/>
+                <a:cs typeface="Arial" pitchFamily="34" charset="0"/>
+              </a:rPr>
+              <a:t>Digital Image Processing. 2</a:t>
+            </a:r>
+            <a:r>
+              <a:rPr lang="en-US" sz="2100" i="1" baseline="30000" dirty="0" smtClean="0">
+                <a:latin typeface="Arial" pitchFamily="34" charset="0"/>
+                <a:cs typeface="Arial" pitchFamily="34" charset="0"/>
+              </a:rPr>
+              <a:t>nd</a:t>
+            </a:r>
             <a:r>
               <a:rPr lang="en-US" sz="2100" dirty="0" smtClean="0">
                 <a:latin typeface="Arial" pitchFamily="34" charset="0"/>
                 <a:cs typeface="Arial" pitchFamily="34" charset="0"/>
               </a:rPr>
-              <a:t>[5]	Gonzalez</a:t>
-            </a:r>
-            <a:r>
-              <a:rPr lang="en-US" sz="2100" dirty="0" smtClean="0">
-                <a:latin typeface="Arial" pitchFamily="34" charset="0"/>
-                <a:cs typeface="Arial" pitchFamily="34" charset="0"/>
-              </a:rPr>
-              <a:t>, R.C. and Woods, R. E., </a:t>
-            </a:r>
-            <a:r>
-              <a:rPr lang="en-US" sz="2100" i="1" dirty="0" smtClean="0">
-                <a:latin typeface="Arial" pitchFamily="34" charset="0"/>
-                <a:cs typeface="Arial" pitchFamily="34" charset="0"/>
-              </a:rPr>
-              <a:t>Digital Image Processing. 2</a:t>
-            </a:r>
-            <a:r>
-              <a:rPr lang="en-US" sz="2100" i="1" baseline="30000" dirty="0" smtClean="0">
-                <a:latin typeface="Arial" pitchFamily="34" charset="0"/>
-                <a:cs typeface="Arial" pitchFamily="34" charset="0"/>
-              </a:rPr>
-              <a:t>nd</a:t>
-            </a:r>
-            <a:r>
-              <a:rPr lang="en-US" sz="2100" dirty="0" smtClean="0">
-                <a:latin typeface="Arial" pitchFamily="34" charset="0"/>
-                <a:cs typeface="Arial" pitchFamily="34" charset="0"/>
-              </a:rPr>
-              <a:t>, New Jersey: Prentice Hall, 2002</a:t>
-            </a:r>
-            <a:r>
-              <a:rPr lang="en-US" sz="2100" dirty="0" smtClean="0">
-                <a:latin typeface="Arial" pitchFamily="34" charset="0"/>
-                <a:cs typeface="Arial" pitchFamily="34" charset="0"/>
-              </a:rPr>
-              <a:t>.</a:t>
+              <a:t>, New Jersey: Prentice Hall, 2002.</a:t>
             </a:r>
           </a:p>
           <a:p>
@@ -5234,14 +5034,7 @@
                 <a:latin typeface="Arial" pitchFamily="34" charset="0"/>
                 <a:cs typeface="Arial" pitchFamily="34" charset="0"/>
               </a:rPr>
-              <a:t> Área de Ensino e Pesquisa, NCE/IM. Universidade Federal do Rio de Janeiro, 2002</a:t>
-            </a:r>
-            <a:r>
-              <a:rPr lang="pt-BR" sz="2100" dirty="0" smtClean="0">
-                <a:latin typeface="Arial" pitchFamily="34" charset="0"/>
-                <a:cs typeface="Arial" pitchFamily="34" charset="0"/>
-              </a:rPr>
-              <a:t>.</a:t>
+              <a:t> Área de Ensino e Pesquisa, NCE/IM. Universidade Federal do Rio de Janeiro, 2002.</a:t>
             </a:r>
             <a:endParaRPr lang="en-US" sz="2100" dirty="0">
               <a:latin typeface="Arial" pitchFamily="34" charset="0"/>
@@ -5274,14 +5067,14 @@
           </a:ln>
           <a:extLst>
             <a:ext uri="{909E8E84-426E-40DD-AFC4-6F175D3DCCD1}">
-              <a14:hiddenFill xmlns="" xmlns:a14="http://schemas.microsoft.com/office/drawing/2010/main">
+              <a14:hiddenFill xmlns:a14="http://schemas.microsoft.com/office/drawing/2010/main" xmlns="">
                 <a:solidFill>
                   <a:srgbClr val="FFFFFF"/>
                 </a:solidFill>
               </a14:hiddenFill>
             </a:ext>
             <a:ext uri="{91240B29-F687-4F45-9708-019B960494DF}">
-              <a14:hiddenLine xmlns="" xmlns:a14="http://schemas.microsoft.com/office/drawing/2010/main" w="9525" algn="ctr">
+              <a14:hiddenLine xmlns:a14="http://schemas.microsoft.com/office/drawing/2010/main" xmlns="" w="9525" algn="ctr">
                 <a:solidFill>
                   <a:srgbClr val="000000"/>
                 </a:solidFill>
@@ -5430,8 +5223,8 @@
         </p:nvSpPr>
         <p:spPr bwMode="auto">
           <a:xfrm>
-            <a:off x="1296369" y="11001326"/>
-            <a:ext cx="16262978" cy="2308324"/>
+            <a:off x="1872433" y="14977915"/>
+            <a:ext cx="10657184" cy="6324808"/>
           </a:xfrm>
           <a:prstGeom prst="rect">
             <a:avLst/>
@@ -5445,14 +5238,14 @@
           </a:ln>
           <a:extLst>
             <a:ext uri="{909E8E84-426E-40DD-AFC4-6F175D3DCCD1}">
-              <a14:hiddenFill xmlns="" xmlns:a14="http://schemas.microsoft.com/office/drawing/2010/main">
+              <a14:hiddenFill xmlns:a14="http://schemas.microsoft.com/office/drawing/2010/main" xmlns="">
                 <a:solidFill>
                   <a:srgbClr val="FFFFFF"/>
                 </a:solidFill>
               </a14:hiddenFill>
             </a:ext>
             <a:ext uri="{91240B29-F687-4F45-9708-019B960494DF}">
-              <a14:hiddenLine xmlns="" xmlns:a14="http://schemas.microsoft.com/office/drawing/2010/main" w="9525" algn="ctr">
+              <a14:hiddenLine xmlns:a14="http://schemas.microsoft.com/office/drawing/2010/main" xmlns="" w="9525" algn="ctr">
                 <a:solidFill>
                   <a:srgbClr val="000000"/>
                 </a:solidFill>
@@ -5566,38 +5359,79 @@
             </a:lvl9pPr>
           </a:lstStyle>
           <a:p>
-            <a:pPr algn="ctr"/>
-            <a:r>
-              <a:rPr lang="pt-BR" sz="4800" b="1" dirty="0" smtClean="0">
+            <a:pPr algn="ctr">
+              <a:spcAft>
+                <a:spcPts val="4200"/>
+              </a:spcAft>
+            </a:pPr>
+            <a:r>
+              <a:rPr lang="pt-BR" sz="5000" b="1" dirty="0" smtClean="0">
                 <a:latin typeface="Arial" charset="0"/>
               </a:rPr>
               <a:t>Objetivo</a:t>
             </a:r>
           </a:p>
           <a:p>
-            <a:pPr algn="just">
-              <a:buFont typeface="Wingdings" pitchFamily="2" charset="2"/>
-              <a:buNone/>
-            </a:pPr>
+            <a:pPr algn="just"/>
             <a:r>
               <a:rPr lang="pt-BR" sz="3200" dirty="0" smtClean="0">
                 <a:latin typeface="Arial" charset="0"/>
               </a:rPr>
-              <a:t>		Neste trabalho, propõe-se um método para localizar e reconhecer placas de licenciamento de veículos brasileiros em imagens, utilizando técnicas conhecidas como operadores morfológicos e busca por </a:t>
-            </a:r>
-            <a:r>
-              <a:rPr lang="pt-BR" sz="3200" i="1" dirty="0" smtClean="0">
-                <a:latin typeface="Arial" charset="0"/>
-              </a:rPr>
-              <a:t>template, </a:t>
+              <a:t>		</a:t>
             </a:r>
             <a:r>
               <a:rPr lang="pt-BR" sz="3200" dirty="0" smtClean="0">
-                <a:latin typeface="Arial" charset="0"/>
-              </a:rPr>
-              <a:t>com objetivo de identificar o veículo.</a:t>
-            </a:r>
-            <a:endParaRPr lang="pt-BR" sz="3200" dirty="0"/>
+                <a:latin typeface="Arial" pitchFamily="34" charset="0"/>
+                <a:cs typeface="Arial" pitchFamily="34" charset="0"/>
+              </a:rPr>
+              <a:t>Neste </a:t>
+            </a:r>
+            <a:r>
+              <a:rPr lang="pt-BR" sz="3200" dirty="0" smtClean="0">
+                <a:latin typeface="Arial" pitchFamily="34" charset="0"/>
+                <a:cs typeface="Arial" pitchFamily="34" charset="0"/>
+              </a:rPr>
+              <a:t>trabalho é </a:t>
+            </a:r>
+            <a:r>
+              <a:rPr lang="pt-BR" sz="3200" dirty="0" smtClean="0">
+                <a:latin typeface="Arial" pitchFamily="34" charset="0"/>
+                <a:cs typeface="Arial" pitchFamily="34" charset="0"/>
+              </a:rPr>
+              <a:t>apresentado </a:t>
+            </a:r>
+            <a:r>
+              <a:rPr lang="pt-BR" sz="3200" dirty="0" smtClean="0">
+                <a:latin typeface="Arial" pitchFamily="34" charset="0"/>
+                <a:cs typeface="Arial" pitchFamily="34" charset="0"/>
+              </a:rPr>
+              <a:t>uma visão geral sobre o processo de garantia da qualidade de software propondo um guia geral para estabelecer um conjunto de papéis e atividades com o objetivo de fornecer um guia para as empresas que buscam estabelecer qualidade nos processos de construção de software. </a:t>
+            </a:r>
+            <a:r>
+              <a:rPr lang="pt-BR" sz="3200" dirty="0" smtClean="0">
+                <a:latin typeface="Arial" pitchFamily="34" charset="0"/>
+                <a:cs typeface="Arial" pitchFamily="34" charset="0"/>
+              </a:rPr>
+              <a:t>É descrito </a:t>
+            </a:r>
+            <a:r>
+              <a:rPr lang="pt-BR" sz="3200" dirty="0" smtClean="0">
+                <a:latin typeface="Arial" pitchFamily="34" charset="0"/>
+                <a:cs typeface="Arial" pitchFamily="34" charset="0"/>
+              </a:rPr>
+              <a:t>com ênfase o modelo CMMI-DEV, considerado um dos melhores modelos de qualidade para empresas de produtos e serviços, sendo também utilizado como base para o método proposto</a:t>
+            </a:r>
+            <a:r>
+              <a:rPr lang="pt-BR" sz="3200" dirty="0" smtClean="0">
+                <a:latin typeface="Arial" pitchFamily="34" charset="0"/>
+                <a:cs typeface="Arial" pitchFamily="34" charset="0"/>
+              </a:rPr>
+              <a:t>.</a:t>
+            </a:r>
+            <a:endParaRPr lang="pt-BR" sz="3200" dirty="0">
+              <a:latin typeface="Arial" pitchFamily="34" charset="0"/>
+              <a:cs typeface="Arial" pitchFamily="34" charset="0"/>
+            </a:endParaRPr>
           </a:p>
         </p:txBody>
       </p:sp>
@@ -5611,8 +5445,8 @@
         </p:nvSpPr>
         <p:spPr bwMode="auto">
           <a:xfrm>
-            <a:off x="1271483" y="2016125"/>
-            <a:ext cx="30146835" cy="6056243"/>
+            <a:off x="1800424" y="2016125"/>
+            <a:ext cx="28803201" cy="6056243"/>
           </a:xfrm>
           <a:prstGeom prst="rect">
             <a:avLst/>
@@ -5628,7 +5462,7 @@
           </a:ln>
           <a:extLst>
             <a:ext uri="{909E8E84-426E-40DD-AFC4-6F175D3DCCD1}">
-              <a14:hiddenFill xmlns="" xmlns:a14="http://schemas.microsoft.com/office/drawing/2010/main">
+              <a14:hiddenFill xmlns:a14="http://schemas.microsoft.com/office/drawing/2010/main" xmlns="">
                 <a:solidFill>
                   <a:srgbClr val="FFFFFF"/>
                 </a:solidFill>
@@ -5659,7 +5493,7 @@
         </p:nvSpPr>
         <p:spPr bwMode="auto">
           <a:xfrm>
-            <a:off x="1296369" y="13686038"/>
+            <a:off x="1872433" y="27230195"/>
             <a:ext cx="16262978" cy="1815882"/>
           </a:xfrm>
           <a:prstGeom prst="rect">
@@ -5677,14 +5511,14 @@
           </a:ln>
           <a:extLst>
             <a:ext uri="{909E8E84-426E-40DD-AFC4-6F175D3DCCD1}">
-              <a14:hiddenFill xmlns="" xmlns:a14="http://schemas.microsoft.com/office/drawing/2010/main">
+              <a14:hiddenFill xmlns:a14="http://schemas.microsoft.com/office/drawing/2010/main" xmlns="">
                 <a:solidFill>
                   <a:srgbClr val="FFFFFF"/>
                 </a:solidFill>
               </a14:hiddenFill>
             </a:ext>
             <a:ext uri="{91240B29-F687-4F45-9708-019B960494DF}">
-              <a14:hiddenLine xmlns="" xmlns:a14="http://schemas.microsoft.com/office/drawing/2010/main" w="9525" algn="ctr">
+              <a14:hiddenLine xmlns:a14="http://schemas.microsoft.com/office/drawing/2010/main" xmlns="" w="9525" algn="ctr">
                 <a:solidFill>
                   <a:srgbClr val="000000"/>
                 </a:solidFill>
@@ -5826,582 +5660,6 @@
       </p:sp>
       <p:sp>
         <p:nvSpPr>
-          <p:cNvPr id="27" name="CaixaDeTexto 26"/>
-          <p:cNvSpPr txBox="1"/>
-          <p:nvPr/>
-        </p:nvSpPr>
-        <p:spPr>
-          <a:xfrm>
-            <a:off x="1974463" y="16471272"/>
-            <a:ext cx="5053482" cy="2569934"/>
-          </a:xfrm>
-          <a:prstGeom prst="rect">
-            <a:avLst/>
-          </a:prstGeom>
-          <a:noFill/>
-          <a:ln w="3175">
-            <a:solidFill>
-              <a:schemeClr val="tx1"/>
-            </a:solidFill>
-            <a:prstDash val="sysDot"/>
-          </a:ln>
-        </p:spPr>
-        <p:txBody>
-          <a:bodyPr wrap="square" rtlCol="0">
-            <a:spAutoFit/>
-          </a:bodyPr>
-          <a:lstStyle/>
-          <a:p>
-            <a:endParaRPr lang="pt-BR" dirty="0" smtClean="0"/>
-          </a:p>
-          <a:p>
-            <a:endParaRPr lang="pt-BR" dirty="0" smtClean="0"/>
-          </a:p>
-          <a:p>
-            <a:endParaRPr lang="pt-BR" dirty="0" smtClean="0"/>
-          </a:p>
-          <a:p>
-            <a:endParaRPr lang="pt-BR" dirty="0" smtClean="0"/>
-          </a:p>
-          <a:p>
-            <a:endParaRPr lang="pt-BR" dirty="0" smtClean="0"/>
-          </a:p>
-          <a:p>
-            <a:pPr algn="r"/>
-            <a:endParaRPr lang="pt-BR" dirty="0" smtClean="0">
-              <a:latin typeface="Arial" pitchFamily="34" charset="0"/>
-              <a:cs typeface="Arial" pitchFamily="34" charset="0"/>
-            </a:endParaRPr>
-          </a:p>
-          <a:p>
-            <a:pPr algn="r"/>
-            <a:r>
-              <a:rPr lang="pt-BR" sz="2100" dirty="0" smtClean="0">
-                <a:latin typeface="Arial" pitchFamily="34" charset="0"/>
-                <a:cs typeface="Arial" pitchFamily="34" charset="0"/>
-              </a:rPr>
-              <a:t> IMAGEM DO VEÍCULO</a:t>
-            </a:r>
-            <a:endParaRPr lang="pt-BR" sz="2100" dirty="0">
-              <a:latin typeface="Arial" pitchFamily="34" charset="0"/>
-              <a:cs typeface="Arial" pitchFamily="34" charset="0"/>
-            </a:endParaRPr>
-          </a:p>
-        </p:txBody>
-      </p:sp>
-      <p:sp>
-        <p:nvSpPr>
-          <p:cNvPr id="28" name="CaixaDeTexto 27"/>
-          <p:cNvSpPr txBox="1"/>
-          <p:nvPr/>
-        </p:nvSpPr>
-        <p:spPr>
-          <a:xfrm>
-            <a:off x="7629465" y="17002118"/>
-            <a:ext cx="4071966" cy="1508105"/>
-          </a:xfrm>
-          <a:prstGeom prst="rect">
-            <a:avLst/>
-          </a:prstGeom>
-          <a:noFill/>
-          <a:ln w="3175">
-            <a:solidFill>
-              <a:schemeClr val="tx1"/>
-            </a:solidFill>
-            <a:prstDash val="sysDot"/>
-          </a:ln>
-        </p:spPr>
-        <p:txBody>
-          <a:bodyPr wrap="square" rtlCol="0">
-            <a:spAutoFit/>
-          </a:bodyPr>
-          <a:lstStyle/>
-          <a:p>
-            <a:endParaRPr lang="pt-BR" dirty="0" smtClean="0"/>
-          </a:p>
-          <a:p>
-            <a:endParaRPr lang="pt-BR" dirty="0" smtClean="0"/>
-          </a:p>
-          <a:p>
-            <a:endParaRPr lang="pt-BR" dirty="0" smtClean="0"/>
-          </a:p>
-          <a:p>
-            <a:r>
-              <a:rPr lang="pt-BR" sz="2100" dirty="0" smtClean="0">
-                <a:latin typeface="Arial" pitchFamily="34" charset="0"/>
-                <a:cs typeface="Arial" pitchFamily="34" charset="0"/>
-              </a:rPr>
-              <a:t>(1) EXTRAÇÃO DA PLACA</a:t>
-            </a:r>
-            <a:endParaRPr lang="pt-BR" sz="2100" dirty="0">
-              <a:latin typeface="Arial" pitchFamily="34" charset="0"/>
-              <a:cs typeface="Arial" pitchFamily="34" charset="0"/>
-            </a:endParaRPr>
-          </a:p>
-        </p:txBody>
-      </p:sp>
-      <p:sp>
-        <p:nvSpPr>
-          <p:cNvPr id="29" name="CaixaDeTexto 28"/>
-          <p:cNvSpPr txBox="1"/>
-          <p:nvPr/>
-        </p:nvSpPr>
-        <p:spPr>
-          <a:xfrm>
-            <a:off x="12344373" y="16783144"/>
-            <a:ext cx="5072098" cy="1862048"/>
-          </a:xfrm>
-          <a:prstGeom prst="rect">
-            <a:avLst/>
-          </a:prstGeom>
-          <a:noFill/>
-          <a:ln w="3175">
-            <a:solidFill>
-              <a:schemeClr val="tx1"/>
-            </a:solidFill>
-            <a:prstDash val="sysDot"/>
-          </a:ln>
-        </p:spPr>
-        <p:txBody>
-          <a:bodyPr wrap="square" rtlCol="0">
-            <a:spAutoFit/>
-          </a:bodyPr>
-          <a:lstStyle/>
-          <a:p>
-            <a:endParaRPr lang="pt-BR" dirty="0" smtClean="0"/>
-          </a:p>
-          <a:p>
-            <a:endParaRPr lang="pt-BR" dirty="0" smtClean="0"/>
-          </a:p>
-          <a:p>
-            <a:endParaRPr lang="pt-BR" dirty="0" smtClean="0"/>
-          </a:p>
-          <a:p>
-            <a:endParaRPr lang="pt-BR" dirty="0" smtClean="0">
-              <a:latin typeface="Arial" pitchFamily="34" charset="0"/>
-              <a:cs typeface="Arial" pitchFamily="34" charset="0"/>
-            </a:endParaRPr>
-          </a:p>
-          <a:p>
-            <a:r>
-              <a:rPr lang="pt-BR" sz="2100" dirty="0" smtClean="0">
-                <a:latin typeface="Arial" pitchFamily="34" charset="0"/>
-                <a:cs typeface="Arial" pitchFamily="34" charset="0"/>
-              </a:rPr>
-              <a:t>(2) RECONHECIMENTO DA PLACA</a:t>
-            </a:r>
-            <a:endParaRPr lang="pt-BR" sz="2100" dirty="0">
-              <a:latin typeface="Arial" pitchFamily="34" charset="0"/>
-              <a:cs typeface="Arial" pitchFamily="34" charset="0"/>
-            </a:endParaRPr>
-          </a:p>
-        </p:txBody>
-      </p:sp>
-      <p:cxnSp>
-        <p:nvCxnSpPr>
-          <p:cNvPr id="34" name="Conector angulado 33"/>
-          <p:cNvCxnSpPr>
-            <a:stCxn id="27" idx="3"/>
-            <a:endCxn id="28" idx="1"/>
-          </p:cNvCxnSpPr>
-          <p:nvPr/>
-        </p:nvCxnSpPr>
-        <p:spPr bwMode="auto">
-          <a:xfrm flipV="1">
-            <a:off x="7027945" y="17756171"/>
-            <a:ext cx="601520" cy="68"/>
-          </a:xfrm>
-          <a:prstGeom prst="bentConnector3">
-            <a:avLst>
-              <a:gd name="adj1" fmla="val 50000"/>
-            </a:avLst>
-          </a:prstGeom>
-          <a:solidFill>
-            <a:schemeClr val="accent1"/>
-          </a:solidFill>
-          <a:ln w="9525" cap="flat" cmpd="sng" algn="ctr">
-            <a:solidFill>
-              <a:schemeClr val="tx1"/>
-            </a:solidFill>
-            <a:prstDash val="solid"/>
-            <a:round/>
-            <a:headEnd type="none" w="med" len="med"/>
-            <a:tailEnd type="arrow"/>
-          </a:ln>
-          <a:effectLst/>
-        </p:spPr>
-      </p:cxnSp>
-      <p:pic>
-        <p:nvPicPr>
-          <p:cNvPr id="46" name="Imagem 45" descr="0 26112002071525.png"/>
-          <p:cNvPicPr>
-            <a:picLocks noChangeAspect="1"/>
-          </p:cNvPicPr>
-          <p:nvPr/>
-        </p:nvPicPr>
-        <p:blipFill>
-          <a:blip r:embed="rId3" cstate="print"/>
-          <a:stretch>
-            <a:fillRect/>
-          </a:stretch>
-        </p:blipFill>
-        <p:spPr>
-          <a:xfrm>
-            <a:off x="2118479" y="16615288"/>
-            <a:ext cx="4800001" cy="1800000"/>
-          </a:xfrm>
-          <a:prstGeom prst="rect">
-            <a:avLst/>
-          </a:prstGeom>
-          <a:effectLst>
-            <a:outerShdw blurRad="457200" dist="342900" dir="9000000" algn="tr" rotWithShape="0">
-              <a:prstClr val="black">
-                <a:alpha val="44000"/>
-              </a:prstClr>
-            </a:outerShdw>
-          </a:effectLst>
-        </p:spPr>
-      </p:pic>
-      <p:pic>
-        <p:nvPicPr>
-          <p:cNvPr id="70" name="Imagem 69" descr="p17.png"/>
-          <p:cNvPicPr>
-            <a:picLocks noChangeAspect="1"/>
-          </p:cNvPicPr>
-          <p:nvPr/>
-        </p:nvPicPr>
-        <p:blipFill>
-          <a:blip r:embed="rId4" cstate="print"/>
-          <a:stretch>
-            <a:fillRect/>
-          </a:stretch>
-        </p:blipFill>
-        <p:spPr>
-          <a:xfrm>
-            <a:off x="8098200" y="17156209"/>
-            <a:ext cx="3174603" cy="774603"/>
-          </a:xfrm>
-          <a:prstGeom prst="rect">
-            <a:avLst/>
-          </a:prstGeom>
-          <a:ln w="3175">
-            <a:solidFill>
-              <a:schemeClr val="tx1">
-                <a:alpha val="73000"/>
-              </a:schemeClr>
-            </a:solidFill>
-          </a:ln>
-          <a:effectLst>
-            <a:outerShdw blurRad="355600" dist="266700" dir="9000000" algn="ctr" rotWithShape="0">
-              <a:schemeClr val="bg2"/>
-            </a:outerShdw>
-          </a:effectLst>
-        </p:spPr>
-      </p:pic>
-      <p:sp>
-        <p:nvSpPr>
-          <p:cNvPr id="80" name="CaixaDeTexto 79"/>
-          <p:cNvSpPr txBox="1"/>
-          <p:nvPr/>
-        </p:nvSpPr>
-        <p:spPr>
-          <a:xfrm>
-            <a:off x="12344373" y="15859110"/>
-            <a:ext cx="5072098" cy="428628"/>
-          </a:xfrm>
-          <a:prstGeom prst="rect">
-            <a:avLst/>
-          </a:prstGeom>
-          <a:noFill/>
-          <a:ln w="3175">
-            <a:solidFill>
-              <a:schemeClr val="tx1"/>
-            </a:solidFill>
-          </a:ln>
-        </p:spPr>
-        <p:txBody>
-          <a:bodyPr wrap="square" rtlCol="0">
-            <a:spAutoFit/>
-          </a:bodyPr>
-          <a:lstStyle/>
-          <a:p>
-            <a:pPr algn="ctr"/>
-            <a:r>
-              <a:rPr lang="pt-BR" sz="2100" b="1" dirty="0" smtClean="0">
-                <a:latin typeface="Arial" pitchFamily="34" charset="0"/>
-                <a:cs typeface="Arial" pitchFamily="34" charset="0"/>
-              </a:rPr>
-              <a:t>BASE DE CONHECIMENTO</a:t>
-            </a:r>
-          </a:p>
-        </p:txBody>
-      </p:sp>
-      <p:cxnSp>
-        <p:nvCxnSpPr>
-          <p:cNvPr id="82" name="Conector angulado 81"/>
-          <p:cNvCxnSpPr>
-            <a:stCxn id="80" idx="2"/>
-            <a:endCxn id="29" idx="0"/>
-          </p:cNvCxnSpPr>
-          <p:nvPr/>
-        </p:nvCxnSpPr>
-        <p:spPr bwMode="auto">
-          <a:xfrm rot="5400000">
-            <a:off x="14632719" y="16535441"/>
-            <a:ext cx="495406" cy="1588"/>
-          </a:xfrm>
-          <a:prstGeom prst="bentConnector3">
-            <a:avLst>
-              <a:gd name="adj1" fmla="val 50000"/>
-            </a:avLst>
-          </a:prstGeom>
-          <a:solidFill>
-            <a:schemeClr val="accent1"/>
-          </a:solidFill>
-          <a:ln w="25400" cap="flat" cmpd="sng" algn="ctr">
-            <a:solidFill>
-              <a:schemeClr val="tx1"/>
-            </a:solidFill>
-            <a:prstDash val="dash"/>
-            <a:round/>
-            <a:headEnd type="none" w="med" len="med"/>
-            <a:tailEnd type="arrow"/>
-          </a:ln>
-          <a:effectLst/>
-        </p:spPr>
-      </p:cxnSp>
-      <p:sp>
-        <p:nvSpPr>
-          <p:cNvPr id="107" name="CaixaDeTexto 106"/>
-          <p:cNvSpPr txBox="1"/>
-          <p:nvPr/>
-        </p:nvSpPr>
-        <p:spPr>
-          <a:xfrm>
-            <a:off x="12344373" y="19413362"/>
-            <a:ext cx="5072098" cy="446276"/>
-          </a:xfrm>
-          <a:prstGeom prst="rect">
-            <a:avLst/>
-          </a:prstGeom>
-          <a:noFill/>
-          <a:ln w="3175">
-            <a:noFill/>
-          </a:ln>
-        </p:spPr>
-        <p:txBody>
-          <a:bodyPr wrap="square" rtlCol="0">
-            <a:spAutoFit/>
-          </a:bodyPr>
-          <a:lstStyle/>
-          <a:p>
-            <a:pPr algn="ctr"/>
-            <a:r>
-              <a:rPr lang="pt-BR" b="1" dirty="0" smtClean="0">
-                <a:latin typeface="Arial" pitchFamily="34" charset="0"/>
-                <a:cs typeface="Arial" pitchFamily="34" charset="0"/>
-              </a:rPr>
-              <a:t>LOA-7993</a:t>
-            </a:r>
-            <a:endParaRPr lang="pt-BR" b="1" dirty="0">
-              <a:latin typeface="Arial" pitchFamily="34" charset="0"/>
-              <a:cs typeface="Arial" pitchFamily="34" charset="0"/>
-            </a:endParaRPr>
-          </a:p>
-        </p:txBody>
-      </p:sp>
-      <p:pic>
-        <p:nvPicPr>
-          <p:cNvPr id="177" name="Imagem 176" descr="Recognition.png"/>
-          <p:cNvPicPr>
-            <a:picLocks noChangeAspect="1"/>
-          </p:cNvPicPr>
-          <p:nvPr/>
-        </p:nvPicPr>
-        <p:blipFill>
-          <a:blip r:embed="rId5" cstate="print">
-            <a:lum bright="-8000" contrast="4000"/>
-          </a:blip>
-          <a:stretch>
-            <a:fillRect/>
-          </a:stretch>
-        </p:blipFill>
-        <p:spPr>
-          <a:xfrm>
-            <a:off x="12773001" y="16916392"/>
-            <a:ext cx="3857652" cy="1228734"/>
-          </a:xfrm>
-          <a:prstGeom prst="rect">
-            <a:avLst/>
-          </a:prstGeom>
-          <a:effectLst>
-            <a:outerShdw blurRad="355600" dist="266700" dir="9000000" algn="ctr" rotWithShape="0">
-              <a:schemeClr val="bg2"/>
-            </a:outerShdw>
-          </a:effectLst>
-        </p:spPr>
-      </p:pic>
-      <p:sp>
-        <p:nvSpPr>
-          <p:cNvPr id="199" name="Text Box 372"/>
-          <p:cNvSpPr txBox="1">
-            <a:spLocks noChangeArrowheads="1"/>
-          </p:cNvSpPr>
-          <p:nvPr/>
-        </p:nvSpPr>
-        <p:spPr bwMode="auto">
-          <a:xfrm>
-            <a:off x="1969521" y="34002951"/>
-            <a:ext cx="7286676" cy="492443"/>
-          </a:xfrm>
-          <a:prstGeom prst="rect">
-            <a:avLst/>
-          </a:prstGeom>
-          <a:noFill/>
-          <a:ln>
-            <a:noFill/>
-          </a:ln>
-          <a:extLst>
-            <a:ext uri="{909E8E84-426E-40DD-AFC4-6F175D3DCCD1}">
-              <a14:hiddenFill xmlns="" xmlns:a14="http://schemas.microsoft.com/office/drawing/2010/main">
-                <a:solidFill>
-                  <a:srgbClr val="FFFFFF"/>
-                </a:solidFill>
-              </a14:hiddenFill>
-            </a:ext>
-            <a:ext uri="{91240B29-F687-4F45-9708-019B960494DF}">
-              <a14:hiddenLine xmlns="" xmlns:a14="http://schemas.microsoft.com/office/drawing/2010/main" w="9525" algn="ctr">
-                <a:solidFill>
-                  <a:srgbClr val="000000"/>
-                </a:solidFill>
-                <a:miter lim="800000"/>
-                <a:headEnd/>
-                <a:tailEnd/>
-              </a14:hiddenLine>
-            </a:ext>
-          </a:extLst>
-        </p:spPr>
-        <p:txBody>
-          <a:bodyPr wrap="square">
-            <a:spAutoFit/>
-          </a:bodyPr>
-          <a:lstStyle>
-            <a:lvl1pPr marL="9525" indent="-9525" defTabSz="863600" eaLnBrk="0" hangingPunct="0">
-              <a:defRPr sz="2300">
-                <a:solidFill>
-                  <a:schemeClr val="tx1"/>
-                </a:solidFill>
-                <a:latin typeface="Times New Roman" pitchFamily="18" charset="0"/>
-              </a:defRPr>
-            </a:lvl1pPr>
-            <a:lvl2pPr marL="1008063" indent="-285750" defTabSz="863600" eaLnBrk="0" hangingPunct="0">
-              <a:defRPr sz="2300">
-                <a:solidFill>
-                  <a:schemeClr val="tx1"/>
-                </a:solidFill>
-                <a:latin typeface="Times New Roman" pitchFamily="18" charset="0"/>
-              </a:defRPr>
-            </a:lvl2pPr>
-            <a:lvl3pPr marL="1416050" indent="-228600" defTabSz="863600" eaLnBrk="0" hangingPunct="0">
-              <a:defRPr sz="2300">
-                <a:solidFill>
-                  <a:schemeClr val="tx1"/>
-                </a:solidFill>
-                <a:latin typeface="Times New Roman" pitchFamily="18" charset="0"/>
-              </a:defRPr>
-            </a:lvl3pPr>
-            <a:lvl4pPr marL="1824038" indent="-228600" defTabSz="863600" eaLnBrk="0" hangingPunct="0">
-              <a:defRPr sz="2300">
-                <a:solidFill>
-                  <a:schemeClr val="tx1"/>
-                </a:solidFill>
-                <a:latin typeface="Times New Roman" pitchFamily="18" charset="0"/>
-              </a:defRPr>
-            </a:lvl4pPr>
-            <a:lvl5pPr marL="2232025" indent="-228600" defTabSz="863600" eaLnBrk="0" hangingPunct="0">
-              <a:defRPr sz="2300">
-                <a:solidFill>
-                  <a:schemeClr val="tx1"/>
-                </a:solidFill>
-                <a:latin typeface="Times New Roman" pitchFamily="18" charset="0"/>
-              </a:defRPr>
-            </a:lvl5pPr>
-            <a:lvl6pPr marL="2689225" indent="-228600" defTabSz="863600" eaLnBrk="0" fontAlgn="base" hangingPunct="0">
-              <a:spcBef>
-                <a:spcPct val="0"/>
-              </a:spcBef>
-              <a:spcAft>
-                <a:spcPct val="0"/>
-              </a:spcAft>
-              <a:defRPr sz="2300">
-                <a:solidFill>
-                  <a:schemeClr val="tx1"/>
-                </a:solidFill>
-                <a:latin typeface="Times New Roman" pitchFamily="18" charset="0"/>
-              </a:defRPr>
-            </a:lvl6pPr>
-            <a:lvl7pPr marL="3146425" indent="-228600" defTabSz="863600" eaLnBrk="0" fontAlgn="base" hangingPunct="0">
-              <a:spcBef>
-                <a:spcPct val="0"/>
-              </a:spcBef>
-              <a:spcAft>
-                <a:spcPct val="0"/>
-              </a:spcAft>
-              <a:defRPr sz="2300">
-                <a:solidFill>
-                  <a:schemeClr val="tx1"/>
-                </a:solidFill>
-                <a:latin typeface="Times New Roman" pitchFamily="18" charset="0"/>
-              </a:defRPr>
-            </a:lvl7pPr>
-            <a:lvl8pPr marL="3603625" indent="-228600" defTabSz="863600" eaLnBrk="0" fontAlgn="base" hangingPunct="0">
-              <a:spcBef>
-                <a:spcPct val="0"/>
-              </a:spcBef>
-              <a:spcAft>
-                <a:spcPct val="0"/>
-              </a:spcAft>
-              <a:defRPr sz="2300">
-                <a:solidFill>
-                  <a:schemeClr val="tx1"/>
-                </a:solidFill>
-                <a:latin typeface="Times New Roman" pitchFamily="18" charset="0"/>
-              </a:defRPr>
-            </a:lvl8pPr>
-            <a:lvl9pPr marL="4060825" indent="-228600" defTabSz="863600" eaLnBrk="0" fontAlgn="base" hangingPunct="0">
-              <a:spcBef>
-                <a:spcPct val="0"/>
-              </a:spcBef>
-              <a:spcAft>
-                <a:spcPct val="0"/>
-              </a:spcAft>
-              <a:defRPr sz="2300">
-                <a:solidFill>
-                  <a:schemeClr val="tx1"/>
-                </a:solidFill>
-                <a:latin typeface="Times New Roman" pitchFamily="18" charset="0"/>
-              </a:defRPr>
-            </a:lvl9pPr>
-          </a:lstStyle>
-          <a:p>
-            <a:pPr algn="just">
-              <a:buFont typeface="Wingdings" pitchFamily="2" charset="2"/>
-              <a:buNone/>
-            </a:pPr>
-            <a:r>
-              <a:rPr lang="pt-BR" sz="2600" i="1" dirty="0" smtClean="0">
-                <a:latin typeface="+mj-lt"/>
-              </a:rPr>
-              <a:t>Figura 2. Etapas para extração da placa</a:t>
-            </a:r>
-            <a:endParaRPr lang="pt-BR" sz="2600" i="1" dirty="0">
-              <a:latin typeface="+mj-lt"/>
-            </a:endParaRPr>
-          </a:p>
-        </p:txBody>
-      </p:sp>
-      <p:sp>
-        <p:nvSpPr>
           <p:cNvPr id="200" name="Text Box 372"/>
           <p:cNvSpPr txBox="1">
             <a:spLocks noChangeArrowheads="1"/>
@@ -6410,7 +5668,7 @@
         </p:nvSpPr>
         <p:spPr bwMode="auto">
           <a:xfrm>
-            <a:off x="1296369" y="20583617"/>
+            <a:off x="1800425" y="29235498"/>
             <a:ext cx="16273808" cy="1569660"/>
           </a:xfrm>
           <a:prstGeom prst="rect">
@@ -6428,14 +5686,14 @@
           </a:ln>
           <a:extLst>
             <a:ext uri="{909E8E84-426E-40DD-AFC4-6F175D3DCCD1}">
-              <a14:hiddenFill xmlns="" xmlns:a14="http://schemas.microsoft.com/office/drawing/2010/main">
+              <a14:hiddenFill xmlns:a14="http://schemas.microsoft.com/office/drawing/2010/main" xmlns="">
                 <a:solidFill>
                   <a:srgbClr val="FFFFFF"/>
                 </a:solidFill>
               </a14:hiddenFill>
             </a:ext>
             <a:ext uri="{91240B29-F687-4F45-9708-019B960494DF}">
-              <a14:hiddenLine xmlns="" xmlns:a14="http://schemas.microsoft.com/office/drawing/2010/main" w="9525" algn="ctr">
+              <a14:hiddenLine xmlns:a14="http://schemas.microsoft.com/office/drawing/2010/main" xmlns="" w="9525" algn="ctr">
                 <a:solidFill>
                   <a:srgbClr val="000000"/>
                 </a:solidFill>
@@ -6568,2632 +5826,6 @@
               </a:rPr>
               <a:t>	A extração da placa é baseada na utilização de operadores morfológicos. Este procedimento pode ser divido em 7 partes,  como ilustrado na figura 2.</a:t>
             </a:r>
-          </a:p>
-        </p:txBody>
-      </p:sp>
-      <p:sp>
-        <p:nvSpPr>
-          <p:cNvPr id="203" name="CaixaDeTexto 202"/>
-          <p:cNvSpPr txBox="1"/>
-          <p:nvPr/>
-        </p:nvSpPr>
-        <p:spPr>
-          <a:xfrm>
-            <a:off x="3493447" y="25931868"/>
-            <a:ext cx="4596754" cy="2215991"/>
-          </a:xfrm>
-          <a:prstGeom prst="rect">
-            <a:avLst/>
-          </a:prstGeom>
-          <a:noFill/>
-          <a:ln w="3175">
-            <a:solidFill>
-              <a:schemeClr val="tx1"/>
-            </a:solidFill>
-          </a:ln>
-        </p:spPr>
-        <p:txBody>
-          <a:bodyPr wrap="square" rtlCol="0">
-            <a:spAutoFit/>
-          </a:bodyPr>
-          <a:lstStyle/>
-          <a:p>
-            <a:endParaRPr lang="pt-BR" i="1" dirty="0" smtClean="0">
-              <a:latin typeface="Arial" pitchFamily="34" charset="0"/>
-              <a:cs typeface="Arial" pitchFamily="34" charset="0"/>
-            </a:endParaRPr>
-          </a:p>
-          <a:p>
-            <a:endParaRPr lang="pt-BR" i="1" dirty="0" smtClean="0">
-              <a:latin typeface="Arial" pitchFamily="34" charset="0"/>
-              <a:cs typeface="Arial" pitchFamily="34" charset="0"/>
-            </a:endParaRPr>
-          </a:p>
-          <a:p>
-            <a:endParaRPr lang="pt-BR" i="1" dirty="0" smtClean="0">
-              <a:latin typeface="Arial" pitchFamily="34" charset="0"/>
-              <a:cs typeface="Arial" pitchFamily="34" charset="0"/>
-            </a:endParaRPr>
-          </a:p>
-          <a:p>
-            <a:endParaRPr lang="pt-BR" i="1" dirty="0" smtClean="0">
-              <a:latin typeface="Arial" pitchFamily="34" charset="0"/>
-              <a:cs typeface="Arial" pitchFamily="34" charset="0"/>
-            </a:endParaRPr>
-          </a:p>
-          <a:p>
-            <a:endParaRPr lang="pt-BR" i="1" dirty="0" smtClean="0">
-              <a:latin typeface="Arial" pitchFamily="34" charset="0"/>
-              <a:cs typeface="Arial" pitchFamily="34" charset="0"/>
-            </a:endParaRPr>
-          </a:p>
-          <a:p>
-            <a:r>
-              <a:rPr lang="pt-BR" sz="2100" i="1" dirty="0" smtClean="0">
-                <a:latin typeface="Arial" pitchFamily="34" charset="0"/>
-                <a:cs typeface="Arial" pitchFamily="34" charset="0"/>
-              </a:rPr>
-              <a:t>(1) Operação Fechamento</a:t>
-            </a:r>
-            <a:endParaRPr lang="pt-BR" sz="2100" i="1" dirty="0" smtClean="0"/>
-          </a:p>
-        </p:txBody>
-      </p:sp>
-      <p:sp>
-        <p:nvSpPr>
-          <p:cNvPr id="204" name="CaixaDeTexto 203"/>
-          <p:cNvSpPr txBox="1"/>
-          <p:nvPr/>
-        </p:nvSpPr>
-        <p:spPr>
-          <a:xfrm>
-            <a:off x="3486061" y="28645099"/>
-            <a:ext cx="4608512" cy="2215991"/>
-          </a:xfrm>
-          <a:prstGeom prst="rect">
-            <a:avLst/>
-          </a:prstGeom>
-          <a:noFill/>
-          <a:ln w="3175">
-            <a:solidFill>
-              <a:schemeClr val="tx1"/>
-            </a:solidFill>
-          </a:ln>
-        </p:spPr>
-        <p:txBody>
-          <a:bodyPr wrap="square" rtlCol="0">
-            <a:spAutoFit/>
-          </a:bodyPr>
-          <a:lstStyle/>
-          <a:p>
-            <a:endParaRPr lang="pt-BR" dirty="0" smtClean="0">
-              <a:latin typeface="Arial" pitchFamily="34" charset="0"/>
-              <a:cs typeface="Arial" pitchFamily="34" charset="0"/>
-            </a:endParaRPr>
-          </a:p>
-          <a:p>
-            <a:endParaRPr lang="pt-BR" dirty="0" smtClean="0">
-              <a:latin typeface="Arial" pitchFamily="34" charset="0"/>
-              <a:cs typeface="Arial" pitchFamily="34" charset="0"/>
-            </a:endParaRPr>
-          </a:p>
-          <a:p>
-            <a:endParaRPr lang="pt-BR" dirty="0" smtClean="0">
-              <a:latin typeface="Arial" pitchFamily="34" charset="0"/>
-              <a:cs typeface="Arial" pitchFamily="34" charset="0"/>
-            </a:endParaRPr>
-          </a:p>
-          <a:p>
-            <a:endParaRPr lang="pt-BR" dirty="0" smtClean="0">
-              <a:latin typeface="Arial" pitchFamily="34" charset="0"/>
-              <a:cs typeface="Arial" pitchFamily="34" charset="0"/>
-            </a:endParaRPr>
-          </a:p>
-          <a:p>
-            <a:endParaRPr lang="pt-BR" dirty="0" smtClean="0">
-              <a:latin typeface="Arial" pitchFamily="34" charset="0"/>
-              <a:cs typeface="Arial" pitchFamily="34" charset="0"/>
-            </a:endParaRPr>
-          </a:p>
-          <a:p>
-            <a:r>
-              <a:rPr lang="pt-BR" sz="2100" dirty="0" smtClean="0">
-                <a:latin typeface="Arial" pitchFamily="34" charset="0"/>
-                <a:cs typeface="Arial" pitchFamily="34" charset="0"/>
-              </a:rPr>
-              <a:t>(2) </a:t>
-            </a:r>
-            <a:r>
-              <a:rPr lang="pt-BR" sz="2100" dirty="0" err="1" smtClean="0">
-                <a:latin typeface="Arial" pitchFamily="34" charset="0"/>
-                <a:cs typeface="Arial" pitchFamily="34" charset="0"/>
-              </a:rPr>
-              <a:t>Binarização</a:t>
-            </a:r>
-            <a:r>
-              <a:rPr lang="pt-BR" sz="2100" dirty="0" smtClean="0">
-                <a:latin typeface="Arial" pitchFamily="34" charset="0"/>
-                <a:cs typeface="Arial" pitchFamily="34" charset="0"/>
-              </a:rPr>
-              <a:t>, Otsu</a:t>
-            </a:r>
-            <a:endParaRPr lang="pt-BR" sz="2100" dirty="0" smtClean="0"/>
-          </a:p>
-        </p:txBody>
-      </p:sp>
-      <p:sp>
-        <p:nvSpPr>
-          <p:cNvPr id="205" name="CaixaDeTexto 204"/>
-          <p:cNvSpPr txBox="1"/>
-          <p:nvPr/>
-        </p:nvSpPr>
-        <p:spPr>
-          <a:xfrm>
-            <a:off x="3486061" y="31359743"/>
-            <a:ext cx="4576404" cy="2215991"/>
-          </a:xfrm>
-          <a:prstGeom prst="rect">
-            <a:avLst/>
-          </a:prstGeom>
-          <a:noFill/>
-          <a:ln w="3175">
-            <a:solidFill>
-              <a:schemeClr val="tx1"/>
-            </a:solidFill>
-          </a:ln>
-        </p:spPr>
-        <p:txBody>
-          <a:bodyPr wrap="square" rtlCol="0">
-            <a:spAutoFit/>
-          </a:bodyPr>
-          <a:lstStyle/>
-          <a:p>
-            <a:endParaRPr lang="pt-BR" dirty="0" smtClean="0">
-              <a:latin typeface="Arial" pitchFamily="34" charset="0"/>
-              <a:cs typeface="Arial" pitchFamily="34" charset="0"/>
-            </a:endParaRPr>
-          </a:p>
-          <a:p>
-            <a:endParaRPr lang="pt-BR" dirty="0" smtClean="0">
-              <a:latin typeface="Arial" pitchFamily="34" charset="0"/>
-              <a:cs typeface="Arial" pitchFamily="34" charset="0"/>
-            </a:endParaRPr>
-          </a:p>
-          <a:p>
-            <a:endParaRPr lang="pt-BR" dirty="0" smtClean="0">
-              <a:latin typeface="Arial" pitchFamily="34" charset="0"/>
-              <a:cs typeface="Arial" pitchFamily="34" charset="0"/>
-            </a:endParaRPr>
-          </a:p>
-          <a:p>
-            <a:endParaRPr lang="pt-BR" dirty="0" smtClean="0">
-              <a:latin typeface="Arial" pitchFamily="34" charset="0"/>
-              <a:cs typeface="Arial" pitchFamily="34" charset="0"/>
-            </a:endParaRPr>
-          </a:p>
-          <a:p>
-            <a:endParaRPr lang="pt-BR" dirty="0" smtClean="0">
-              <a:latin typeface="Arial" pitchFamily="34" charset="0"/>
-              <a:cs typeface="Arial" pitchFamily="34" charset="0"/>
-            </a:endParaRPr>
-          </a:p>
-          <a:p>
-            <a:r>
-              <a:rPr lang="pt-BR" sz="2100" dirty="0" smtClean="0">
-                <a:latin typeface="Arial" pitchFamily="34" charset="0"/>
-                <a:cs typeface="Arial" pitchFamily="34" charset="0"/>
-              </a:rPr>
-              <a:t>(3) Abertura pela Largura</a:t>
-            </a:r>
-            <a:endParaRPr lang="pt-BR" sz="2100" dirty="0" smtClean="0"/>
-          </a:p>
-        </p:txBody>
-      </p:sp>
-      <p:sp>
-        <p:nvSpPr>
-          <p:cNvPr id="206" name="CaixaDeTexto 205"/>
-          <p:cNvSpPr txBox="1"/>
-          <p:nvPr/>
-        </p:nvSpPr>
-        <p:spPr>
-          <a:xfrm>
-            <a:off x="11337989" y="31315121"/>
-            <a:ext cx="4578284" cy="2215991"/>
-          </a:xfrm>
-          <a:prstGeom prst="rect">
-            <a:avLst/>
-          </a:prstGeom>
-          <a:noFill/>
-          <a:ln w="3175">
-            <a:solidFill>
-              <a:schemeClr val="tx1"/>
-            </a:solidFill>
-          </a:ln>
-        </p:spPr>
-        <p:txBody>
-          <a:bodyPr wrap="square" rtlCol="0">
-            <a:spAutoFit/>
-          </a:bodyPr>
-          <a:lstStyle/>
-          <a:p>
-            <a:endParaRPr lang="pt-BR" dirty="0" smtClean="0">
-              <a:latin typeface="Arial" pitchFamily="34" charset="0"/>
-              <a:cs typeface="Arial" pitchFamily="34" charset="0"/>
-            </a:endParaRPr>
-          </a:p>
-          <a:p>
-            <a:endParaRPr lang="pt-BR" dirty="0" smtClean="0">
-              <a:latin typeface="Arial" pitchFamily="34" charset="0"/>
-              <a:cs typeface="Arial" pitchFamily="34" charset="0"/>
-            </a:endParaRPr>
-          </a:p>
-          <a:p>
-            <a:endParaRPr lang="pt-BR" dirty="0" smtClean="0">
-              <a:latin typeface="Arial" pitchFamily="34" charset="0"/>
-              <a:cs typeface="Arial" pitchFamily="34" charset="0"/>
-            </a:endParaRPr>
-          </a:p>
-          <a:p>
-            <a:endParaRPr lang="pt-BR" dirty="0" smtClean="0">
-              <a:latin typeface="Arial" pitchFamily="34" charset="0"/>
-              <a:cs typeface="Arial" pitchFamily="34" charset="0"/>
-            </a:endParaRPr>
-          </a:p>
-          <a:p>
-            <a:endParaRPr lang="pt-BR" dirty="0" smtClean="0">
-              <a:latin typeface="Arial" pitchFamily="34" charset="0"/>
-              <a:cs typeface="Arial" pitchFamily="34" charset="0"/>
-            </a:endParaRPr>
-          </a:p>
-          <a:p>
-            <a:r>
-              <a:rPr lang="pt-BR" sz="2100" dirty="0" smtClean="0">
-                <a:latin typeface="Arial" pitchFamily="34" charset="0"/>
-                <a:cs typeface="Arial" pitchFamily="34" charset="0"/>
-              </a:rPr>
-              <a:t>(4) Abertura pela Altura</a:t>
-            </a:r>
-            <a:endParaRPr lang="pt-BR" sz="2100" dirty="0" smtClean="0"/>
-          </a:p>
-        </p:txBody>
-      </p:sp>
-      <p:sp>
-        <p:nvSpPr>
-          <p:cNvPr id="207" name="CaixaDeTexto 206"/>
-          <p:cNvSpPr txBox="1"/>
-          <p:nvPr/>
-        </p:nvSpPr>
-        <p:spPr>
-          <a:xfrm>
-            <a:off x="11337989" y="28575074"/>
-            <a:ext cx="4578284" cy="2215991"/>
-          </a:xfrm>
-          <a:prstGeom prst="rect">
-            <a:avLst/>
-          </a:prstGeom>
-          <a:noFill/>
-          <a:ln w="3175">
-            <a:solidFill>
-              <a:schemeClr val="tx1"/>
-            </a:solidFill>
-          </a:ln>
-        </p:spPr>
-        <p:txBody>
-          <a:bodyPr wrap="square" rtlCol="0">
-            <a:spAutoFit/>
-          </a:bodyPr>
-          <a:lstStyle/>
-          <a:p>
-            <a:endParaRPr lang="pt-BR" dirty="0" smtClean="0">
-              <a:latin typeface="Arial" pitchFamily="34" charset="0"/>
-              <a:cs typeface="Arial" pitchFamily="34" charset="0"/>
-            </a:endParaRPr>
-          </a:p>
-          <a:p>
-            <a:endParaRPr lang="pt-BR" dirty="0" smtClean="0">
-              <a:latin typeface="Arial" pitchFamily="34" charset="0"/>
-              <a:cs typeface="Arial" pitchFamily="34" charset="0"/>
-            </a:endParaRPr>
-          </a:p>
-          <a:p>
-            <a:endParaRPr lang="pt-BR" dirty="0" smtClean="0">
-              <a:latin typeface="Arial" pitchFamily="34" charset="0"/>
-              <a:cs typeface="Arial" pitchFamily="34" charset="0"/>
-            </a:endParaRPr>
-          </a:p>
-          <a:p>
-            <a:endParaRPr lang="pt-BR" dirty="0" smtClean="0">
-              <a:latin typeface="Arial" pitchFamily="34" charset="0"/>
-              <a:cs typeface="Arial" pitchFamily="34" charset="0"/>
-            </a:endParaRPr>
-          </a:p>
-          <a:p>
-            <a:endParaRPr lang="pt-BR" dirty="0" smtClean="0">
-              <a:latin typeface="Arial" pitchFamily="34" charset="0"/>
-              <a:cs typeface="Arial" pitchFamily="34" charset="0"/>
-            </a:endParaRPr>
-          </a:p>
-          <a:p>
-            <a:r>
-              <a:rPr lang="pt-BR" sz="2100" dirty="0" smtClean="0">
-                <a:latin typeface="Arial" pitchFamily="34" charset="0"/>
-                <a:cs typeface="Arial" pitchFamily="34" charset="0"/>
-              </a:rPr>
-              <a:t>(5) Dilatação</a:t>
-            </a:r>
-            <a:endParaRPr lang="pt-BR" sz="2100" dirty="0" smtClean="0"/>
-          </a:p>
-        </p:txBody>
-      </p:sp>
-      <p:sp>
-        <p:nvSpPr>
-          <p:cNvPr id="208" name="CaixaDeTexto 207"/>
-          <p:cNvSpPr txBox="1"/>
-          <p:nvPr/>
-        </p:nvSpPr>
-        <p:spPr>
-          <a:xfrm>
-            <a:off x="11334381" y="25930455"/>
-            <a:ext cx="4581892" cy="2215991"/>
-          </a:xfrm>
-          <a:prstGeom prst="rect">
-            <a:avLst/>
-          </a:prstGeom>
-          <a:noFill/>
-          <a:ln w="3175">
-            <a:solidFill>
-              <a:schemeClr val="tx1"/>
-            </a:solidFill>
-          </a:ln>
-        </p:spPr>
-        <p:txBody>
-          <a:bodyPr wrap="square" rtlCol="0">
-            <a:spAutoFit/>
-          </a:bodyPr>
-          <a:lstStyle/>
-          <a:p>
-            <a:endParaRPr lang="pt-BR" dirty="0" smtClean="0">
-              <a:latin typeface="Arial" pitchFamily="34" charset="0"/>
-              <a:cs typeface="Arial" pitchFamily="34" charset="0"/>
-            </a:endParaRPr>
-          </a:p>
-          <a:p>
-            <a:endParaRPr lang="pt-BR" dirty="0" smtClean="0">
-              <a:latin typeface="Arial" pitchFamily="34" charset="0"/>
-              <a:cs typeface="Arial" pitchFamily="34" charset="0"/>
-            </a:endParaRPr>
-          </a:p>
-          <a:p>
-            <a:endParaRPr lang="pt-BR" dirty="0" smtClean="0">
-              <a:latin typeface="Arial" pitchFamily="34" charset="0"/>
-              <a:cs typeface="Arial" pitchFamily="34" charset="0"/>
-            </a:endParaRPr>
-          </a:p>
-          <a:p>
-            <a:endParaRPr lang="pt-BR" dirty="0" smtClean="0">
-              <a:latin typeface="Arial" pitchFamily="34" charset="0"/>
-              <a:cs typeface="Arial" pitchFamily="34" charset="0"/>
-            </a:endParaRPr>
-          </a:p>
-          <a:p>
-            <a:endParaRPr lang="pt-BR" dirty="0" smtClean="0">
-              <a:latin typeface="Arial" pitchFamily="34" charset="0"/>
-              <a:cs typeface="Arial" pitchFamily="34" charset="0"/>
-            </a:endParaRPr>
-          </a:p>
-          <a:p>
-            <a:r>
-              <a:rPr lang="pt-BR" dirty="0" smtClean="0">
-                <a:latin typeface="Arial" pitchFamily="34" charset="0"/>
-                <a:cs typeface="Arial" pitchFamily="34" charset="0"/>
-              </a:rPr>
-              <a:t>(6) </a:t>
-            </a:r>
-            <a:r>
-              <a:rPr lang="pt-BR" sz="2100" dirty="0" err="1" smtClean="0">
-                <a:latin typeface="Arial" pitchFamily="34" charset="0"/>
-                <a:cs typeface="Arial" pitchFamily="34" charset="0"/>
-              </a:rPr>
-              <a:t>Retangularidade</a:t>
-            </a:r>
-            <a:endParaRPr lang="pt-BR" sz="2100" dirty="0" smtClean="0"/>
-          </a:p>
-        </p:txBody>
-      </p:sp>
-      <p:cxnSp>
-        <p:nvCxnSpPr>
-          <p:cNvPr id="213" name="Conector angulado 212"/>
-          <p:cNvCxnSpPr>
-            <a:stCxn id="203" idx="2"/>
-            <a:endCxn id="204" idx="0"/>
-          </p:cNvCxnSpPr>
-          <p:nvPr/>
-        </p:nvCxnSpPr>
-        <p:spPr bwMode="auto">
-          <a:xfrm rot="5400000">
-            <a:off x="5542451" y="28395726"/>
-            <a:ext cx="497240" cy="1507"/>
-          </a:xfrm>
-          <a:prstGeom prst="bentConnector3">
-            <a:avLst>
-              <a:gd name="adj1" fmla="val 50000"/>
-            </a:avLst>
-          </a:prstGeom>
-          <a:solidFill>
-            <a:schemeClr val="accent1"/>
-          </a:solidFill>
-          <a:ln w="9525" cap="flat" cmpd="sng" algn="ctr">
-            <a:solidFill>
-              <a:schemeClr val="tx1"/>
-            </a:solidFill>
-            <a:prstDash val="solid"/>
-            <a:round/>
-            <a:headEnd type="none" w="med" len="med"/>
-            <a:tailEnd type="arrow"/>
-          </a:ln>
-          <a:effectLst/>
-        </p:spPr>
-      </p:cxnSp>
-      <p:cxnSp>
-        <p:nvCxnSpPr>
-          <p:cNvPr id="223" name="Conector angulado 222"/>
-          <p:cNvCxnSpPr>
-            <a:stCxn id="205" idx="2"/>
-            <a:endCxn id="206" idx="2"/>
-          </p:cNvCxnSpPr>
-          <p:nvPr/>
-        </p:nvCxnSpPr>
-        <p:spPr bwMode="auto">
-          <a:xfrm rot="5400000" flipH="1" flipV="1">
-            <a:off x="9678386" y="29626989"/>
-            <a:ext cx="44622" cy="7852868"/>
-          </a:xfrm>
-          <a:prstGeom prst="bentConnector3">
-            <a:avLst>
-              <a:gd name="adj1" fmla="val -512303"/>
-            </a:avLst>
-          </a:prstGeom>
-          <a:solidFill>
-            <a:schemeClr val="accent1"/>
-          </a:solidFill>
-          <a:ln w="9525" cap="flat" cmpd="sng" algn="ctr">
-            <a:solidFill>
-              <a:schemeClr val="tx1"/>
-            </a:solidFill>
-            <a:prstDash val="solid"/>
-            <a:round/>
-            <a:headEnd type="none" w="med" len="med"/>
-            <a:tailEnd type="arrow"/>
-          </a:ln>
-          <a:effectLst/>
-        </p:spPr>
-      </p:cxnSp>
-      <p:cxnSp>
-        <p:nvCxnSpPr>
-          <p:cNvPr id="227" name="Conector angulado 226"/>
-          <p:cNvCxnSpPr>
-            <a:stCxn id="206" idx="0"/>
-            <a:endCxn id="207" idx="2"/>
-          </p:cNvCxnSpPr>
-          <p:nvPr/>
-        </p:nvCxnSpPr>
-        <p:spPr bwMode="auto">
-          <a:xfrm rot="5400000" flipH="1" flipV="1">
-            <a:off x="13365103" y="31053093"/>
-            <a:ext cx="524056" cy="1588"/>
-          </a:xfrm>
-          <a:prstGeom prst="bentConnector3">
-            <a:avLst>
-              <a:gd name="adj1" fmla="val 50000"/>
-            </a:avLst>
-          </a:prstGeom>
-          <a:solidFill>
-            <a:schemeClr val="accent1"/>
-          </a:solidFill>
-          <a:ln w="9525" cap="flat" cmpd="sng" algn="ctr">
-            <a:solidFill>
-              <a:schemeClr val="tx1"/>
-            </a:solidFill>
-            <a:prstDash val="solid"/>
-            <a:round/>
-            <a:headEnd type="none" w="med" len="med"/>
-            <a:tailEnd type="arrow"/>
-          </a:ln>
-          <a:effectLst/>
-        </p:spPr>
-      </p:cxnSp>
-      <p:sp>
-        <p:nvSpPr>
-          <p:cNvPr id="241" name="CaixaDeTexto 240"/>
-          <p:cNvSpPr txBox="1"/>
-          <p:nvPr/>
-        </p:nvSpPr>
-        <p:spPr>
-          <a:xfrm>
-            <a:off x="11595793" y="23087458"/>
-            <a:ext cx="4071966" cy="1508105"/>
-          </a:xfrm>
-          <a:prstGeom prst="rect">
-            <a:avLst/>
-          </a:prstGeom>
-          <a:noFill/>
-          <a:ln w="3175">
-            <a:solidFill>
-              <a:schemeClr val="tx1"/>
-            </a:solidFill>
-          </a:ln>
-        </p:spPr>
-        <p:txBody>
-          <a:bodyPr wrap="square" rtlCol="0">
-            <a:spAutoFit/>
-          </a:bodyPr>
-          <a:lstStyle/>
-          <a:p>
-            <a:endParaRPr lang="pt-BR" dirty="0" smtClean="0">
-              <a:latin typeface="Arial" pitchFamily="34" charset="0"/>
-              <a:cs typeface="Arial" pitchFamily="34" charset="0"/>
-            </a:endParaRPr>
-          </a:p>
-          <a:p>
-            <a:endParaRPr lang="pt-BR" dirty="0" smtClean="0">
-              <a:latin typeface="Arial" pitchFamily="34" charset="0"/>
-              <a:cs typeface="Arial" pitchFamily="34" charset="0"/>
-            </a:endParaRPr>
-          </a:p>
-          <a:p>
-            <a:endParaRPr lang="pt-BR" dirty="0" smtClean="0">
-              <a:latin typeface="Arial" pitchFamily="34" charset="0"/>
-              <a:cs typeface="Arial" pitchFamily="34" charset="0"/>
-            </a:endParaRPr>
-          </a:p>
-          <a:p>
-            <a:r>
-              <a:rPr lang="pt-BR" sz="2100" dirty="0" smtClean="0">
-                <a:latin typeface="Arial" pitchFamily="34" charset="0"/>
-                <a:cs typeface="Arial" pitchFamily="34" charset="0"/>
-              </a:rPr>
-              <a:t>(7) Segmentação da região</a:t>
-            </a:r>
-            <a:endParaRPr lang="pt-BR" sz="2100" dirty="0" smtClean="0"/>
-          </a:p>
-        </p:txBody>
-      </p:sp>
-      <p:cxnSp>
-        <p:nvCxnSpPr>
-          <p:cNvPr id="242" name="Conector angulado 241"/>
-          <p:cNvCxnSpPr>
-            <a:stCxn id="207" idx="0"/>
-            <a:endCxn id="208" idx="2"/>
-          </p:cNvCxnSpPr>
-          <p:nvPr/>
-        </p:nvCxnSpPr>
-        <p:spPr bwMode="auto">
-          <a:xfrm rot="16200000" flipV="1">
-            <a:off x="13411915" y="28359858"/>
-            <a:ext cx="428628" cy="1804"/>
-          </a:xfrm>
-          <a:prstGeom prst="bentConnector3">
-            <a:avLst>
-              <a:gd name="adj1" fmla="val 50000"/>
-            </a:avLst>
-          </a:prstGeom>
-          <a:solidFill>
-            <a:schemeClr val="accent1"/>
-          </a:solidFill>
-          <a:ln w="9525" cap="flat" cmpd="sng" algn="ctr">
-            <a:solidFill>
-              <a:schemeClr val="tx1"/>
-            </a:solidFill>
-            <a:prstDash val="solid"/>
-            <a:round/>
-            <a:headEnd type="none" w="med" len="med"/>
-            <a:tailEnd type="arrow"/>
-          </a:ln>
-          <a:effectLst/>
-        </p:spPr>
-      </p:cxnSp>
-      <p:cxnSp>
-        <p:nvCxnSpPr>
-          <p:cNvPr id="246" name="Conector angulado 245"/>
-          <p:cNvCxnSpPr>
-            <a:stCxn id="208" idx="0"/>
-            <a:endCxn id="241" idx="2"/>
-          </p:cNvCxnSpPr>
-          <p:nvPr/>
-        </p:nvCxnSpPr>
-        <p:spPr bwMode="auto">
-          <a:xfrm rot="5400000" flipH="1" flipV="1">
-            <a:off x="12961105" y="25259785"/>
-            <a:ext cx="1334892" cy="6449"/>
-          </a:xfrm>
-          <a:prstGeom prst="bentConnector3">
-            <a:avLst>
-              <a:gd name="adj1" fmla="val 50000"/>
-            </a:avLst>
-          </a:prstGeom>
-          <a:solidFill>
-            <a:schemeClr val="accent1"/>
-          </a:solidFill>
-          <a:ln w="9525" cap="flat" cmpd="sng" algn="ctr">
-            <a:solidFill>
-              <a:schemeClr val="tx1"/>
-            </a:solidFill>
-            <a:prstDash val="solid"/>
-            <a:round/>
-            <a:headEnd type="none" w="med" len="med"/>
-            <a:tailEnd type="arrow"/>
-          </a:ln>
-          <a:effectLst/>
-        </p:spPr>
-      </p:cxnSp>
-      <p:pic>
-        <p:nvPicPr>
-          <p:cNvPr id="250" name="Imagem 249" descr="f1=CloseTopHat.png"/>
-          <p:cNvPicPr>
-            <a:picLocks noChangeAspect="1"/>
-          </p:cNvPicPr>
-          <p:nvPr/>
-        </p:nvPicPr>
-        <p:blipFill>
-          <a:blip r:embed="rId6" cstate="print"/>
-          <a:stretch>
-            <a:fillRect/>
-          </a:stretch>
-        </p:blipFill>
-        <p:spPr>
-          <a:xfrm>
-            <a:off x="3733581" y="26019802"/>
-            <a:ext cx="4320000" cy="1620000"/>
-          </a:xfrm>
-          <a:prstGeom prst="rect">
-            <a:avLst/>
-          </a:prstGeom>
-          <a:effectLst>
-            <a:outerShdw blurRad="317500" dist="215900" dir="7800000" algn="tr" rotWithShape="0">
-              <a:prstClr val="black">
-                <a:alpha val="78000"/>
-              </a:prstClr>
-            </a:outerShdw>
-          </a:effectLst>
-        </p:spPr>
-      </p:pic>
-      <p:pic>
-        <p:nvPicPr>
-          <p:cNvPr id="251" name="Imagem 250" descr="f2=Otsu(f1).png"/>
-          <p:cNvPicPr>
-            <a:picLocks noChangeAspect="1"/>
-          </p:cNvPicPr>
-          <p:nvPr/>
-        </p:nvPicPr>
-        <p:blipFill>
-          <a:blip r:embed="rId7" cstate="print"/>
-          <a:stretch>
-            <a:fillRect/>
-          </a:stretch>
-        </p:blipFill>
-        <p:spPr>
-          <a:xfrm>
-            <a:off x="3673894" y="28731199"/>
-            <a:ext cx="4388571" cy="1613708"/>
-          </a:xfrm>
-          <a:prstGeom prst="rect">
-            <a:avLst/>
-          </a:prstGeom>
-          <a:effectLst>
-            <a:outerShdw blurRad="317500" dist="215900" dir="7800000" algn="tr" rotWithShape="0">
-              <a:prstClr val="black">
-                <a:alpha val="78000"/>
-              </a:prstClr>
-            </a:outerShdw>
-          </a:effectLst>
-        </p:spPr>
-      </p:pic>
-      <p:pic>
-        <p:nvPicPr>
-          <p:cNvPr id="252" name="Imagem 251" descr="f3=Openwidth(f2).png"/>
-          <p:cNvPicPr>
-            <a:picLocks noChangeAspect="1"/>
-          </p:cNvPicPr>
-          <p:nvPr/>
-        </p:nvPicPr>
-        <p:blipFill>
-          <a:blip r:embed="rId8" cstate="print"/>
-          <a:stretch>
-            <a:fillRect/>
-          </a:stretch>
-        </p:blipFill>
-        <p:spPr>
-          <a:xfrm>
-            <a:off x="3666655" y="31455668"/>
-            <a:ext cx="4320000" cy="1620000"/>
-          </a:xfrm>
-          <a:prstGeom prst="rect">
-            <a:avLst/>
-          </a:prstGeom>
-          <a:effectLst>
-            <a:outerShdw blurRad="317500" dist="215900" dir="7800000" algn="tr" rotWithShape="0">
-              <a:prstClr val="black">
-                <a:alpha val="78000"/>
-              </a:prstClr>
-            </a:outerShdw>
-          </a:effectLst>
-        </p:spPr>
-      </p:pic>
-      <p:pic>
-        <p:nvPicPr>
-          <p:cNvPr id="253" name="Imagem 252" descr="f4=Openheight(f3).png"/>
-          <p:cNvPicPr>
-            <a:picLocks noChangeAspect="1"/>
-          </p:cNvPicPr>
-          <p:nvPr/>
-        </p:nvPicPr>
-        <p:blipFill>
-          <a:blip r:embed="rId9" cstate="print"/>
-          <a:stretch>
-            <a:fillRect/>
-          </a:stretch>
-        </p:blipFill>
-        <p:spPr>
-          <a:xfrm>
-            <a:off x="11552303" y="31384230"/>
-            <a:ext cx="4320000" cy="1620000"/>
-          </a:xfrm>
-          <a:prstGeom prst="rect">
-            <a:avLst/>
-          </a:prstGeom>
-          <a:effectLst>
-            <a:outerShdw blurRad="317500" dist="215900" dir="7800000" algn="tr" rotWithShape="0">
-              <a:prstClr val="black">
-                <a:alpha val="78000"/>
-              </a:prstClr>
-            </a:outerShdw>
-          </a:effectLst>
-        </p:spPr>
-      </p:pic>
-      <p:pic>
-        <p:nvPicPr>
-          <p:cNvPr id="254" name="Imagem 253" descr="f5=Dilatation(f4).png"/>
-          <p:cNvPicPr>
-            <a:picLocks noChangeAspect="1"/>
-          </p:cNvPicPr>
-          <p:nvPr/>
-        </p:nvPicPr>
-        <p:blipFill>
-          <a:blip r:embed="rId10" cstate="print"/>
-          <a:stretch>
-            <a:fillRect/>
-          </a:stretch>
-        </p:blipFill>
-        <p:spPr>
-          <a:xfrm>
-            <a:off x="11552595" y="28646512"/>
-            <a:ext cx="4320000" cy="1620000"/>
-          </a:xfrm>
-          <a:prstGeom prst="rect">
-            <a:avLst/>
-          </a:prstGeom>
-          <a:effectLst>
-            <a:outerShdw blurRad="317500" dist="215900" dir="7800000" algn="tr" rotWithShape="0">
-              <a:prstClr val="black">
-                <a:alpha val="78000"/>
-              </a:prstClr>
-            </a:outerShdw>
-          </a:effectLst>
-        </p:spPr>
-      </p:pic>
-      <p:pic>
-        <p:nvPicPr>
-          <p:cNvPr id="327" name="Imagem 326" descr="Segmentation(f5).png"/>
-          <p:cNvPicPr>
-            <a:picLocks noChangeAspect="1"/>
-          </p:cNvPicPr>
-          <p:nvPr/>
-        </p:nvPicPr>
-        <p:blipFill>
-          <a:blip r:embed="rId11" cstate="print"/>
-          <a:stretch>
-            <a:fillRect/>
-          </a:stretch>
-        </p:blipFill>
-        <p:spPr>
-          <a:xfrm>
-            <a:off x="11552595" y="26002751"/>
-            <a:ext cx="4320000" cy="1620000"/>
-          </a:xfrm>
-          <a:prstGeom prst="rect">
-            <a:avLst/>
-          </a:prstGeom>
-          <a:effectLst>
-            <a:outerShdw blurRad="457200" dist="304800" dir="8100000" algn="tr" rotWithShape="0">
-              <a:prstClr val="black">
-                <a:alpha val="76000"/>
-              </a:prstClr>
-            </a:outerShdw>
-          </a:effectLst>
-        </p:spPr>
-      </p:pic>
-      <p:sp>
-        <p:nvSpPr>
-          <p:cNvPr id="340" name="Text Box 372"/>
-          <p:cNvSpPr txBox="1">
-            <a:spLocks noChangeArrowheads="1"/>
-          </p:cNvSpPr>
-          <p:nvPr/>
-        </p:nvSpPr>
-        <p:spPr bwMode="auto">
-          <a:xfrm>
-            <a:off x="1914425" y="19938699"/>
-            <a:ext cx="7286676" cy="492443"/>
-          </a:xfrm>
-          <a:prstGeom prst="rect">
-            <a:avLst/>
-          </a:prstGeom>
-          <a:noFill/>
-          <a:ln>
-            <a:noFill/>
-          </a:ln>
-          <a:extLst>
-            <a:ext uri="{909E8E84-426E-40DD-AFC4-6F175D3DCCD1}">
-              <a14:hiddenFill xmlns="" xmlns:a14="http://schemas.microsoft.com/office/drawing/2010/main">
-                <a:solidFill>
-                  <a:srgbClr val="FFFFFF"/>
-                </a:solidFill>
-              </a14:hiddenFill>
-            </a:ext>
-            <a:ext uri="{91240B29-F687-4F45-9708-019B960494DF}">
-              <a14:hiddenLine xmlns="" xmlns:a14="http://schemas.microsoft.com/office/drawing/2010/main" w="9525" algn="ctr">
-                <a:solidFill>
-                  <a:srgbClr val="000000"/>
-                </a:solidFill>
-                <a:miter lim="800000"/>
-                <a:headEnd/>
-                <a:tailEnd/>
-              </a14:hiddenLine>
-            </a:ext>
-          </a:extLst>
-        </p:spPr>
-        <p:txBody>
-          <a:bodyPr wrap="square">
-            <a:spAutoFit/>
-          </a:bodyPr>
-          <a:lstStyle>
-            <a:lvl1pPr marL="9525" indent="-9525" defTabSz="863600" eaLnBrk="0" hangingPunct="0">
-              <a:defRPr sz="2300">
-                <a:solidFill>
-                  <a:schemeClr val="tx1"/>
-                </a:solidFill>
-                <a:latin typeface="Times New Roman" pitchFamily="18" charset="0"/>
-              </a:defRPr>
-            </a:lvl1pPr>
-            <a:lvl2pPr marL="1008063" indent="-285750" defTabSz="863600" eaLnBrk="0" hangingPunct="0">
-              <a:defRPr sz="2300">
-                <a:solidFill>
-                  <a:schemeClr val="tx1"/>
-                </a:solidFill>
-                <a:latin typeface="Times New Roman" pitchFamily="18" charset="0"/>
-              </a:defRPr>
-            </a:lvl2pPr>
-            <a:lvl3pPr marL="1416050" indent="-228600" defTabSz="863600" eaLnBrk="0" hangingPunct="0">
-              <a:defRPr sz="2300">
-                <a:solidFill>
-                  <a:schemeClr val="tx1"/>
-                </a:solidFill>
-                <a:latin typeface="Times New Roman" pitchFamily="18" charset="0"/>
-              </a:defRPr>
-            </a:lvl3pPr>
-            <a:lvl4pPr marL="1824038" indent="-228600" defTabSz="863600" eaLnBrk="0" hangingPunct="0">
-              <a:defRPr sz="2300">
-                <a:solidFill>
-                  <a:schemeClr val="tx1"/>
-                </a:solidFill>
-                <a:latin typeface="Times New Roman" pitchFamily="18" charset="0"/>
-              </a:defRPr>
-            </a:lvl4pPr>
-            <a:lvl5pPr marL="2232025" indent="-228600" defTabSz="863600" eaLnBrk="0" hangingPunct="0">
-              <a:defRPr sz="2300">
-                <a:solidFill>
-                  <a:schemeClr val="tx1"/>
-                </a:solidFill>
-                <a:latin typeface="Times New Roman" pitchFamily="18" charset="0"/>
-              </a:defRPr>
-            </a:lvl5pPr>
-            <a:lvl6pPr marL="2689225" indent="-228600" defTabSz="863600" eaLnBrk="0" fontAlgn="base" hangingPunct="0">
-              <a:spcBef>
-                <a:spcPct val="0"/>
-              </a:spcBef>
-              <a:spcAft>
-                <a:spcPct val="0"/>
-              </a:spcAft>
-              <a:defRPr sz="2300">
-                <a:solidFill>
-                  <a:schemeClr val="tx1"/>
-                </a:solidFill>
-                <a:latin typeface="Times New Roman" pitchFamily="18" charset="0"/>
-              </a:defRPr>
-            </a:lvl6pPr>
-            <a:lvl7pPr marL="3146425" indent="-228600" defTabSz="863600" eaLnBrk="0" fontAlgn="base" hangingPunct="0">
-              <a:spcBef>
-                <a:spcPct val="0"/>
-              </a:spcBef>
-              <a:spcAft>
-                <a:spcPct val="0"/>
-              </a:spcAft>
-              <a:defRPr sz="2300">
-                <a:solidFill>
-                  <a:schemeClr val="tx1"/>
-                </a:solidFill>
-                <a:latin typeface="Times New Roman" pitchFamily="18" charset="0"/>
-              </a:defRPr>
-            </a:lvl7pPr>
-            <a:lvl8pPr marL="3603625" indent="-228600" defTabSz="863600" eaLnBrk="0" fontAlgn="base" hangingPunct="0">
-              <a:spcBef>
-                <a:spcPct val="0"/>
-              </a:spcBef>
-              <a:spcAft>
-                <a:spcPct val="0"/>
-              </a:spcAft>
-              <a:defRPr sz="2300">
-                <a:solidFill>
-                  <a:schemeClr val="tx1"/>
-                </a:solidFill>
-                <a:latin typeface="Times New Roman" pitchFamily="18" charset="0"/>
-              </a:defRPr>
-            </a:lvl8pPr>
-            <a:lvl9pPr marL="4060825" indent="-228600" defTabSz="863600" eaLnBrk="0" fontAlgn="base" hangingPunct="0">
-              <a:spcBef>
-                <a:spcPct val="0"/>
-              </a:spcBef>
-              <a:spcAft>
-                <a:spcPct val="0"/>
-              </a:spcAft>
-              <a:defRPr sz="2300">
-                <a:solidFill>
-                  <a:schemeClr val="tx1"/>
-                </a:solidFill>
-                <a:latin typeface="Times New Roman" pitchFamily="18" charset="0"/>
-              </a:defRPr>
-            </a:lvl9pPr>
-          </a:lstStyle>
-          <a:p>
-            <a:pPr algn="just">
-              <a:buFont typeface="Wingdings" pitchFamily="2" charset="2"/>
-              <a:buNone/>
-            </a:pPr>
-            <a:r>
-              <a:rPr lang="pt-BR" sz="2600" i="1" dirty="0" smtClean="0">
-                <a:latin typeface="+mj-lt"/>
-              </a:rPr>
-              <a:t>Figura 1. Visão geral do método proposto.</a:t>
-            </a:r>
-            <a:endParaRPr lang="pt-BR" sz="2600" i="1" dirty="0">
-              <a:latin typeface="+mj-lt"/>
-            </a:endParaRPr>
-          </a:p>
-        </p:txBody>
-      </p:sp>
-      <p:sp>
-        <p:nvSpPr>
-          <p:cNvPr id="353" name="CaixaDeTexto 352"/>
-          <p:cNvSpPr txBox="1"/>
-          <p:nvPr/>
-        </p:nvSpPr>
-        <p:spPr>
-          <a:xfrm>
-            <a:off x="2083327" y="22793726"/>
-            <a:ext cx="5981794" cy="2539157"/>
-          </a:xfrm>
-          <a:prstGeom prst="rect">
-            <a:avLst/>
-          </a:prstGeom>
-          <a:noFill/>
-          <a:ln w="3175">
-            <a:solidFill>
-              <a:schemeClr val="tx1"/>
-            </a:solidFill>
-          </a:ln>
-        </p:spPr>
-        <p:txBody>
-          <a:bodyPr wrap="square" rtlCol="0">
-            <a:spAutoFit/>
-          </a:bodyPr>
-          <a:lstStyle/>
-          <a:p>
-            <a:endParaRPr lang="pt-BR" dirty="0" smtClean="0"/>
-          </a:p>
-          <a:p>
-            <a:endParaRPr lang="pt-BR" dirty="0" smtClean="0"/>
-          </a:p>
-          <a:p>
-            <a:endParaRPr lang="pt-BR" dirty="0" smtClean="0"/>
-          </a:p>
-          <a:p>
-            <a:endParaRPr lang="pt-BR" dirty="0" smtClean="0"/>
-          </a:p>
-          <a:p>
-            <a:endParaRPr lang="pt-BR" dirty="0" smtClean="0"/>
-          </a:p>
-          <a:p>
-            <a:endParaRPr lang="pt-BR" dirty="0" smtClean="0"/>
-          </a:p>
-          <a:p>
-            <a:pPr algn="r"/>
-            <a:r>
-              <a:rPr lang="pt-BR" sz="2100" dirty="0" smtClean="0">
-                <a:latin typeface="Arial" pitchFamily="34" charset="0"/>
-                <a:cs typeface="Arial" pitchFamily="34" charset="0"/>
-              </a:rPr>
-              <a:t> IMAGEM DO VEÍCULO EM NÍVEL DE CINZA</a:t>
-            </a:r>
-            <a:endParaRPr lang="pt-BR" sz="2100" dirty="0">
-              <a:latin typeface="Arial" pitchFamily="34" charset="0"/>
-              <a:cs typeface="Arial" pitchFamily="34" charset="0"/>
-            </a:endParaRPr>
-          </a:p>
-        </p:txBody>
-      </p:sp>
-      <p:pic>
-        <p:nvPicPr>
-          <p:cNvPr id="354" name="Imagem 353" descr="0 26112002071525.png"/>
-          <p:cNvPicPr>
-            <a:picLocks noChangeAspect="1"/>
-          </p:cNvPicPr>
-          <p:nvPr/>
-        </p:nvPicPr>
-        <p:blipFill>
-          <a:blip r:embed="rId3" cstate="print"/>
-          <a:stretch>
-            <a:fillRect/>
-          </a:stretch>
-        </p:blipFill>
-        <p:spPr>
-          <a:xfrm>
-            <a:off x="2557367" y="22931472"/>
-            <a:ext cx="4781250" cy="1800000"/>
-          </a:xfrm>
-          <a:prstGeom prst="rect">
-            <a:avLst/>
-          </a:prstGeom>
-          <a:effectLst>
-            <a:outerShdw blurRad="457200" dist="304800" dir="8100000" algn="tr" rotWithShape="0">
-              <a:prstClr val="black">
-                <a:alpha val="54000"/>
-              </a:prstClr>
-            </a:outerShdw>
-          </a:effectLst>
-        </p:spPr>
-      </p:pic>
-      <p:cxnSp>
-        <p:nvCxnSpPr>
-          <p:cNvPr id="355" name="Conector angulado 354"/>
-          <p:cNvCxnSpPr>
-            <a:stCxn id="353" idx="2"/>
-            <a:endCxn id="203" idx="0"/>
-          </p:cNvCxnSpPr>
-          <p:nvPr/>
-        </p:nvCxnSpPr>
-        <p:spPr bwMode="auto">
-          <a:xfrm rot="16200000" flipH="1">
-            <a:off x="5133532" y="25273575"/>
-            <a:ext cx="598985" cy="717600"/>
-          </a:xfrm>
-          <a:prstGeom prst="bentConnector3">
-            <a:avLst>
-              <a:gd name="adj1" fmla="val 50000"/>
-            </a:avLst>
-          </a:prstGeom>
-          <a:solidFill>
-            <a:schemeClr val="accent1"/>
-          </a:solidFill>
-          <a:ln w="9525" cap="flat" cmpd="sng" algn="ctr">
-            <a:solidFill>
-              <a:schemeClr val="tx1"/>
-            </a:solidFill>
-            <a:prstDash val="solid"/>
-            <a:round/>
-            <a:headEnd type="none" w="med" len="med"/>
-            <a:tailEnd type="arrow"/>
-          </a:ln>
-          <a:effectLst/>
-        </p:spPr>
-      </p:cxnSp>
-      <p:sp>
-        <p:nvSpPr>
-          <p:cNvPr id="86" name="Text Box 28"/>
-          <p:cNvSpPr txBox="1">
-            <a:spLocks noChangeArrowheads="1"/>
-          </p:cNvSpPr>
-          <p:nvPr/>
-        </p:nvSpPr>
-        <p:spPr bwMode="auto">
-          <a:xfrm>
-            <a:off x="17930217" y="13681770"/>
-            <a:ext cx="13393488" cy="584802"/>
-          </a:xfrm>
-          <a:prstGeom prst="rect">
-            <a:avLst/>
-          </a:prstGeom>
-          <a:noFill/>
-          <a:ln>
-            <a:noFill/>
-          </a:ln>
-          <a:extLst>
-            <a:ext uri="{909E8E84-426E-40DD-AFC4-6F175D3DCCD1}">
-              <a14:hiddenFill xmlns="" xmlns:a14="http://schemas.microsoft.com/office/drawing/2010/main">
-                <a:solidFill>
-                  <a:srgbClr val="FFFFFF"/>
-                </a:solidFill>
-              </a14:hiddenFill>
-            </a:ext>
-            <a:ext uri="{91240B29-F687-4F45-9708-019B960494DF}">
-              <a14:hiddenLine xmlns="" xmlns:a14="http://schemas.microsoft.com/office/drawing/2010/main" w="9525" algn="ctr">
-                <a:solidFill>
-                  <a:srgbClr val="000000"/>
-                </a:solidFill>
-                <a:miter lim="800000"/>
-                <a:headEnd/>
-                <a:tailEnd/>
-              </a14:hiddenLine>
-            </a:ext>
-          </a:extLst>
-        </p:spPr>
-        <p:txBody>
-          <a:bodyPr wrap="square">
-            <a:spAutoFit/>
-          </a:bodyPr>
-          <a:lstStyle>
-            <a:lvl1pPr defTabSz="863600" eaLnBrk="0" hangingPunct="0">
-              <a:defRPr sz="2300">
-                <a:solidFill>
-                  <a:schemeClr val="tx1"/>
-                </a:solidFill>
-                <a:latin typeface="Times New Roman" pitchFamily="18" charset="0"/>
-              </a:defRPr>
-            </a:lvl1pPr>
-            <a:lvl2pPr marL="742950" indent="-285750" defTabSz="863600" eaLnBrk="0" hangingPunct="0">
-              <a:defRPr sz="2300">
-                <a:solidFill>
-                  <a:schemeClr val="tx1"/>
-                </a:solidFill>
-                <a:latin typeface="Times New Roman" pitchFamily="18" charset="0"/>
-              </a:defRPr>
-            </a:lvl2pPr>
-            <a:lvl3pPr marL="1143000" indent="-228600" defTabSz="863600" eaLnBrk="0" hangingPunct="0">
-              <a:defRPr sz="2300">
-                <a:solidFill>
-                  <a:schemeClr val="tx1"/>
-                </a:solidFill>
-                <a:latin typeface="Times New Roman" pitchFamily="18" charset="0"/>
-              </a:defRPr>
-            </a:lvl3pPr>
-            <a:lvl4pPr marL="1600200" indent="-228600" defTabSz="863600" eaLnBrk="0" hangingPunct="0">
-              <a:defRPr sz="2300">
-                <a:solidFill>
-                  <a:schemeClr val="tx1"/>
-                </a:solidFill>
-                <a:latin typeface="Times New Roman" pitchFamily="18" charset="0"/>
-              </a:defRPr>
-            </a:lvl4pPr>
-            <a:lvl5pPr marL="2057400" indent="-228600" defTabSz="863600" eaLnBrk="0" hangingPunct="0">
-              <a:defRPr sz="2300">
-                <a:solidFill>
-                  <a:schemeClr val="tx1"/>
-                </a:solidFill>
-                <a:latin typeface="Times New Roman" pitchFamily="18" charset="0"/>
-              </a:defRPr>
-            </a:lvl5pPr>
-            <a:lvl6pPr marL="2514600" indent="-228600" defTabSz="863600" eaLnBrk="0" fontAlgn="base" hangingPunct="0">
-              <a:spcBef>
-                <a:spcPct val="0"/>
-              </a:spcBef>
-              <a:spcAft>
-                <a:spcPct val="0"/>
-              </a:spcAft>
-              <a:defRPr sz="2300">
-                <a:solidFill>
-                  <a:schemeClr val="tx1"/>
-                </a:solidFill>
-                <a:latin typeface="Times New Roman" pitchFamily="18" charset="0"/>
-              </a:defRPr>
-            </a:lvl6pPr>
-            <a:lvl7pPr marL="2971800" indent="-228600" defTabSz="863600" eaLnBrk="0" fontAlgn="base" hangingPunct="0">
-              <a:spcBef>
-                <a:spcPct val="0"/>
-              </a:spcBef>
-              <a:spcAft>
-                <a:spcPct val="0"/>
-              </a:spcAft>
-              <a:defRPr sz="2300">
-                <a:solidFill>
-                  <a:schemeClr val="tx1"/>
-                </a:solidFill>
-                <a:latin typeface="Times New Roman" pitchFamily="18" charset="0"/>
-              </a:defRPr>
-            </a:lvl7pPr>
-            <a:lvl8pPr marL="3429000" indent="-228600" defTabSz="863600" eaLnBrk="0" fontAlgn="base" hangingPunct="0">
-              <a:spcBef>
-                <a:spcPct val="0"/>
-              </a:spcBef>
-              <a:spcAft>
-                <a:spcPct val="0"/>
-              </a:spcAft>
-              <a:defRPr sz="2300">
-                <a:solidFill>
-                  <a:schemeClr val="tx1"/>
-                </a:solidFill>
-                <a:latin typeface="Times New Roman" pitchFamily="18" charset="0"/>
-              </a:defRPr>
-            </a:lvl8pPr>
-            <a:lvl9pPr marL="3886200" indent="-228600" defTabSz="863600" eaLnBrk="0" fontAlgn="base" hangingPunct="0">
-              <a:spcBef>
-                <a:spcPct val="0"/>
-              </a:spcBef>
-              <a:spcAft>
-                <a:spcPct val="0"/>
-              </a:spcAft>
-              <a:defRPr sz="2300">
-                <a:solidFill>
-                  <a:schemeClr val="tx1"/>
-                </a:solidFill>
-                <a:latin typeface="Times New Roman" pitchFamily="18" charset="0"/>
-              </a:defRPr>
-            </a:lvl9pPr>
-          </a:lstStyle>
-          <a:p>
-            <a:pPr algn="ctr"/>
-            <a:r>
-              <a:rPr lang="pt-BR" sz="3200" b="1" i="1" dirty="0" smtClean="0">
-                <a:latin typeface="+mj-lt"/>
-              </a:rPr>
-              <a:t>Reconhecimento da placa</a:t>
-            </a:r>
-            <a:endParaRPr lang="pt-BR" sz="3200" b="1" i="1" dirty="0">
-              <a:latin typeface="+mj-lt"/>
-            </a:endParaRPr>
-          </a:p>
-        </p:txBody>
-      </p:sp>
-      <p:sp>
-        <p:nvSpPr>
-          <p:cNvPr id="115" name="Text Box 28"/>
-          <p:cNvSpPr txBox="1">
-            <a:spLocks noChangeArrowheads="1"/>
-          </p:cNvSpPr>
-          <p:nvPr/>
-        </p:nvSpPr>
-        <p:spPr bwMode="auto">
-          <a:xfrm>
-            <a:off x="1943113" y="15644796"/>
-            <a:ext cx="5400600" cy="584775"/>
-          </a:xfrm>
-          <a:prstGeom prst="rect">
-            <a:avLst/>
-          </a:prstGeom>
-          <a:noFill/>
-          <a:ln>
-            <a:noFill/>
-          </a:ln>
-          <a:extLst>
-            <a:ext uri="{909E8E84-426E-40DD-AFC4-6F175D3DCCD1}">
-              <a14:hiddenFill xmlns="" xmlns:a14="http://schemas.microsoft.com/office/drawing/2010/main">
-                <a:solidFill>
-                  <a:srgbClr val="FFFFFF"/>
-                </a:solidFill>
-              </a14:hiddenFill>
-            </a:ext>
-            <a:ext uri="{91240B29-F687-4F45-9708-019B960494DF}">
-              <a14:hiddenLine xmlns="" xmlns:a14="http://schemas.microsoft.com/office/drawing/2010/main" w="9525" algn="ctr">
-                <a:solidFill>
-                  <a:srgbClr val="000000"/>
-                </a:solidFill>
-                <a:miter lim="800000"/>
-                <a:headEnd/>
-                <a:tailEnd/>
-              </a14:hiddenLine>
-            </a:ext>
-          </a:extLst>
-        </p:spPr>
-        <p:txBody>
-          <a:bodyPr wrap="square">
-            <a:spAutoFit/>
-          </a:bodyPr>
-          <a:lstStyle>
-            <a:lvl1pPr defTabSz="863600" eaLnBrk="0" hangingPunct="0">
-              <a:defRPr sz="2300">
-                <a:solidFill>
-                  <a:schemeClr val="tx1"/>
-                </a:solidFill>
-                <a:latin typeface="Times New Roman" pitchFamily="18" charset="0"/>
-              </a:defRPr>
-            </a:lvl1pPr>
-            <a:lvl2pPr marL="742950" indent="-285750" defTabSz="863600" eaLnBrk="0" hangingPunct="0">
-              <a:defRPr sz="2300">
-                <a:solidFill>
-                  <a:schemeClr val="tx1"/>
-                </a:solidFill>
-                <a:latin typeface="Times New Roman" pitchFamily="18" charset="0"/>
-              </a:defRPr>
-            </a:lvl2pPr>
-            <a:lvl3pPr marL="1143000" indent="-228600" defTabSz="863600" eaLnBrk="0" hangingPunct="0">
-              <a:defRPr sz="2300">
-                <a:solidFill>
-                  <a:schemeClr val="tx1"/>
-                </a:solidFill>
-                <a:latin typeface="Times New Roman" pitchFamily="18" charset="0"/>
-              </a:defRPr>
-            </a:lvl3pPr>
-            <a:lvl4pPr marL="1600200" indent="-228600" defTabSz="863600" eaLnBrk="0" hangingPunct="0">
-              <a:defRPr sz="2300">
-                <a:solidFill>
-                  <a:schemeClr val="tx1"/>
-                </a:solidFill>
-                <a:latin typeface="Times New Roman" pitchFamily="18" charset="0"/>
-              </a:defRPr>
-            </a:lvl4pPr>
-            <a:lvl5pPr marL="2057400" indent="-228600" defTabSz="863600" eaLnBrk="0" hangingPunct="0">
-              <a:defRPr sz="2300">
-                <a:solidFill>
-                  <a:schemeClr val="tx1"/>
-                </a:solidFill>
-                <a:latin typeface="Times New Roman" pitchFamily="18" charset="0"/>
-              </a:defRPr>
-            </a:lvl5pPr>
-            <a:lvl6pPr marL="2514600" indent="-228600" defTabSz="863600" eaLnBrk="0" fontAlgn="base" hangingPunct="0">
-              <a:spcBef>
-                <a:spcPct val="0"/>
-              </a:spcBef>
-              <a:spcAft>
-                <a:spcPct val="0"/>
-              </a:spcAft>
-              <a:defRPr sz="2300">
-                <a:solidFill>
-                  <a:schemeClr val="tx1"/>
-                </a:solidFill>
-                <a:latin typeface="Times New Roman" pitchFamily="18" charset="0"/>
-              </a:defRPr>
-            </a:lvl6pPr>
-            <a:lvl7pPr marL="2971800" indent="-228600" defTabSz="863600" eaLnBrk="0" fontAlgn="base" hangingPunct="0">
-              <a:spcBef>
-                <a:spcPct val="0"/>
-              </a:spcBef>
-              <a:spcAft>
-                <a:spcPct val="0"/>
-              </a:spcAft>
-              <a:defRPr sz="2300">
-                <a:solidFill>
-                  <a:schemeClr val="tx1"/>
-                </a:solidFill>
-                <a:latin typeface="Times New Roman" pitchFamily="18" charset="0"/>
-              </a:defRPr>
-            </a:lvl7pPr>
-            <a:lvl8pPr marL="3429000" indent="-228600" defTabSz="863600" eaLnBrk="0" fontAlgn="base" hangingPunct="0">
-              <a:spcBef>
-                <a:spcPct val="0"/>
-              </a:spcBef>
-              <a:spcAft>
-                <a:spcPct val="0"/>
-              </a:spcAft>
-              <a:defRPr sz="2300">
-                <a:solidFill>
-                  <a:schemeClr val="tx1"/>
-                </a:solidFill>
-                <a:latin typeface="Times New Roman" pitchFamily="18" charset="0"/>
-              </a:defRPr>
-            </a:lvl8pPr>
-            <a:lvl9pPr marL="3886200" indent="-228600" defTabSz="863600" eaLnBrk="0" fontAlgn="base" hangingPunct="0">
-              <a:spcBef>
-                <a:spcPct val="0"/>
-              </a:spcBef>
-              <a:spcAft>
-                <a:spcPct val="0"/>
-              </a:spcAft>
-              <a:defRPr sz="2300">
-                <a:solidFill>
-                  <a:schemeClr val="tx1"/>
-                </a:solidFill>
-                <a:latin typeface="Times New Roman" pitchFamily="18" charset="0"/>
-              </a:defRPr>
-            </a:lvl9pPr>
-          </a:lstStyle>
-          <a:p>
-            <a:pPr algn="ctr"/>
-            <a:r>
-              <a:rPr lang="pt-BR" sz="3200" b="1" i="1" dirty="0" smtClean="0">
-                <a:latin typeface="+mj-lt"/>
-              </a:rPr>
-              <a:t>Visão geral do método</a:t>
-            </a:r>
-            <a:endParaRPr lang="pt-BR" sz="3200" b="1" i="1" dirty="0">
-              <a:latin typeface="+mj-lt"/>
-            </a:endParaRPr>
-          </a:p>
-        </p:txBody>
-      </p:sp>
-      <p:sp>
-        <p:nvSpPr>
-          <p:cNvPr id="118" name="Retângulo 117"/>
-          <p:cNvSpPr/>
-          <p:nvPr/>
-        </p:nvSpPr>
-        <p:spPr bwMode="auto">
-          <a:xfrm>
-            <a:off x="2041529" y="25503240"/>
-            <a:ext cx="15232066" cy="8476177"/>
-          </a:xfrm>
-          <a:prstGeom prst="rect">
-            <a:avLst/>
-          </a:prstGeom>
-          <a:noFill/>
-          <a:ln w="19050" cap="flat" cmpd="sng" algn="ctr">
-            <a:solidFill>
-              <a:schemeClr val="tx1"/>
-            </a:solidFill>
-            <a:prstDash val="dash"/>
-            <a:round/>
-            <a:headEnd type="none" w="med" len="med"/>
-            <a:tailEnd type="none" w="med" len="med"/>
-          </a:ln>
-          <a:effectLst/>
-        </p:spPr>
-        <p:txBody>
-          <a:bodyPr vert="horz" wrap="square" lIns="91440" tIns="45720" rIns="91440" bIns="45720" numCol="1" rtlCol="0" anchor="t" anchorCtr="0" compatLnSpc="1">
-            <a:prstTxWarp prst="textNoShape">
-              <a:avLst/>
-            </a:prstTxWarp>
-          </a:bodyPr>
-          <a:lstStyle/>
-          <a:p>
-            <a:pPr marL="0" marR="0" indent="0" algn="l" defTabSz="863600" rtl="0" eaLnBrk="0" fontAlgn="base" latinLnBrk="0" hangingPunct="0">
-              <a:lnSpc>
-                <a:spcPct val="100000"/>
-              </a:lnSpc>
-              <a:spcBef>
-                <a:spcPct val="0"/>
-              </a:spcBef>
-              <a:spcAft>
-                <a:spcPct val="0"/>
-              </a:spcAft>
-              <a:buClrTx/>
-              <a:buSzTx/>
-              <a:buFontTx/>
-              <a:buNone/>
-              <a:tabLst/>
-            </a:pPr>
-            <a:endParaRPr kumimoji="0" lang="pt-BR" sz="2300" b="0" i="0" u="none" strike="noStrike" cap="none" normalizeH="0" baseline="0" smtClean="0">
-              <a:ln>
-                <a:noFill/>
-              </a:ln>
-              <a:solidFill>
-                <a:schemeClr val="tx1"/>
-              </a:solidFill>
-              <a:effectLst/>
-              <a:latin typeface="Times New Roman" pitchFamily="18" charset="0"/>
-            </a:endParaRPr>
-          </a:p>
-        </p:txBody>
-      </p:sp>
-      <p:sp>
-        <p:nvSpPr>
-          <p:cNvPr id="119" name="CaixaDeTexto 118"/>
-          <p:cNvSpPr txBox="1"/>
-          <p:nvPr/>
-        </p:nvSpPr>
-        <p:spPr>
-          <a:xfrm>
-            <a:off x="19202421" y="19002382"/>
-            <a:ext cx="4071966" cy="1862048"/>
-          </a:xfrm>
-          <a:prstGeom prst="rect">
-            <a:avLst/>
-          </a:prstGeom>
-          <a:noFill/>
-          <a:ln w="3175">
-            <a:solidFill>
-              <a:schemeClr val="tx1"/>
-            </a:solidFill>
-          </a:ln>
-        </p:spPr>
-        <p:txBody>
-          <a:bodyPr wrap="square" rtlCol="0">
-            <a:spAutoFit/>
-          </a:bodyPr>
-          <a:lstStyle/>
-          <a:p>
-            <a:endParaRPr lang="pt-BR" dirty="0" smtClean="0">
-              <a:latin typeface="Arial" pitchFamily="34" charset="0"/>
-              <a:cs typeface="Arial" pitchFamily="34" charset="0"/>
-            </a:endParaRPr>
-          </a:p>
-          <a:p>
-            <a:endParaRPr lang="pt-BR" dirty="0" smtClean="0">
-              <a:latin typeface="Arial" pitchFamily="34" charset="0"/>
-              <a:cs typeface="Arial" pitchFamily="34" charset="0"/>
-            </a:endParaRPr>
-          </a:p>
-          <a:p>
-            <a:endParaRPr lang="pt-BR" dirty="0" smtClean="0">
-              <a:latin typeface="Arial" pitchFamily="34" charset="0"/>
-              <a:cs typeface="Arial" pitchFamily="34" charset="0"/>
-            </a:endParaRPr>
-          </a:p>
-          <a:p>
-            <a:endParaRPr lang="pt-BR" dirty="0" smtClean="0">
-              <a:latin typeface="Arial" pitchFamily="34" charset="0"/>
-              <a:cs typeface="Arial" pitchFamily="34" charset="0"/>
-            </a:endParaRPr>
-          </a:p>
-          <a:p>
-            <a:r>
-              <a:rPr lang="pt-BR" sz="2100" dirty="0" smtClean="0">
-                <a:latin typeface="Arial" pitchFamily="34" charset="0"/>
-                <a:cs typeface="Arial" pitchFamily="34" charset="0"/>
-              </a:rPr>
-              <a:t>VALIDAÇÃO</a:t>
-            </a:r>
-            <a:endParaRPr lang="pt-BR" sz="2100" dirty="0" smtClean="0"/>
-          </a:p>
-        </p:txBody>
-      </p:sp>
-      <p:cxnSp>
-        <p:nvCxnSpPr>
-          <p:cNvPr id="120" name="Conector angulado 119"/>
-          <p:cNvCxnSpPr>
-            <a:stCxn id="238" idx="2"/>
-            <a:endCxn id="237" idx="0"/>
-          </p:cNvCxnSpPr>
-          <p:nvPr/>
-        </p:nvCxnSpPr>
-        <p:spPr bwMode="auto">
-          <a:xfrm rot="5400000">
-            <a:off x="20786906" y="16403083"/>
-            <a:ext cx="902997" cy="1588"/>
-          </a:xfrm>
-          <a:prstGeom prst="bentConnector3">
-            <a:avLst>
-              <a:gd name="adj1" fmla="val 50000"/>
-            </a:avLst>
-          </a:prstGeom>
-          <a:solidFill>
-            <a:schemeClr val="accent1"/>
-          </a:solidFill>
-          <a:ln w="9525" cap="flat" cmpd="sng" algn="ctr">
-            <a:solidFill>
-              <a:schemeClr val="tx1"/>
-            </a:solidFill>
-            <a:prstDash val="solid"/>
-            <a:round/>
-            <a:headEnd type="none" w="med" len="med"/>
-            <a:tailEnd type="arrow"/>
-          </a:ln>
-          <a:effectLst/>
-        </p:spPr>
-      </p:cxnSp>
-      <p:sp>
-        <p:nvSpPr>
-          <p:cNvPr id="128" name="CaixaDeTexto 127"/>
-          <p:cNvSpPr txBox="1"/>
-          <p:nvPr/>
-        </p:nvSpPr>
-        <p:spPr>
-          <a:xfrm>
-            <a:off x="25203213" y="21002647"/>
-            <a:ext cx="4214842" cy="446276"/>
-          </a:xfrm>
-          <a:prstGeom prst="rect">
-            <a:avLst/>
-          </a:prstGeom>
-          <a:noFill/>
-          <a:ln w="3175">
-            <a:solidFill>
-              <a:schemeClr val="tx1"/>
-            </a:solidFill>
-          </a:ln>
-        </p:spPr>
-        <p:txBody>
-          <a:bodyPr wrap="square" rtlCol="0">
-            <a:spAutoFit/>
-          </a:bodyPr>
-          <a:lstStyle/>
-          <a:p>
-            <a:r>
-              <a:rPr lang="pt-BR" dirty="0" smtClean="0">
-                <a:latin typeface="Arial" pitchFamily="34" charset="0"/>
-                <a:cs typeface="Arial" pitchFamily="34" charset="0"/>
-              </a:rPr>
-              <a:t>LOA-7993 EM ASCII</a:t>
-            </a:r>
-            <a:endParaRPr lang="pt-BR" dirty="0" smtClean="0"/>
-          </a:p>
-        </p:txBody>
-      </p:sp>
-      <p:cxnSp>
-        <p:nvCxnSpPr>
-          <p:cNvPr id="129" name="Conector angulado 128"/>
-          <p:cNvCxnSpPr>
-            <a:stCxn id="119" idx="2"/>
-            <a:endCxn id="128" idx="1"/>
-          </p:cNvCxnSpPr>
-          <p:nvPr/>
-        </p:nvCxnSpPr>
-        <p:spPr bwMode="auto">
-          <a:xfrm rot="16200000" flipH="1">
-            <a:off x="23040131" y="19062702"/>
-            <a:ext cx="361355" cy="3964809"/>
-          </a:xfrm>
-          <a:prstGeom prst="bentConnector2">
-            <a:avLst/>
-          </a:prstGeom>
-          <a:solidFill>
-            <a:schemeClr val="accent1"/>
-          </a:solidFill>
-          <a:ln w="9525" cap="flat" cmpd="sng" algn="ctr">
-            <a:solidFill>
-              <a:schemeClr val="tx1"/>
-            </a:solidFill>
-            <a:prstDash val="solid"/>
-            <a:round/>
-            <a:headEnd type="none" w="med" len="med"/>
-            <a:tailEnd type="arrow"/>
-          </a:ln>
-          <a:effectLst/>
-        </p:spPr>
-      </p:cxnSp>
-      <p:sp>
-        <p:nvSpPr>
-          <p:cNvPr id="90" name="CaixaDeTexto 89"/>
-          <p:cNvSpPr txBox="1"/>
-          <p:nvPr/>
-        </p:nvSpPr>
-        <p:spPr>
-          <a:xfrm>
-            <a:off x="25203213" y="16855428"/>
-            <a:ext cx="4196602" cy="3739110"/>
-          </a:xfrm>
-          <a:prstGeom prst="rect">
-            <a:avLst/>
-          </a:prstGeom>
-          <a:noFill/>
-          <a:ln w="3175">
-            <a:solidFill>
-              <a:schemeClr val="tx1"/>
-            </a:solidFill>
-          </a:ln>
-        </p:spPr>
-        <p:txBody>
-          <a:bodyPr wrap="square" rtlCol="0">
-            <a:spAutoFit/>
-          </a:bodyPr>
-          <a:lstStyle/>
-          <a:p>
-            <a:r>
-              <a:rPr lang="pt-BR" sz="2400" dirty="0" smtClean="0">
-                <a:latin typeface="Arial" pitchFamily="34" charset="0"/>
-                <a:cs typeface="Arial" pitchFamily="34" charset="0"/>
-              </a:rPr>
-              <a:t>BASE DE CONHECIMENTO</a:t>
-            </a:r>
-          </a:p>
-          <a:p>
-            <a:r>
-              <a:rPr lang="pt-BR" dirty="0" smtClean="0"/>
-              <a:t>Classes de </a:t>
-            </a:r>
-            <a:r>
-              <a:rPr lang="pt-BR" i="1" dirty="0" smtClean="0"/>
-              <a:t>TEMPLATES </a:t>
-            </a:r>
-            <a:r>
-              <a:rPr lang="pt-BR" dirty="0" smtClean="0"/>
-              <a:t>A-Z, 0-9</a:t>
-            </a:r>
-          </a:p>
-          <a:p>
-            <a:endParaRPr lang="pt-BR" dirty="0" smtClean="0"/>
-          </a:p>
-          <a:p>
-            <a:r>
-              <a:rPr lang="pt-BR" dirty="0" smtClean="0"/>
-              <a:t>(A)              , ... ,    </a:t>
-            </a:r>
-          </a:p>
-          <a:p>
-            <a:pPr marL="457200" indent="-457200">
-              <a:buAutoNum type="alphaUcParenBoth" startAt="2"/>
-            </a:pPr>
-            <a:r>
-              <a:rPr lang="pt-BR" dirty="0" smtClean="0"/>
-              <a:t>, ... ,</a:t>
-            </a:r>
-          </a:p>
-          <a:p>
-            <a:pPr marL="457200" indent="-457200"/>
-            <a:r>
-              <a:rPr lang="pt-BR" dirty="0" smtClean="0"/>
-              <a:t> ... </a:t>
-            </a:r>
-          </a:p>
-          <a:p>
-            <a:r>
-              <a:rPr lang="pt-BR" dirty="0" smtClean="0"/>
-              <a:t>(Z)              </a:t>
-            </a:r>
-            <a:r>
-              <a:rPr lang="pt-BR" i="1" dirty="0" smtClean="0"/>
-              <a:t>.</a:t>
-            </a:r>
-            <a:endParaRPr lang="pt-BR" dirty="0" smtClean="0"/>
-          </a:p>
-          <a:p>
-            <a:r>
-              <a:rPr lang="pt-BR" dirty="0" smtClean="0"/>
-              <a:t>(0)               , ... ,</a:t>
-            </a:r>
-          </a:p>
-          <a:p>
-            <a:r>
-              <a:rPr lang="pt-BR" dirty="0" smtClean="0"/>
-              <a:t> ...</a:t>
-            </a:r>
-          </a:p>
-          <a:p>
-            <a:r>
-              <a:rPr lang="pt-BR" dirty="0" smtClean="0"/>
-              <a:t>(9)               , ... ,</a:t>
-            </a:r>
-            <a:endParaRPr lang="pt-BR" i="1" dirty="0" smtClean="0"/>
-          </a:p>
-        </p:txBody>
-      </p:sp>
-      <p:cxnSp>
-        <p:nvCxnSpPr>
-          <p:cNvPr id="91" name="Conector angulado 90"/>
-          <p:cNvCxnSpPr>
-            <a:stCxn id="90" idx="1"/>
-            <a:endCxn id="237" idx="3"/>
-          </p:cNvCxnSpPr>
-          <p:nvPr/>
-        </p:nvCxnSpPr>
-        <p:spPr bwMode="auto">
-          <a:xfrm rot="10800000">
-            <a:off x="23274387" y="17577857"/>
-            <a:ext cx="1928826" cy="1147126"/>
-          </a:xfrm>
-          <a:prstGeom prst="bentConnector3">
-            <a:avLst>
-              <a:gd name="adj1" fmla="val 50000"/>
-            </a:avLst>
-          </a:prstGeom>
-          <a:solidFill>
-            <a:schemeClr val="accent1"/>
-          </a:solidFill>
-          <a:ln w="25400" cap="flat" cmpd="sng" algn="ctr">
-            <a:solidFill>
-              <a:schemeClr val="tx1"/>
-            </a:solidFill>
-            <a:prstDash val="dash"/>
-            <a:round/>
-            <a:headEnd type="none" w="med" len="med"/>
-            <a:tailEnd type="arrow"/>
-          </a:ln>
-          <a:effectLst/>
-        </p:spPr>
-      </p:cxnSp>
-      <p:pic>
-        <p:nvPicPr>
-          <p:cNvPr id="92" name="Imagem 91" descr="tA_1.png"/>
-          <p:cNvPicPr>
-            <a:picLocks noChangeAspect="1"/>
-          </p:cNvPicPr>
-          <p:nvPr/>
-        </p:nvPicPr>
-        <p:blipFill>
-          <a:blip r:embed="rId12" cstate="print"/>
-          <a:stretch>
-            <a:fillRect/>
-          </a:stretch>
-        </p:blipFill>
-        <p:spPr>
-          <a:xfrm>
-            <a:off x="25756477" y="18005497"/>
-            <a:ext cx="368254" cy="241270"/>
-          </a:xfrm>
-          <a:prstGeom prst="rect">
-            <a:avLst/>
-          </a:prstGeom>
-          <a:ln cap="rnd">
-            <a:solidFill>
-              <a:schemeClr val="tx1"/>
-            </a:solidFill>
-            <a:prstDash val="solid"/>
-          </a:ln>
-          <a:effectLst>
-            <a:outerShdw blurRad="88900" dist="114300" dir="2700000" algn="tl" rotWithShape="0">
-              <a:prstClr val="black">
-                <a:alpha val="43000"/>
-              </a:prstClr>
-            </a:outerShdw>
-          </a:effectLst>
-        </p:spPr>
-      </p:pic>
-      <p:pic>
-        <p:nvPicPr>
-          <p:cNvPr id="93" name="Imagem 92" descr="tA_2.png"/>
-          <p:cNvPicPr>
-            <a:picLocks noChangeAspect="1"/>
-          </p:cNvPicPr>
-          <p:nvPr/>
-        </p:nvPicPr>
-        <p:blipFill>
-          <a:blip r:embed="rId13" cstate="print"/>
-          <a:stretch>
-            <a:fillRect/>
-          </a:stretch>
-        </p:blipFill>
-        <p:spPr>
-          <a:xfrm>
-            <a:off x="26256543" y="18005497"/>
-            <a:ext cx="368254" cy="241270"/>
-          </a:xfrm>
-          <a:prstGeom prst="rect">
-            <a:avLst/>
-          </a:prstGeom>
-          <a:ln cap="rnd">
-            <a:solidFill>
-              <a:schemeClr val="tx1"/>
-            </a:solidFill>
-          </a:ln>
-          <a:effectLst>
-            <a:outerShdw blurRad="88900" dist="114300" dir="2700000" algn="tl" rotWithShape="0">
-              <a:prstClr val="black">
-                <a:alpha val="43000"/>
-              </a:prstClr>
-            </a:outerShdw>
-          </a:effectLst>
-        </p:spPr>
-      </p:pic>
-      <p:pic>
-        <p:nvPicPr>
-          <p:cNvPr id="94" name="Imagem 93" descr="tA_3.png"/>
-          <p:cNvPicPr>
-            <a:picLocks noChangeAspect="1"/>
-          </p:cNvPicPr>
-          <p:nvPr/>
-        </p:nvPicPr>
-        <p:blipFill>
-          <a:blip r:embed="rId14" cstate="print"/>
-          <a:stretch>
-            <a:fillRect/>
-          </a:stretch>
-        </p:blipFill>
-        <p:spPr>
-          <a:xfrm>
-            <a:off x="27256675" y="18005497"/>
-            <a:ext cx="368254" cy="241270"/>
-          </a:xfrm>
-          <a:prstGeom prst="rect">
-            <a:avLst/>
-          </a:prstGeom>
-          <a:ln cap="rnd">
-            <a:solidFill>
-              <a:schemeClr val="tx1"/>
-            </a:solidFill>
-          </a:ln>
-          <a:effectLst>
-            <a:outerShdw blurRad="88900" dist="114300" dir="2700000" algn="tl" rotWithShape="0">
-              <a:prstClr val="black">
-                <a:alpha val="43000"/>
-              </a:prstClr>
-            </a:outerShdw>
-          </a:effectLst>
-        </p:spPr>
-      </p:pic>
-      <p:pic>
-        <p:nvPicPr>
-          <p:cNvPr id="95" name="Imagem 94" descr="t0_1.png"/>
-          <p:cNvPicPr>
-            <a:picLocks noChangeAspect="1"/>
-          </p:cNvPicPr>
-          <p:nvPr/>
-        </p:nvPicPr>
-        <p:blipFill>
-          <a:blip r:embed="rId15" cstate="print"/>
-          <a:stretch>
-            <a:fillRect/>
-          </a:stretch>
-        </p:blipFill>
-        <p:spPr>
-          <a:xfrm>
-            <a:off x="25756477" y="19434257"/>
-            <a:ext cx="368254" cy="241270"/>
-          </a:xfrm>
-          <a:prstGeom prst="rect">
-            <a:avLst/>
-          </a:prstGeom>
-          <a:ln cap="rnd">
-            <a:solidFill>
-              <a:schemeClr val="tx1"/>
-            </a:solidFill>
-          </a:ln>
-          <a:effectLst>
-            <a:outerShdw blurRad="88900" dist="114300" dir="2700000" algn="tl" rotWithShape="0">
-              <a:prstClr val="black">
-                <a:alpha val="43000"/>
-              </a:prstClr>
-            </a:outerShdw>
-          </a:effectLst>
-        </p:spPr>
-      </p:pic>
-      <p:pic>
-        <p:nvPicPr>
-          <p:cNvPr id="96" name="Imagem 95" descr="t0_2.png"/>
-          <p:cNvPicPr>
-            <a:picLocks noChangeAspect="1"/>
-          </p:cNvPicPr>
-          <p:nvPr/>
-        </p:nvPicPr>
-        <p:blipFill>
-          <a:blip r:embed="rId16" cstate="print"/>
-          <a:stretch>
-            <a:fillRect/>
-          </a:stretch>
-        </p:blipFill>
-        <p:spPr>
-          <a:xfrm>
-            <a:off x="26256543" y="19434257"/>
-            <a:ext cx="368254" cy="241270"/>
-          </a:xfrm>
-          <a:prstGeom prst="rect">
-            <a:avLst/>
-          </a:prstGeom>
-          <a:ln cap="rnd">
-            <a:solidFill>
-              <a:schemeClr val="tx1"/>
-            </a:solidFill>
-          </a:ln>
-          <a:effectLst>
-            <a:outerShdw blurRad="88900" dist="114300" dir="2700000" algn="tl" rotWithShape="0">
-              <a:prstClr val="black">
-                <a:alpha val="43000"/>
-              </a:prstClr>
-            </a:outerShdw>
-          </a:effectLst>
-        </p:spPr>
-      </p:pic>
-      <p:pic>
-        <p:nvPicPr>
-          <p:cNvPr id="97" name="Imagem 96" descr="t0_3.png"/>
-          <p:cNvPicPr>
-            <a:picLocks noChangeAspect="1"/>
-          </p:cNvPicPr>
-          <p:nvPr/>
-        </p:nvPicPr>
-        <p:blipFill>
-          <a:blip r:embed="rId17" cstate="print"/>
-          <a:stretch>
-            <a:fillRect/>
-          </a:stretch>
-        </p:blipFill>
-        <p:spPr>
-          <a:xfrm>
-            <a:off x="27274915" y="19403510"/>
-            <a:ext cx="368254" cy="241270"/>
-          </a:xfrm>
-          <a:prstGeom prst="rect">
-            <a:avLst/>
-          </a:prstGeom>
-          <a:ln cap="rnd">
-            <a:solidFill>
-              <a:schemeClr val="tx1"/>
-            </a:solidFill>
-          </a:ln>
-          <a:effectLst>
-            <a:outerShdw blurRad="88900" dist="114300" dir="2700000" algn="tl" rotWithShape="0">
-              <a:prstClr val="black">
-                <a:alpha val="43000"/>
-              </a:prstClr>
-            </a:outerShdw>
-          </a:effectLst>
-        </p:spPr>
-      </p:pic>
-      <p:pic>
-        <p:nvPicPr>
-          <p:cNvPr id="98" name="Imagem 97" descr="t9_1.png"/>
-          <p:cNvPicPr>
-            <a:picLocks noChangeAspect="1"/>
-          </p:cNvPicPr>
-          <p:nvPr/>
-        </p:nvPicPr>
-        <p:blipFill>
-          <a:blip r:embed="rId18" cstate="print"/>
-          <a:stretch>
-            <a:fillRect/>
-          </a:stretch>
-        </p:blipFill>
-        <p:spPr>
-          <a:xfrm>
-            <a:off x="25756477" y="20148637"/>
-            <a:ext cx="368254" cy="241270"/>
-          </a:xfrm>
-          <a:prstGeom prst="rect">
-            <a:avLst/>
-          </a:prstGeom>
-          <a:ln cap="rnd">
-            <a:solidFill>
-              <a:schemeClr val="tx1"/>
-            </a:solidFill>
-          </a:ln>
-          <a:effectLst>
-            <a:outerShdw blurRad="88900" dist="114300" dir="2700000" algn="tl" rotWithShape="0">
-              <a:prstClr val="black">
-                <a:alpha val="43000"/>
-              </a:prstClr>
-            </a:outerShdw>
-          </a:effectLst>
-        </p:spPr>
-      </p:pic>
-      <p:pic>
-        <p:nvPicPr>
-          <p:cNvPr id="99" name="Imagem 98" descr="t9_2.png"/>
-          <p:cNvPicPr>
-            <a:picLocks noChangeAspect="1"/>
-          </p:cNvPicPr>
-          <p:nvPr/>
-        </p:nvPicPr>
-        <p:blipFill>
-          <a:blip r:embed="rId19" cstate="print"/>
-          <a:stretch>
-            <a:fillRect/>
-          </a:stretch>
-        </p:blipFill>
-        <p:spPr>
-          <a:xfrm>
-            <a:off x="26256543" y="20148637"/>
-            <a:ext cx="368254" cy="241270"/>
-          </a:xfrm>
-          <a:prstGeom prst="rect">
-            <a:avLst/>
-          </a:prstGeom>
-          <a:ln cap="rnd">
-            <a:solidFill>
-              <a:schemeClr val="tx1"/>
-            </a:solidFill>
-          </a:ln>
-          <a:effectLst>
-            <a:outerShdw blurRad="88900" dist="114300" dir="2700000" algn="tl" rotWithShape="0">
-              <a:prstClr val="black">
-                <a:alpha val="43000"/>
-              </a:prstClr>
-            </a:outerShdw>
-          </a:effectLst>
-        </p:spPr>
-      </p:pic>
-      <p:pic>
-        <p:nvPicPr>
-          <p:cNvPr id="100" name="Imagem 99" descr="t9_3.png"/>
-          <p:cNvPicPr>
-            <a:picLocks noChangeAspect="1"/>
-          </p:cNvPicPr>
-          <p:nvPr/>
-        </p:nvPicPr>
-        <p:blipFill>
-          <a:blip r:embed="rId20" cstate="print"/>
-          <a:stretch>
-            <a:fillRect/>
-          </a:stretch>
-        </p:blipFill>
-        <p:spPr>
-          <a:xfrm>
-            <a:off x="27274915" y="20117890"/>
-            <a:ext cx="368254" cy="241270"/>
-          </a:xfrm>
-          <a:prstGeom prst="rect">
-            <a:avLst/>
-          </a:prstGeom>
-          <a:ln cap="rnd">
-            <a:solidFill>
-              <a:schemeClr val="tx1"/>
-            </a:solidFill>
-          </a:ln>
-          <a:effectLst>
-            <a:outerShdw blurRad="88900" dist="114300" dir="2700000" algn="tl" rotWithShape="0">
-              <a:prstClr val="black">
-                <a:alpha val="43000"/>
-              </a:prstClr>
-            </a:outerShdw>
-          </a:effectLst>
-        </p:spPr>
-      </p:pic>
-      <p:pic>
-        <p:nvPicPr>
-          <p:cNvPr id="101" name="Imagem 100" descr="tB_1.png"/>
-          <p:cNvPicPr>
-            <a:picLocks noChangeAspect="1"/>
-          </p:cNvPicPr>
-          <p:nvPr/>
-        </p:nvPicPr>
-        <p:blipFill>
-          <a:blip r:embed="rId21" cstate="print"/>
-          <a:stretch>
-            <a:fillRect/>
-          </a:stretch>
-        </p:blipFill>
-        <p:spPr>
-          <a:xfrm>
-            <a:off x="25756477" y="18362687"/>
-            <a:ext cx="368254" cy="241270"/>
-          </a:xfrm>
-          <a:prstGeom prst="rect">
-            <a:avLst/>
-          </a:prstGeom>
-          <a:ln cap="rnd">
-            <a:solidFill>
-              <a:schemeClr val="tx1"/>
-            </a:solidFill>
-          </a:ln>
-          <a:effectLst>
-            <a:outerShdw blurRad="88900" dist="114300" dir="2700000" algn="tl" rotWithShape="0">
-              <a:prstClr val="black">
-                <a:alpha val="43000"/>
-              </a:prstClr>
-            </a:outerShdw>
-          </a:effectLst>
-        </p:spPr>
-      </p:pic>
-      <p:pic>
-        <p:nvPicPr>
-          <p:cNvPr id="102" name="Imagem 101" descr="tB_2.png"/>
-          <p:cNvPicPr>
-            <a:picLocks noChangeAspect="1"/>
-          </p:cNvPicPr>
-          <p:nvPr/>
-        </p:nvPicPr>
-        <p:blipFill>
-          <a:blip r:embed="rId22" cstate="print"/>
-          <a:stretch>
-            <a:fillRect/>
-          </a:stretch>
-        </p:blipFill>
-        <p:spPr>
-          <a:xfrm>
-            <a:off x="26245479" y="18362687"/>
-            <a:ext cx="368254" cy="241270"/>
-          </a:xfrm>
-          <a:prstGeom prst="rect">
-            <a:avLst/>
-          </a:prstGeom>
-          <a:ln cap="rnd">
-            <a:solidFill>
-              <a:schemeClr val="tx1"/>
-            </a:solidFill>
-          </a:ln>
-          <a:effectLst>
-            <a:outerShdw blurRad="88900" dist="114300" dir="2700000" algn="tl" rotWithShape="0">
-              <a:prstClr val="black">
-                <a:alpha val="43000"/>
-              </a:prstClr>
-            </a:outerShdw>
-          </a:effectLst>
-        </p:spPr>
-      </p:pic>
-      <p:pic>
-        <p:nvPicPr>
-          <p:cNvPr id="103" name="Imagem 102" descr="tB_3.png"/>
-          <p:cNvPicPr>
-            <a:picLocks noChangeAspect="1"/>
-          </p:cNvPicPr>
-          <p:nvPr/>
-        </p:nvPicPr>
-        <p:blipFill>
-          <a:blip r:embed="rId23" cstate="print"/>
-          <a:stretch>
-            <a:fillRect/>
-          </a:stretch>
-        </p:blipFill>
-        <p:spPr>
-          <a:xfrm>
-            <a:off x="27256675" y="18362687"/>
-            <a:ext cx="368254" cy="241270"/>
-          </a:xfrm>
-          <a:prstGeom prst="rect">
-            <a:avLst/>
-          </a:prstGeom>
-          <a:ln cap="rnd">
-            <a:solidFill>
-              <a:schemeClr val="tx1"/>
-            </a:solidFill>
-          </a:ln>
-          <a:effectLst>
-            <a:outerShdw blurRad="88900" dist="114300" dir="2700000" algn="tl" rotWithShape="0">
-              <a:prstClr val="black">
-                <a:alpha val="43000"/>
-              </a:prstClr>
-            </a:outerShdw>
-          </a:effectLst>
-        </p:spPr>
-      </p:pic>
-      <p:pic>
-        <p:nvPicPr>
-          <p:cNvPr id="104" name="Imagem 103" descr="tZ_1.png"/>
-          <p:cNvPicPr>
-            <a:picLocks noChangeAspect="1"/>
-          </p:cNvPicPr>
-          <p:nvPr/>
-        </p:nvPicPr>
-        <p:blipFill>
-          <a:blip r:embed="rId24" cstate="print"/>
-          <a:stretch>
-            <a:fillRect/>
-          </a:stretch>
-        </p:blipFill>
-        <p:spPr>
-          <a:xfrm>
-            <a:off x="25756477" y="19077067"/>
-            <a:ext cx="368254" cy="241270"/>
-          </a:xfrm>
-          <a:prstGeom prst="rect">
-            <a:avLst/>
-          </a:prstGeom>
-          <a:ln cap="rnd">
-            <a:solidFill>
-              <a:schemeClr val="tx1"/>
-            </a:solidFill>
-          </a:ln>
-          <a:effectLst>
-            <a:outerShdw blurRad="88900" dist="114300" dir="2700000" algn="tl" rotWithShape="0">
-              <a:prstClr val="black">
-                <a:alpha val="43000"/>
-              </a:prstClr>
-            </a:outerShdw>
-          </a:effectLst>
-        </p:spPr>
-      </p:pic>
-      <p:pic>
-        <p:nvPicPr>
-          <p:cNvPr id="105" name="Imagem 104" descr="tZ_2.png"/>
-          <p:cNvPicPr>
-            <a:picLocks noChangeAspect="1"/>
-          </p:cNvPicPr>
-          <p:nvPr/>
-        </p:nvPicPr>
-        <p:blipFill>
-          <a:blip r:embed="rId25" cstate="print"/>
-          <a:stretch>
-            <a:fillRect/>
-          </a:stretch>
-        </p:blipFill>
-        <p:spPr>
-          <a:xfrm>
-            <a:off x="26256543" y="19077067"/>
-            <a:ext cx="368254" cy="241270"/>
-          </a:xfrm>
-          <a:prstGeom prst="rect">
-            <a:avLst/>
-          </a:prstGeom>
-          <a:ln cap="rnd">
-            <a:solidFill>
-              <a:schemeClr val="tx1"/>
-            </a:solidFill>
-          </a:ln>
-          <a:effectLst>
-            <a:outerShdw blurRad="88900" dist="114300" dir="2700000" algn="tl" rotWithShape="0">
-              <a:prstClr val="black">
-                <a:alpha val="43000"/>
-              </a:prstClr>
-            </a:outerShdw>
-          </a:effectLst>
-        </p:spPr>
-      </p:pic>
-      <p:sp>
-        <p:nvSpPr>
-          <p:cNvPr id="122" name="Text Box 372"/>
-          <p:cNvSpPr txBox="1">
-            <a:spLocks noChangeArrowheads="1"/>
-          </p:cNvSpPr>
-          <p:nvPr/>
-        </p:nvSpPr>
-        <p:spPr bwMode="auto">
-          <a:xfrm>
-            <a:off x="18578289" y="21758279"/>
-            <a:ext cx="7286676" cy="492443"/>
-          </a:xfrm>
-          <a:prstGeom prst="rect">
-            <a:avLst/>
-          </a:prstGeom>
-          <a:noFill/>
-          <a:ln>
-            <a:noFill/>
-          </a:ln>
-          <a:extLst>
-            <a:ext uri="{909E8E84-426E-40DD-AFC4-6F175D3DCCD1}">
-              <a14:hiddenFill xmlns="" xmlns:a14="http://schemas.microsoft.com/office/drawing/2010/main">
-                <a:solidFill>
-                  <a:srgbClr val="FFFFFF"/>
-                </a:solidFill>
-              </a14:hiddenFill>
-            </a:ext>
-            <a:ext uri="{91240B29-F687-4F45-9708-019B960494DF}">
-              <a14:hiddenLine xmlns="" xmlns:a14="http://schemas.microsoft.com/office/drawing/2010/main" w="9525" algn="ctr">
-                <a:solidFill>
-                  <a:srgbClr val="000000"/>
-                </a:solidFill>
-                <a:miter lim="800000"/>
-                <a:headEnd/>
-                <a:tailEnd/>
-              </a14:hiddenLine>
-            </a:ext>
-          </a:extLst>
-        </p:spPr>
-        <p:txBody>
-          <a:bodyPr wrap="square">
-            <a:spAutoFit/>
-          </a:bodyPr>
-          <a:lstStyle>
-            <a:lvl1pPr marL="9525" indent="-9525" defTabSz="863600" eaLnBrk="0" hangingPunct="0">
-              <a:defRPr sz="2300">
-                <a:solidFill>
-                  <a:schemeClr val="tx1"/>
-                </a:solidFill>
-                <a:latin typeface="Times New Roman" pitchFamily="18" charset="0"/>
-              </a:defRPr>
-            </a:lvl1pPr>
-            <a:lvl2pPr marL="1008063" indent="-285750" defTabSz="863600" eaLnBrk="0" hangingPunct="0">
-              <a:defRPr sz="2300">
-                <a:solidFill>
-                  <a:schemeClr val="tx1"/>
-                </a:solidFill>
-                <a:latin typeface="Times New Roman" pitchFamily="18" charset="0"/>
-              </a:defRPr>
-            </a:lvl2pPr>
-            <a:lvl3pPr marL="1416050" indent="-228600" defTabSz="863600" eaLnBrk="0" hangingPunct="0">
-              <a:defRPr sz="2300">
-                <a:solidFill>
-                  <a:schemeClr val="tx1"/>
-                </a:solidFill>
-                <a:latin typeface="Times New Roman" pitchFamily="18" charset="0"/>
-              </a:defRPr>
-            </a:lvl3pPr>
-            <a:lvl4pPr marL="1824038" indent="-228600" defTabSz="863600" eaLnBrk="0" hangingPunct="0">
-              <a:defRPr sz="2300">
-                <a:solidFill>
-                  <a:schemeClr val="tx1"/>
-                </a:solidFill>
-                <a:latin typeface="Times New Roman" pitchFamily="18" charset="0"/>
-              </a:defRPr>
-            </a:lvl4pPr>
-            <a:lvl5pPr marL="2232025" indent="-228600" defTabSz="863600" eaLnBrk="0" hangingPunct="0">
-              <a:defRPr sz="2300">
-                <a:solidFill>
-                  <a:schemeClr val="tx1"/>
-                </a:solidFill>
-                <a:latin typeface="Times New Roman" pitchFamily="18" charset="0"/>
-              </a:defRPr>
-            </a:lvl5pPr>
-            <a:lvl6pPr marL="2689225" indent="-228600" defTabSz="863600" eaLnBrk="0" fontAlgn="base" hangingPunct="0">
-              <a:spcBef>
-                <a:spcPct val="0"/>
-              </a:spcBef>
-              <a:spcAft>
-                <a:spcPct val="0"/>
-              </a:spcAft>
-              <a:defRPr sz="2300">
-                <a:solidFill>
-                  <a:schemeClr val="tx1"/>
-                </a:solidFill>
-                <a:latin typeface="Times New Roman" pitchFamily="18" charset="0"/>
-              </a:defRPr>
-            </a:lvl6pPr>
-            <a:lvl7pPr marL="3146425" indent="-228600" defTabSz="863600" eaLnBrk="0" fontAlgn="base" hangingPunct="0">
-              <a:spcBef>
-                <a:spcPct val="0"/>
-              </a:spcBef>
-              <a:spcAft>
-                <a:spcPct val="0"/>
-              </a:spcAft>
-              <a:defRPr sz="2300">
-                <a:solidFill>
-                  <a:schemeClr val="tx1"/>
-                </a:solidFill>
-                <a:latin typeface="Times New Roman" pitchFamily="18" charset="0"/>
-              </a:defRPr>
-            </a:lvl7pPr>
-            <a:lvl8pPr marL="3603625" indent="-228600" defTabSz="863600" eaLnBrk="0" fontAlgn="base" hangingPunct="0">
-              <a:spcBef>
-                <a:spcPct val="0"/>
-              </a:spcBef>
-              <a:spcAft>
-                <a:spcPct val="0"/>
-              </a:spcAft>
-              <a:defRPr sz="2300">
-                <a:solidFill>
-                  <a:schemeClr val="tx1"/>
-                </a:solidFill>
-                <a:latin typeface="Times New Roman" pitchFamily="18" charset="0"/>
-              </a:defRPr>
-            </a:lvl8pPr>
-            <a:lvl9pPr marL="4060825" indent="-228600" defTabSz="863600" eaLnBrk="0" fontAlgn="base" hangingPunct="0">
-              <a:spcBef>
-                <a:spcPct val="0"/>
-              </a:spcBef>
-              <a:spcAft>
-                <a:spcPct val="0"/>
-              </a:spcAft>
-              <a:defRPr sz="2300">
-                <a:solidFill>
-                  <a:schemeClr val="tx1"/>
-                </a:solidFill>
-                <a:latin typeface="Times New Roman" pitchFamily="18" charset="0"/>
-              </a:defRPr>
-            </a:lvl9pPr>
-          </a:lstStyle>
-          <a:p>
-            <a:pPr algn="just">
-              <a:buFont typeface="Wingdings" pitchFamily="2" charset="2"/>
-              <a:buNone/>
-            </a:pPr>
-            <a:r>
-              <a:rPr lang="pt-BR" sz="2600" i="1" dirty="0" smtClean="0">
-                <a:latin typeface="+mj-lt"/>
-              </a:rPr>
-              <a:t>Figura 3. Etapas para reconhecimento da placa</a:t>
-            </a:r>
-            <a:endParaRPr lang="pt-BR" sz="2600" i="1" dirty="0">
-              <a:latin typeface="+mj-lt"/>
-            </a:endParaRPr>
-          </a:p>
-        </p:txBody>
-      </p:sp>
-      <p:sp>
-        <p:nvSpPr>
-          <p:cNvPr id="126" name="Text Box 28"/>
-          <p:cNvSpPr txBox="1">
-            <a:spLocks noChangeArrowheads="1"/>
-          </p:cNvSpPr>
-          <p:nvPr/>
-        </p:nvSpPr>
-        <p:spPr bwMode="auto">
-          <a:xfrm>
-            <a:off x="1914425" y="22217093"/>
-            <a:ext cx="15573484" cy="584775"/>
-          </a:xfrm>
-          <a:prstGeom prst="rect">
-            <a:avLst/>
-          </a:prstGeom>
-          <a:noFill/>
-          <a:ln>
-            <a:noFill/>
-          </a:ln>
-          <a:extLst>
-            <a:ext uri="{909E8E84-426E-40DD-AFC4-6F175D3DCCD1}">
-              <a14:hiddenFill xmlns="" xmlns:a14="http://schemas.microsoft.com/office/drawing/2010/main">
-                <a:solidFill>
-                  <a:srgbClr val="FFFFFF"/>
-                </a:solidFill>
-              </a14:hiddenFill>
-            </a:ext>
-            <a:ext uri="{91240B29-F687-4F45-9708-019B960494DF}">
-              <a14:hiddenLine xmlns="" xmlns:a14="http://schemas.microsoft.com/office/drawing/2010/main" w="9525" algn="ctr">
-                <a:solidFill>
-                  <a:srgbClr val="000000"/>
-                </a:solidFill>
-                <a:miter lim="800000"/>
-                <a:headEnd/>
-                <a:tailEnd/>
-              </a14:hiddenLine>
-            </a:ext>
-          </a:extLst>
-        </p:spPr>
-        <p:txBody>
-          <a:bodyPr wrap="square">
-            <a:spAutoFit/>
-          </a:bodyPr>
-          <a:lstStyle>
-            <a:lvl1pPr defTabSz="863600" eaLnBrk="0" hangingPunct="0">
-              <a:defRPr sz="2300">
-                <a:solidFill>
-                  <a:schemeClr val="tx1"/>
-                </a:solidFill>
-                <a:latin typeface="Times New Roman" pitchFamily="18" charset="0"/>
-              </a:defRPr>
-            </a:lvl1pPr>
-            <a:lvl2pPr marL="742950" indent="-285750" defTabSz="863600" eaLnBrk="0" hangingPunct="0">
-              <a:defRPr sz="2300">
-                <a:solidFill>
-                  <a:schemeClr val="tx1"/>
-                </a:solidFill>
-                <a:latin typeface="Times New Roman" pitchFamily="18" charset="0"/>
-              </a:defRPr>
-            </a:lvl2pPr>
-            <a:lvl3pPr marL="1143000" indent="-228600" defTabSz="863600" eaLnBrk="0" hangingPunct="0">
-              <a:defRPr sz="2300">
-                <a:solidFill>
-                  <a:schemeClr val="tx1"/>
-                </a:solidFill>
-                <a:latin typeface="Times New Roman" pitchFamily="18" charset="0"/>
-              </a:defRPr>
-            </a:lvl3pPr>
-            <a:lvl4pPr marL="1600200" indent="-228600" defTabSz="863600" eaLnBrk="0" hangingPunct="0">
-              <a:defRPr sz="2300">
-                <a:solidFill>
-                  <a:schemeClr val="tx1"/>
-                </a:solidFill>
-                <a:latin typeface="Times New Roman" pitchFamily="18" charset="0"/>
-              </a:defRPr>
-            </a:lvl4pPr>
-            <a:lvl5pPr marL="2057400" indent="-228600" defTabSz="863600" eaLnBrk="0" hangingPunct="0">
-              <a:defRPr sz="2300">
-                <a:solidFill>
-                  <a:schemeClr val="tx1"/>
-                </a:solidFill>
-                <a:latin typeface="Times New Roman" pitchFamily="18" charset="0"/>
-              </a:defRPr>
-            </a:lvl5pPr>
-            <a:lvl6pPr marL="2514600" indent="-228600" defTabSz="863600" eaLnBrk="0" fontAlgn="base" hangingPunct="0">
-              <a:spcBef>
-                <a:spcPct val="0"/>
-              </a:spcBef>
-              <a:spcAft>
-                <a:spcPct val="0"/>
-              </a:spcAft>
-              <a:defRPr sz="2300">
-                <a:solidFill>
-                  <a:schemeClr val="tx1"/>
-                </a:solidFill>
-                <a:latin typeface="Times New Roman" pitchFamily="18" charset="0"/>
-              </a:defRPr>
-            </a:lvl6pPr>
-            <a:lvl7pPr marL="2971800" indent="-228600" defTabSz="863600" eaLnBrk="0" fontAlgn="base" hangingPunct="0">
-              <a:spcBef>
-                <a:spcPct val="0"/>
-              </a:spcBef>
-              <a:spcAft>
-                <a:spcPct val="0"/>
-              </a:spcAft>
-              <a:defRPr sz="2300">
-                <a:solidFill>
-                  <a:schemeClr val="tx1"/>
-                </a:solidFill>
-                <a:latin typeface="Times New Roman" pitchFamily="18" charset="0"/>
-              </a:defRPr>
-            </a:lvl7pPr>
-            <a:lvl8pPr marL="3429000" indent="-228600" defTabSz="863600" eaLnBrk="0" fontAlgn="base" hangingPunct="0">
-              <a:spcBef>
-                <a:spcPct val="0"/>
-              </a:spcBef>
-              <a:spcAft>
-                <a:spcPct val="0"/>
-              </a:spcAft>
-              <a:defRPr sz="2300">
-                <a:solidFill>
-                  <a:schemeClr val="tx1"/>
-                </a:solidFill>
-                <a:latin typeface="Times New Roman" pitchFamily="18" charset="0"/>
-              </a:defRPr>
-            </a:lvl8pPr>
-            <a:lvl9pPr marL="3886200" indent="-228600" defTabSz="863600" eaLnBrk="0" fontAlgn="base" hangingPunct="0">
-              <a:spcBef>
-                <a:spcPct val="0"/>
-              </a:spcBef>
-              <a:spcAft>
-                <a:spcPct val="0"/>
-              </a:spcAft>
-              <a:defRPr sz="2300">
-                <a:solidFill>
-                  <a:schemeClr val="tx1"/>
-                </a:solidFill>
-                <a:latin typeface="Times New Roman" pitchFamily="18" charset="0"/>
-              </a:defRPr>
-            </a:lvl9pPr>
-          </a:lstStyle>
-          <a:p>
-            <a:pPr algn="ctr"/>
-            <a:r>
-              <a:rPr lang="pt-BR" sz="3200" b="1" i="1" dirty="0" smtClean="0">
-                <a:latin typeface="+mj-lt"/>
-              </a:rPr>
-              <a:t>Extração da placa</a:t>
-            </a:r>
-            <a:endParaRPr lang="pt-BR" sz="3200" b="1" i="1" dirty="0">
-              <a:latin typeface="+mj-lt"/>
-            </a:endParaRPr>
           </a:p>
         </p:txBody>
       </p:sp>
@@ -9221,14 +5853,14 @@
           </a:ln>
           <a:extLst>
             <a:ext uri="{909E8E84-426E-40DD-AFC4-6F175D3DCCD1}">
-              <a14:hiddenFill xmlns="" xmlns:a14="http://schemas.microsoft.com/office/drawing/2010/main">
+              <a14:hiddenFill xmlns:a14="http://schemas.microsoft.com/office/drawing/2010/main" xmlns="">
                 <a:solidFill>
                   <a:srgbClr val="FFFFFF"/>
                 </a:solidFill>
               </a14:hiddenFill>
             </a:ext>
             <a:ext uri="{91240B29-F687-4F45-9708-019B960494DF}">
-              <a14:hiddenLine xmlns="" xmlns:a14="http://schemas.microsoft.com/office/drawing/2010/main" w="9525" algn="ctr">
+              <a14:hiddenLine xmlns:a14="http://schemas.microsoft.com/office/drawing/2010/main" xmlns="" w="9525" algn="ctr">
                 <a:solidFill>
                   <a:srgbClr val="000000"/>
                 </a:solidFill>
@@ -9364,428 +5996,6 @@
           </a:p>
         </p:txBody>
       </p:sp>
-      <p:pic>
-        <p:nvPicPr>
-          <p:cNvPr id="106" name="Imagem 105" descr="Segmentation(f5)1.png"/>
-          <p:cNvPicPr>
-            <a:picLocks noChangeAspect="1"/>
-          </p:cNvPicPr>
-          <p:nvPr/>
-        </p:nvPicPr>
-        <p:blipFill>
-          <a:blip r:embed="rId26" cstate="print"/>
-          <a:stretch>
-            <a:fillRect/>
-          </a:stretch>
-        </p:blipFill>
-        <p:spPr>
-          <a:xfrm>
-            <a:off x="11872067" y="23645852"/>
-            <a:ext cx="3123810" cy="279365"/>
-          </a:xfrm>
-          <a:prstGeom prst="rect">
-            <a:avLst/>
-          </a:prstGeom>
-          <a:effectLst>
-            <a:outerShdw blurRad="457200" dist="228600" dir="8100000" algn="tr" rotWithShape="0">
-              <a:prstClr val="black">
-                <a:alpha val="40000"/>
-              </a:prstClr>
-            </a:outerShdw>
-          </a:effectLst>
-        </p:spPr>
-      </p:pic>
-      <p:pic>
-        <p:nvPicPr>
-          <p:cNvPr id="108" name="Imagem 107" descr="Recognition_1.png"/>
-          <p:cNvPicPr>
-            <a:picLocks noChangeAspect="1"/>
-          </p:cNvPicPr>
-          <p:nvPr/>
-        </p:nvPicPr>
-        <p:blipFill>
-          <a:blip r:embed="rId27" cstate="print">
-            <a:lum bright="-10000" contrast="4000"/>
-          </a:blip>
-          <a:stretch>
-            <a:fillRect/>
-          </a:stretch>
-        </p:blipFill>
-        <p:spPr>
-          <a:xfrm>
-            <a:off x="19631049" y="17151381"/>
-            <a:ext cx="3123810" cy="279365"/>
-          </a:xfrm>
-          <a:prstGeom prst="rect">
-            <a:avLst/>
-          </a:prstGeom>
-          <a:ln w="15875">
-            <a:solidFill>
-              <a:schemeClr val="tx1"/>
-            </a:solidFill>
-            <a:prstDash val="dash"/>
-          </a:ln>
-          <a:effectLst>
-            <a:outerShdw blurRad="355600" dist="266700" dir="9000000" algn="ctr" rotWithShape="0">
-              <a:schemeClr val="bg2"/>
-            </a:outerShdw>
-          </a:effectLst>
-        </p:spPr>
-      </p:pic>
-      <p:pic>
-        <p:nvPicPr>
-          <p:cNvPr id="110" name="Imagem 109" descr="Segmentation(f5)1.png"/>
-          <p:cNvPicPr>
-            <a:picLocks noChangeAspect="1"/>
-          </p:cNvPicPr>
-          <p:nvPr/>
-        </p:nvPicPr>
-        <p:blipFill>
-          <a:blip r:embed="rId26" cstate="print">
-            <a:lum bright="-10000" contrast="4000"/>
-          </a:blip>
-          <a:stretch>
-            <a:fillRect/>
-          </a:stretch>
-        </p:blipFill>
-        <p:spPr>
-          <a:xfrm>
-            <a:off x="19559611" y="15073292"/>
-            <a:ext cx="3123810" cy="279365"/>
-          </a:xfrm>
-          <a:prstGeom prst="rect">
-            <a:avLst/>
-          </a:prstGeom>
-          <a:effectLst>
-            <a:outerShdw blurRad="355600" dist="266700" dir="9000000" algn="ctr" rotWithShape="0">
-              <a:schemeClr val="bg2"/>
-            </a:outerShdw>
-          </a:effectLst>
-        </p:spPr>
-      </p:pic>
-      <p:pic>
-        <p:nvPicPr>
-          <p:cNvPr id="111" name="Imagem 110" descr="Recognition.png"/>
-          <p:cNvPicPr>
-            <a:picLocks noChangeAspect="1"/>
-          </p:cNvPicPr>
-          <p:nvPr/>
-        </p:nvPicPr>
-        <p:blipFill>
-          <a:blip r:embed="rId28" cstate="print">
-            <a:lum bright="-22000" contrast="-9000"/>
-          </a:blip>
-          <a:stretch>
-            <a:fillRect/>
-          </a:stretch>
-        </p:blipFill>
-        <p:spPr>
-          <a:xfrm>
-            <a:off x="19488173" y="19145258"/>
-            <a:ext cx="3301588" cy="1092064"/>
-          </a:xfrm>
-          <a:prstGeom prst="rect">
-            <a:avLst/>
-          </a:prstGeom>
-          <a:effectLst/>
-        </p:spPr>
-      </p:pic>
-      <p:sp>
-        <p:nvSpPr>
-          <p:cNvPr id="139" name="Retângulo 138"/>
-          <p:cNvSpPr/>
-          <p:nvPr/>
-        </p:nvSpPr>
-        <p:spPr bwMode="auto">
-          <a:xfrm>
-            <a:off x="18630917" y="16502051"/>
-            <a:ext cx="12287336" cy="5143537"/>
-          </a:xfrm>
-          <a:prstGeom prst="rect">
-            <a:avLst/>
-          </a:prstGeom>
-          <a:noFill/>
-          <a:ln w="19050" cap="flat" cmpd="sng" algn="ctr">
-            <a:solidFill>
-              <a:schemeClr val="tx1"/>
-            </a:solidFill>
-            <a:prstDash val="dash"/>
-            <a:round/>
-            <a:headEnd type="none" w="med" len="med"/>
-            <a:tailEnd type="none" w="med" len="med"/>
-          </a:ln>
-          <a:effectLst/>
-        </p:spPr>
-        <p:txBody>
-          <a:bodyPr vert="horz" wrap="square" lIns="91440" tIns="45720" rIns="91440" bIns="45720" numCol="1" rtlCol="0" anchor="t" anchorCtr="0" compatLnSpc="1">
-            <a:prstTxWarp prst="textNoShape">
-              <a:avLst/>
-            </a:prstTxWarp>
-          </a:bodyPr>
-          <a:lstStyle/>
-          <a:p>
-            <a:pPr marL="0" marR="0" indent="0" algn="l" defTabSz="863600" rtl="0" eaLnBrk="0" fontAlgn="base" latinLnBrk="0" hangingPunct="0">
-              <a:lnSpc>
-                <a:spcPct val="100000"/>
-              </a:lnSpc>
-              <a:spcBef>
-                <a:spcPct val="0"/>
-              </a:spcBef>
-              <a:spcAft>
-                <a:spcPct val="0"/>
-              </a:spcAft>
-              <a:buClrTx/>
-              <a:buSzTx/>
-              <a:buFontTx/>
-              <a:buNone/>
-              <a:tabLst/>
-            </a:pPr>
-            <a:endParaRPr kumimoji="0" lang="pt-BR" sz="2300" b="0" i="0" u="none" strike="noStrike" cap="none" normalizeH="0" baseline="0" dirty="0" smtClean="0">
-              <a:ln>
-                <a:noFill/>
-              </a:ln>
-              <a:solidFill>
-                <a:schemeClr val="tx1"/>
-              </a:solidFill>
-              <a:effectLst/>
-              <a:latin typeface="Times New Roman" pitchFamily="18" charset="0"/>
-            </a:endParaRPr>
-          </a:p>
-        </p:txBody>
-      </p:sp>
-      <p:cxnSp>
-        <p:nvCxnSpPr>
-          <p:cNvPr id="188" name="Conector angulado 187"/>
-          <p:cNvCxnSpPr>
-            <a:endCxn id="29" idx="1"/>
-          </p:cNvCxnSpPr>
-          <p:nvPr/>
-        </p:nvCxnSpPr>
-        <p:spPr bwMode="auto">
-          <a:xfrm flipV="1">
-            <a:off x="11701431" y="17714168"/>
-            <a:ext cx="642942" cy="2398"/>
-          </a:xfrm>
-          <a:prstGeom prst="bentConnector3">
-            <a:avLst>
-              <a:gd name="adj1" fmla="val 50000"/>
-            </a:avLst>
-          </a:prstGeom>
-          <a:solidFill>
-            <a:schemeClr val="accent1"/>
-          </a:solidFill>
-          <a:ln w="9525" cap="flat" cmpd="sng" algn="ctr">
-            <a:solidFill>
-              <a:schemeClr val="tx1"/>
-            </a:solidFill>
-            <a:prstDash val="solid"/>
-            <a:round/>
-            <a:headEnd type="none" w="med" len="med"/>
-            <a:tailEnd type="arrow"/>
-          </a:ln>
-          <a:effectLst/>
-        </p:spPr>
-      </p:cxnSp>
-      <p:cxnSp>
-        <p:nvCxnSpPr>
-          <p:cNvPr id="195" name="Conector de seta reta 194"/>
-          <p:cNvCxnSpPr/>
-          <p:nvPr/>
-        </p:nvCxnSpPr>
-        <p:spPr bwMode="auto">
-          <a:xfrm rot="5400000">
-            <a:off x="14461412" y="19029277"/>
-            <a:ext cx="768170" cy="1588"/>
-          </a:xfrm>
-          <a:prstGeom prst="straightConnector1">
-            <a:avLst/>
-          </a:prstGeom>
-          <a:solidFill>
-            <a:schemeClr val="accent1"/>
-          </a:solidFill>
-          <a:ln w="9525" cap="flat" cmpd="sng" algn="ctr">
-            <a:solidFill>
-              <a:schemeClr val="tx1"/>
-            </a:solidFill>
-            <a:prstDash val="solid"/>
-            <a:round/>
-            <a:headEnd type="none" w="med" len="med"/>
-            <a:tailEnd type="arrow"/>
-          </a:ln>
-          <a:effectLst/>
-        </p:spPr>
-      </p:cxnSp>
-      <p:cxnSp>
-        <p:nvCxnSpPr>
-          <p:cNvPr id="225" name="Conector angulado 224"/>
-          <p:cNvCxnSpPr/>
-          <p:nvPr/>
-        </p:nvCxnSpPr>
-        <p:spPr bwMode="auto">
-          <a:xfrm rot="5400000">
-            <a:off x="5524211" y="31111782"/>
-            <a:ext cx="497240" cy="1507"/>
-          </a:xfrm>
-          <a:prstGeom prst="bentConnector3">
-            <a:avLst>
-              <a:gd name="adj1" fmla="val 50000"/>
-            </a:avLst>
-          </a:prstGeom>
-          <a:solidFill>
-            <a:schemeClr val="accent1"/>
-          </a:solidFill>
-          <a:ln w="9525" cap="flat" cmpd="sng" algn="ctr">
-            <a:solidFill>
-              <a:schemeClr val="tx1"/>
-            </a:solidFill>
-            <a:prstDash val="solid"/>
-            <a:round/>
-            <a:headEnd type="none" w="med" len="med"/>
-            <a:tailEnd type="arrow"/>
-          </a:ln>
-          <a:effectLst/>
-        </p:spPr>
-      </p:cxnSp>
-      <p:sp>
-        <p:nvSpPr>
-          <p:cNvPr id="237" name="CaixaDeTexto 236"/>
-          <p:cNvSpPr txBox="1"/>
-          <p:nvPr/>
-        </p:nvSpPr>
-        <p:spPr>
-          <a:xfrm>
-            <a:off x="19202421" y="16854582"/>
-            <a:ext cx="4071966" cy="1446550"/>
-          </a:xfrm>
-          <a:prstGeom prst="rect">
-            <a:avLst/>
-          </a:prstGeom>
-          <a:noFill/>
-          <a:ln w="3175">
-            <a:solidFill>
-              <a:schemeClr val="tx1"/>
-            </a:solidFill>
-          </a:ln>
-        </p:spPr>
-        <p:txBody>
-          <a:bodyPr wrap="square" rtlCol="0">
-            <a:spAutoFit/>
-          </a:bodyPr>
-          <a:lstStyle/>
-          <a:p>
-            <a:endParaRPr lang="pt-BR" dirty="0" smtClean="0">
-              <a:latin typeface="Arial" pitchFamily="34" charset="0"/>
-              <a:cs typeface="Arial" pitchFamily="34" charset="0"/>
-            </a:endParaRPr>
-          </a:p>
-          <a:p>
-            <a:endParaRPr lang="pt-BR" dirty="0" smtClean="0">
-              <a:latin typeface="Arial" pitchFamily="34" charset="0"/>
-              <a:cs typeface="Arial" pitchFamily="34" charset="0"/>
-            </a:endParaRPr>
-          </a:p>
-          <a:p>
-            <a:endParaRPr lang="pt-BR" sz="2100" dirty="0" smtClean="0">
-              <a:latin typeface="Arial" pitchFamily="34" charset="0"/>
-              <a:cs typeface="Arial" pitchFamily="34" charset="0"/>
-            </a:endParaRPr>
-          </a:p>
-          <a:p>
-            <a:r>
-              <a:rPr lang="pt-BR" sz="2100" dirty="0" smtClean="0">
-                <a:latin typeface="Arial" pitchFamily="34" charset="0"/>
-                <a:cs typeface="Arial" pitchFamily="34" charset="0"/>
-              </a:rPr>
-              <a:t>BUSCA POR TEMPLATE</a:t>
-            </a:r>
-            <a:endParaRPr lang="pt-BR" sz="2100" dirty="0" smtClean="0"/>
-          </a:p>
-        </p:txBody>
-      </p:sp>
-      <p:sp>
-        <p:nvSpPr>
-          <p:cNvPr id="238" name="CaixaDeTexto 237"/>
-          <p:cNvSpPr txBox="1"/>
-          <p:nvPr/>
-        </p:nvSpPr>
-        <p:spPr>
-          <a:xfrm>
-            <a:off x="19202421" y="14858978"/>
-            <a:ext cx="4071966" cy="1092607"/>
-          </a:xfrm>
-          <a:prstGeom prst="rect">
-            <a:avLst/>
-          </a:prstGeom>
-          <a:noFill/>
-          <a:ln w="3175">
-            <a:solidFill>
-              <a:schemeClr val="tx1"/>
-            </a:solidFill>
-          </a:ln>
-        </p:spPr>
-        <p:txBody>
-          <a:bodyPr wrap="square" rtlCol="0">
-            <a:spAutoFit/>
-          </a:bodyPr>
-          <a:lstStyle/>
-          <a:p>
-            <a:endParaRPr lang="pt-BR" dirty="0" smtClean="0">
-              <a:latin typeface="Arial" pitchFamily="34" charset="0"/>
-              <a:cs typeface="Arial" pitchFamily="34" charset="0"/>
-            </a:endParaRPr>
-          </a:p>
-          <a:p>
-            <a:endParaRPr lang="pt-BR" sz="2100" dirty="0" smtClean="0">
-              <a:latin typeface="Arial" pitchFamily="34" charset="0"/>
-              <a:cs typeface="Arial" pitchFamily="34" charset="0"/>
-            </a:endParaRPr>
-          </a:p>
-          <a:p>
-            <a:r>
-              <a:rPr lang="pt-BR" sz="2100" dirty="0" smtClean="0">
-                <a:latin typeface="Arial" pitchFamily="34" charset="0"/>
-                <a:cs typeface="Arial" pitchFamily="34" charset="0"/>
-              </a:rPr>
-              <a:t>IMAGEM DA PLACA</a:t>
-            </a:r>
-            <a:endParaRPr lang="pt-BR" sz="2100" dirty="0" smtClean="0"/>
-          </a:p>
-        </p:txBody>
-      </p:sp>
-      <p:cxnSp>
-        <p:nvCxnSpPr>
-          <p:cNvPr id="245" name="Conector angulado 244"/>
-          <p:cNvCxnSpPr>
-            <a:stCxn id="237" idx="2"/>
-            <a:endCxn id="119" idx="0"/>
-          </p:cNvCxnSpPr>
-          <p:nvPr/>
-        </p:nvCxnSpPr>
-        <p:spPr bwMode="auto">
-          <a:xfrm rot="5400000">
-            <a:off x="20887779" y="18651757"/>
-            <a:ext cx="701250" cy="1588"/>
-          </a:xfrm>
-          <a:prstGeom prst="bentConnector3">
-            <a:avLst>
-              <a:gd name="adj1" fmla="val 50000"/>
-            </a:avLst>
-          </a:prstGeom>
-          <a:solidFill>
-            <a:schemeClr val="accent1"/>
-          </a:solidFill>
-          <a:ln w="9525" cap="flat" cmpd="sng" algn="ctr">
-            <a:solidFill>
-              <a:schemeClr val="tx1"/>
-            </a:solidFill>
-            <a:prstDash val="solid"/>
-            <a:round/>
-            <a:headEnd type="none" w="med" len="med"/>
-            <a:tailEnd type="arrow"/>
-          </a:ln>
-          <a:effectLst/>
-        </p:spPr>
-      </p:cxnSp>
     </p:spTree>
   </p:cSld>
   <p:clrMapOvr>

</xml_diff>

<commit_message>
[CONC] Working on presentation/Banner
</commit_message>
<xml_diff>
--- a/presentation/banner-1.0.0.pptx
+++ b/presentation/banner-1.0.0.pptx
@@ -367,7 +367,7 @@
     </p:spTree>
     <p:extLst>
       <p:ext uri="{BB962C8B-B14F-4D97-AF65-F5344CB8AC3E}">
-        <p14:creationId xmlns:p14="http://schemas.microsoft.com/office/powerpoint/2010/main" xmlns="" val="1072203350"/>
+        <p14:creationId xmlns="" xmlns:p14="http://schemas.microsoft.com/office/powerpoint/2010/main" val="1072203350"/>
       </p:ext>
     </p:extLst>
   </p:cSld>
@@ -579,7 +579,7 @@
     </p:spTree>
     <p:extLst>
       <p:ext uri="{BB962C8B-B14F-4D97-AF65-F5344CB8AC3E}">
-        <p14:creationId xmlns:p14="http://schemas.microsoft.com/office/powerpoint/2010/main" xmlns="" val="2372154417"/>
+        <p14:creationId xmlns="" xmlns:p14="http://schemas.microsoft.com/office/powerpoint/2010/main" val="2372154417"/>
       </p:ext>
     </p:extLst>
   </p:cSld>
@@ -775,7 +775,7 @@
     </p:spTree>
     <p:extLst>
       <p:ext uri="{BB962C8B-B14F-4D97-AF65-F5344CB8AC3E}">
-        <p14:creationId xmlns:p14="http://schemas.microsoft.com/office/powerpoint/2010/main" xmlns="" val="190023816"/>
+        <p14:creationId xmlns="" xmlns:p14="http://schemas.microsoft.com/office/powerpoint/2010/main" val="190023816"/>
       </p:ext>
     </p:extLst>
   </p:cSld>
@@ -981,7 +981,7 @@
     </p:spTree>
     <p:extLst>
       <p:ext uri="{BB962C8B-B14F-4D97-AF65-F5344CB8AC3E}">
-        <p14:creationId xmlns:p14="http://schemas.microsoft.com/office/powerpoint/2010/main" xmlns="" val="1479007073"/>
+        <p14:creationId xmlns="" xmlns:p14="http://schemas.microsoft.com/office/powerpoint/2010/main" val="1479007073"/>
       </p:ext>
     </p:extLst>
   </p:cSld>
@@ -1177,7 +1177,7 @@
     </p:spTree>
     <p:extLst>
       <p:ext uri="{BB962C8B-B14F-4D97-AF65-F5344CB8AC3E}">
-        <p14:creationId xmlns:p14="http://schemas.microsoft.com/office/powerpoint/2010/main" xmlns="" val="61954085"/>
+        <p14:creationId xmlns="" xmlns:p14="http://schemas.microsoft.com/office/powerpoint/2010/main" val="61954085"/>
       </p:ext>
     </p:extLst>
   </p:cSld>
@@ -1395,7 +1395,7 @@
     </p:spTree>
     <p:extLst>
       <p:ext uri="{BB962C8B-B14F-4D97-AF65-F5344CB8AC3E}">
-        <p14:creationId xmlns:p14="http://schemas.microsoft.com/office/powerpoint/2010/main" xmlns="" val="3179605967"/>
+        <p14:creationId xmlns="" xmlns:p14="http://schemas.microsoft.com/office/powerpoint/2010/main" val="3179605967"/>
       </p:ext>
     </p:extLst>
   </p:cSld>
@@ -1709,7 +1709,7 @@
     </p:spTree>
     <p:extLst>
       <p:ext uri="{BB962C8B-B14F-4D97-AF65-F5344CB8AC3E}">
-        <p14:creationId xmlns:p14="http://schemas.microsoft.com/office/powerpoint/2010/main" xmlns="" val="4047622757"/>
+        <p14:creationId xmlns="" xmlns:p14="http://schemas.microsoft.com/office/powerpoint/2010/main" val="4047622757"/>
       </p:ext>
     </p:extLst>
   </p:cSld>
@@ -2162,7 +2162,7 @@
     </p:spTree>
     <p:extLst>
       <p:ext uri="{BB962C8B-B14F-4D97-AF65-F5344CB8AC3E}">
-        <p14:creationId xmlns:p14="http://schemas.microsoft.com/office/powerpoint/2010/main" xmlns="" val="3934125589"/>
+        <p14:creationId xmlns="" xmlns:p14="http://schemas.microsoft.com/office/powerpoint/2010/main" val="3934125589"/>
       </p:ext>
     </p:extLst>
   </p:cSld>
@@ -2306,7 +2306,7 @@
     </p:spTree>
     <p:extLst>
       <p:ext uri="{BB962C8B-B14F-4D97-AF65-F5344CB8AC3E}">
-        <p14:creationId xmlns:p14="http://schemas.microsoft.com/office/powerpoint/2010/main" xmlns="" val="202173028"/>
+        <p14:creationId xmlns="" xmlns:p14="http://schemas.microsoft.com/office/powerpoint/2010/main" val="202173028"/>
       </p:ext>
     </p:extLst>
   </p:cSld>
@@ -2427,7 +2427,7 @@
     </p:spTree>
     <p:extLst>
       <p:ext uri="{BB962C8B-B14F-4D97-AF65-F5344CB8AC3E}">
-        <p14:creationId xmlns:p14="http://schemas.microsoft.com/office/powerpoint/2010/main" xmlns="" val="807254810"/>
+        <p14:creationId xmlns="" xmlns:p14="http://schemas.microsoft.com/office/powerpoint/2010/main" val="807254810"/>
       </p:ext>
     </p:extLst>
   </p:cSld>
@@ -2730,7 +2730,7 @@
     </p:spTree>
     <p:extLst>
       <p:ext uri="{BB962C8B-B14F-4D97-AF65-F5344CB8AC3E}">
-        <p14:creationId xmlns:p14="http://schemas.microsoft.com/office/powerpoint/2010/main" xmlns="" val="950236474"/>
+        <p14:creationId xmlns="" xmlns:p14="http://schemas.microsoft.com/office/powerpoint/2010/main" val="950236474"/>
       </p:ext>
     </p:extLst>
   </p:cSld>
@@ -3010,7 +3010,7 @@
     </p:spTree>
     <p:extLst>
       <p:ext uri="{BB962C8B-B14F-4D97-AF65-F5344CB8AC3E}">
-        <p14:creationId xmlns:p14="http://schemas.microsoft.com/office/powerpoint/2010/main" xmlns="" val="3039278202"/>
+        <p14:creationId xmlns="" xmlns:p14="http://schemas.microsoft.com/office/powerpoint/2010/main" val="3039278202"/>
       </p:ext>
     </p:extLst>
   </p:cSld>
@@ -3085,14 +3085,14 @@
           </a:ln>
           <a:extLst>
             <a:ext uri="{909E8E84-426E-40DD-AFC4-6F175D3DCCD1}">
-              <a14:hiddenFill xmlns:a14="http://schemas.microsoft.com/office/drawing/2010/main" xmlns="">
+              <a14:hiddenFill xmlns="" xmlns:a14="http://schemas.microsoft.com/office/drawing/2010/main">
                 <a:solidFill>
                   <a:srgbClr val="FFFFFF"/>
                 </a:solidFill>
               </a14:hiddenFill>
             </a:ext>
             <a:ext uri="{91240B29-F687-4F45-9708-019B960494DF}">
-              <a14:hiddenLine xmlns:a14="http://schemas.microsoft.com/office/drawing/2010/main" xmlns="" w="9525">
+              <a14:hiddenLine xmlns="" xmlns:a14="http://schemas.microsoft.com/office/drawing/2010/main" w="9525">
                 <a:solidFill>
                   <a:srgbClr val="000000"/>
                 </a:solidFill>
@@ -3143,14 +3143,14 @@
           </a:ln>
           <a:extLst>
             <a:ext uri="{909E8E84-426E-40DD-AFC4-6F175D3DCCD1}">
-              <a14:hiddenFill xmlns:a14="http://schemas.microsoft.com/office/drawing/2010/main" xmlns="">
+              <a14:hiddenFill xmlns="" xmlns:a14="http://schemas.microsoft.com/office/drawing/2010/main">
                 <a:solidFill>
                   <a:srgbClr val="FFFFFF"/>
                 </a:solidFill>
               </a14:hiddenFill>
             </a:ext>
             <a:ext uri="{91240B29-F687-4F45-9708-019B960494DF}">
-              <a14:hiddenLine xmlns:a14="http://schemas.microsoft.com/office/drawing/2010/main" xmlns="" w="9525">
+              <a14:hiddenLine xmlns="" xmlns:a14="http://schemas.microsoft.com/office/drawing/2010/main" w="9525">
                 <a:solidFill>
                   <a:srgbClr val="000000"/>
                 </a:solidFill>
@@ -3802,14 +3802,14 @@
           </a:ln>
           <a:extLst>
             <a:ext uri="{909E8E84-426E-40DD-AFC4-6F175D3DCCD1}">
-              <a14:hiddenFill xmlns:a14="http://schemas.microsoft.com/office/drawing/2010/main" xmlns="">
+              <a14:hiddenFill xmlns="" xmlns:a14="http://schemas.microsoft.com/office/drawing/2010/main">
                 <a:solidFill>
                   <a:srgbClr val="FFFFFF"/>
                 </a:solidFill>
               </a14:hiddenFill>
             </a:ext>
             <a:ext uri="{91240B29-F687-4F45-9708-019B960494DF}">
-              <a14:hiddenLine xmlns:a14="http://schemas.microsoft.com/office/drawing/2010/main" xmlns="" w="9525">
+              <a14:hiddenLine xmlns="" xmlns:a14="http://schemas.microsoft.com/office/drawing/2010/main" w="9525">
                 <a:solidFill>
                   <a:srgbClr val="000000"/>
                 </a:solidFill>
@@ -4097,71 +4097,18 @@
                 <a:latin typeface="Arial" pitchFamily="34" charset="0"/>
                 <a:cs typeface="Arial" pitchFamily="34" charset="0"/>
               </a:rPr>
-              <a:t>	</a:t>
-            </a:r>
+              <a:t>	Dentro de um cenário de grande competitividade, e cada vez mais acirrada, as organizações buscam diferenciais para os seus produtos ou serviços. Obter um processo de qualidade que promove uma cultura organizacional de garantia e controle da qualidade dos seus produtos torna-se essencial. Empresas com esse tipo de certificado podem usufruir de um processo seguro, eficaz e controlado, capaz de disseminar uma cultura organizacional para gestão racional do desenvolvimento de seus produtos de software, além explorarem como apelo comercial.</a:t>
+            </a:r>
+          </a:p>
+          <a:p>
+            <a:pPr algn="just"/>
             <a:r>
               <a:rPr lang="pt-BR" sz="3200" dirty="0" smtClean="0">
                 <a:latin typeface="Arial" pitchFamily="34" charset="0"/>
                 <a:cs typeface="Arial" pitchFamily="34" charset="0"/>
               </a:rPr>
-              <a:t>Dentro de um cenário de grande competitividade, e cada vez mais acirrada, as organizações buscam diferenciais para os seus produtos ou </a:t>
-            </a:r>
-            <a:r>
-              <a:rPr lang="pt-BR" sz="3200" dirty="0" smtClean="0">
-                <a:latin typeface="Arial" pitchFamily="34" charset="0"/>
-                <a:cs typeface="Arial" pitchFamily="34" charset="0"/>
-              </a:rPr>
-              <a:t>serviços. </a:t>
-            </a:r>
-            <a:r>
-              <a:rPr lang="pt-BR" sz="3200" dirty="0" smtClean="0">
-                <a:latin typeface="Arial" pitchFamily="34" charset="0"/>
-                <a:cs typeface="Arial" pitchFamily="34" charset="0"/>
-              </a:rPr>
-              <a:t>Obter um processo de qualidade que promove uma cultura organizacional de garantia e controle da qualidade dos seus produtos torna-se essencial</a:t>
-            </a:r>
-            <a:r>
-              <a:rPr lang="pt-BR" sz="3200" dirty="0" smtClean="0">
-                <a:latin typeface="Arial" pitchFamily="34" charset="0"/>
-                <a:cs typeface="Arial" pitchFamily="34" charset="0"/>
-              </a:rPr>
-              <a:t>. </a:t>
-            </a:r>
-            <a:r>
-              <a:rPr lang="pt-BR" sz="3200" dirty="0" smtClean="0">
-                <a:latin typeface="Arial" pitchFamily="34" charset="0"/>
-                <a:cs typeface="Arial" pitchFamily="34" charset="0"/>
-              </a:rPr>
-              <a:t>Empresas com esse tipo de certificado podem usufruir de um processo seguro, eficaz e controlado, capaz de disseminar uma cultura organizacional para gestão racional do desenvolvimento de seus produtos de software, além explorarem como apelo comercial</a:t>
-            </a:r>
-            <a:r>
-              <a:rPr lang="pt-BR" sz="3200" dirty="0" smtClean="0">
-                <a:latin typeface="Arial" pitchFamily="34" charset="0"/>
-                <a:cs typeface="Arial" pitchFamily="34" charset="0"/>
-              </a:rPr>
-              <a:t>.</a:t>
-            </a:r>
-          </a:p>
-          <a:p>
-            <a:pPr algn="just"/>
-            <a:r>
-              <a:rPr lang="pt-BR" sz="3200" dirty="0" smtClean="0">
-                <a:latin typeface="Arial" pitchFamily="34" charset="0"/>
-                <a:cs typeface="Arial" pitchFamily="34" charset="0"/>
-              </a:rPr>
-              <a:t>	A qualidade de software é um processo sistemático que focaliza todas as etapas e artefatos produzidos com o objetivo de garantir conformidade de processos e produtos prevenindo e eliminando defeitos (BARTIÉ, 2002). De acordo com BARTIÉ é impossível obter um software de qualidade com processos de desenvolvimento frágeis e deficientes. Vemos então que qualidade de software está intrinsecamente ligada a qualidade dos processos de produção deste produto. Podemos estabelecer então duas dimensões fundamentais da qualidade do software: qualidade de processo e qualidade do </a:t>
-            </a:r>
-            <a:r>
-              <a:rPr lang="pt-BR" sz="3200" dirty="0" smtClean="0">
-                <a:latin typeface="Arial" pitchFamily="34" charset="0"/>
-                <a:cs typeface="Arial" pitchFamily="34" charset="0"/>
-              </a:rPr>
-              <a:t>produto.</a:t>
-            </a:r>
-            <a:endParaRPr lang="pt-BR" sz="3200" dirty="0" smtClean="0">
-              <a:latin typeface="Arial" pitchFamily="34" charset="0"/>
-              <a:cs typeface="Arial" pitchFamily="34" charset="0"/>
-            </a:endParaRPr>
+              <a:t>	A qualidade de software é um processo sistemático que focaliza todas as etapas e artefatos produzidos com o objetivo de garantir conformidade de processos e produtos prevenindo e eliminando defeitos (BARTIÉ, 2002). De acordo com BARTIÉ é impossível obter um software de qualidade com processos de desenvolvimento frágeis e deficientes. Vemos então que qualidade de software está intrinsecamente ligada a qualidade dos processos de produção deste produto. Podemos estabelecer então duas dimensões fundamentais da qualidade do software: qualidade de processo e qualidade do produto.</a:t>
+            </a:r>
           </a:p>
         </p:txBody>
       </p:sp>
@@ -4187,14 +4134,14 @@
           </a:ln>
           <a:extLst>
             <a:ext uri="{909E8E84-426E-40DD-AFC4-6F175D3DCCD1}">
-              <a14:hiddenFill xmlns:a14="http://schemas.microsoft.com/office/drawing/2010/main" xmlns="">
+              <a14:hiddenFill xmlns="" xmlns:a14="http://schemas.microsoft.com/office/drawing/2010/main">
                 <a:solidFill>
                   <a:srgbClr val="FFFFFF"/>
                 </a:solidFill>
               </a14:hiddenFill>
             </a:ext>
             <a:ext uri="{91240B29-F687-4F45-9708-019B960494DF}">
-              <a14:hiddenLine xmlns:a14="http://schemas.microsoft.com/office/drawing/2010/main" xmlns="" w="9525">
+              <a14:hiddenLine xmlns="" xmlns:a14="http://schemas.microsoft.com/office/drawing/2010/main" w="9525">
                 <a:solidFill>
                   <a:srgbClr val="000000"/>
                 </a:solidFill>
@@ -4238,14 +4185,14 @@
           </a:ln>
           <a:extLst>
             <a:ext uri="{909E8E84-426E-40DD-AFC4-6F175D3DCCD1}">
-              <a14:hiddenFill xmlns:a14="http://schemas.microsoft.com/office/drawing/2010/main" xmlns="">
+              <a14:hiddenFill xmlns="" xmlns:a14="http://schemas.microsoft.com/office/drawing/2010/main">
                 <a:solidFill>
                   <a:srgbClr val="FFFFFF"/>
                 </a:solidFill>
               </a14:hiddenFill>
             </a:ext>
             <a:ext uri="{91240B29-F687-4F45-9708-019B960494DF}">
-              <a14:hiddenLine xmlns:a14="http://schemas.microsoft.com/office/drawing/2010/main" xmlns="" w="9525">
+              <a14:hiddenLine xmlns="" xmlns:a14="http://schemas.microsoft.com/office/drawing/2010/main" w="9525">
                 <a:solidFill>
                   <a:srgbClr val="000000"/>
                 </a:solidFill>
@@ -4289,14 +4236,14 @@
           </a:ln>
           <a:extLst>
             <a:ext uri="{909E8E84-426E-40DD-AFC4-6F175D3DCCD1}">
-              <a14:hiddenFill xmlns:a14="http://schemas.microsoft.com/office/drawing/2010/main" xmlns="">
+              <a14:hiddenFill xmlns="" xmlns:a14="http://schemas.microsoft.com/office/drawing/2010/main">
                 <a:solidFill>
                   <a:srgbClr val="FFFFFF"/>
                 </a:solidFill>
               </a14:hiddenFill>
             </a:ext>
             <a:ext uri="{91240B29-F687-4F45-9708-019B960494DF}">
-              <a14:hiddenLine xmlns:a14="http://schemas.microsoft.com/office/drawing/2010/main" xmlns="" w="9525">
+              <a14:hiddenLine xmlns="" xmlns:a14="http://schemas.microsoft.com/office/drawing/2010/main" w="9525">
                 <a:solidFill>
                   <a:srgbClr val="000000"/>
                 </a:solidFill>
@@ -4498,7 +4445,7 @@
           <a:blip r:embed="rId2" cstate="print">
             <a:extLst>
               <a:ext uri="{28A0092B-C50C-407E-A947-70E740481C1C}">
-                <a14:useLocalDpi xmlns:a14="http://schemas.microsoft.com/office/drawing/2010/main" xmlns="" val="0"/>
+                <a14:useLocalDpi xmlns="" xmlns:a14="http://schemas.microsoft.com/office/drawing/2010/main" val="0"/>
               </a:ext>
             </a:extLst>
           </a:blip>
@@ -4521,14 +4468,14 @@
           </a:ln>
           <a:extLst>
             <a:ext uri="{909E8E84-426E-40DD-AFC4-6F175D3DCCD1}">
-              <a14:hiddenFill xmlns:a14="http://schemas.microsoft.com/office/drawing/2010/main" xmlns="">
+              <a14:hiddenFill xmlns="" xmlns:a14="http://schemas.microsoft.com/office/drawing/2010/main">
                 <a:solidFill>
                   <a:srgbClr val="FFFFFF"/>
                 </a:solidFill>
               </a14:hiddenFill>
             </a:ext>
             <a:ext uri="{91240B29-F687-4F45-9708-019B960494DF}">
-              <a14:hiddenLine xmlns:a14="http://schemas.microsoft.com/office/drawing/2010/main" xmlns="" w="9525">
+              <a14:hiddenLine xmlns="" xmlns:a14="http://schemas.microsoft.com/office/drawing/2010/main" w="9525">
                 <a:solidFill>
                   <a:srgbClr val="000000"/>
                 </a:solidFill>
@@ -4550,8 +4497,8 @@
         </p:nvSpPr>
         <p:spPr bwMode="auto">
           <a:xfrm>
-            <a:off x="17987975" y="28773290"/>
-            <a:ext cx="13430344" cy="6186309"/>
+            <a:off x="12457609" y="30675658"/>
+            <a:ext cx="18146016" cy="4093428"/>
           </a:xfrm>
           <a:prstGeom prst="rect">
             <a:avLst/>
@@ -4564,14 +4511,14 @@
           </a:ln>
           <a:extLst>
             <a:ext uri="{909E8E84-426E-40DD-AFC4-6F175D3DCCD1}">
-              <a14:hiddenFill xmlns:a14="http://schemas.microsoft.com/office/drawing/2010/main" xmlns="">
+              <a14:hiddenFill xmlns="" xmlns:a14="http://schemas.microsoft.com/office/drawing/2010/main">
                 <a:solidFill>
                   <a:srgbClr val="FFFFFF"/>
                 </a:solidFill>
               </a14:hiddenFill>
             </a:ext>
             <a:ext uri="{91240B29-F687-4F45-9708-019B960494DF}">
-              <a14:hiddenLine xmlns:a14="http://schemas.microsoft.com/office/drawing/2010/main" xmlns="" w="9525" algn="ctr">
+              <a14:hiddenLine xmlns="" xmlns:a14="http://schemas.microsoft.com/office/drawing/2010/main" w="9525" algn="ctr">
                 <a:solidFill>
                   <a:srgbClr val="000000"/>
                 </a:solidFill>
@@ -4685,7 +4632,11 @@
             </a:lvl9pPr>
           </a:lstStyle>
           <a:p>
-            <a:pPr algn="ctr"/>
+            <a:pPr algn="ctr">
+              <a:spcAft>
+                <a:spcPts val="4200"/>
+              </a:spcAft>
+            </a:pPr>
             <a:r>
               <a:rPr lang="en-US" sz="3600" b="1" dirty="0" err="1">
                 <a:latin typeface="Arial" charset="0"/>
@@ -4697,518 +4648,312 @@
             </a:endParaRPr>
           </a:p>
           <a:p>
-            <a:r>
-              <a:rPr lang="en-US" sz="2100" dirty="0">
-                <a:latin typeface="Arial" charset="0"/>
-              </a:rPr>
-              <a:t>[1]	</a:t>
-            </a:r>
-            <a:r>
-              <a:rPr lang="en-US" sz="2100" dirty="0" err="1">
-                <a:latin typeface="Arial" charset="0"/>
-              </a:rPr>
-              <a:t>Kwaśnicka</a:t>
-            </a:r>
-            <a:r>
-              <a:rPr lang="en-US" sz="2100" dirty="0">
-                <a:latin typeface="Arial" charset="0"/>
-              </a:rPr>
-              <a:t>, H. and </a:t>
-            </a:r>
-            <a:r>
-              <a:rPr lang="en-US" sz="2100" dirty="0" err="1">
-                <a:latin typeface="Arial" charset="0"/>
-              </a:rPr>
-              <a:t>Wawrzyniak</a:t>
-            </a:r>
-            <a:r>
-              <a:rPr lang="en-US" sz="2100" dirty="0">
-                <a:latin typeface="Arial" charset="0"/>
-              </a:rPr>
-              <a:t>, B., License plate recognition in camera pictures. Gliwice, Poland. November 13-15, </a:t>
+            <a:pPr>
+              <a:lnSpc>
+                <a:spcPct val="150000"/>
+              </a:lnSpc>
+              <a:buNone/>
+            </a:pPr>
+            <a:r>
+              <a:rPr lang="pt-BR" sz="2100" b="1" dirty="0" smtClean="0">
+                <a:latin typeface="Arial" pitchFamily="34" charset="0"/>
+                <a:cs typeface="Arial" pitchFamily="34" charset="0"/>
+              </a:rPr>
+              <a:t>BARTIÉ, </a:t>
+            </a:r>
+            <a:r>
+              <a:rPr lang="pt-BR" sz="2100" dirty="0" smtClean="0">
+                <a:latin typeface="Arial" pitchFamily="34" charset="0"/>
+                <a:cs typeface="Arial" pitchFamily="34" charset="0"/>
+              </a:rPr>
+              <a:t>Alexandre. Garantia da qualidade de software: adquirindo maturidade organizacional / Alexandre </a:t>
+            </a:r>
+            <a:r>
+              <a:rPr lang="pt-BR" sz="2100" dirty="0" err="1" smtClean="0">
+                <a:latin typeface="Arial" pitchFamily="34" charset="0"/>
+                <a:cs typeface="Arial" pitchFamily="34" charset="0"/>
+              </a:rPr>
+              <a:t>Bartié</a:t>
+            </a:r>
+            <a:r>
+              <a:rPr lang="pt-BR" sz="2100" dirty="0" smtClean="0">
+                <a:latin typeface="Arial" pitchFamily="34" charset="0"/>
+                <a:cs typeface="Arial" pitchFamily="34" charset="0"/>
+              </a:rPr>
+              <a:t> - Rio de Janeiro : </a:t>
+            </a:r>
+            <a:r>
+              <a:rPr lang="pt-BR" sz="2100" dirty="0" err="1" smtClean="0">
+                <a:latin typeface="Arial" pitchFamily="34" charset="0"/>
+                <a:cs typeface="Arial" pitchFamily="34" charset="0"/>
+              </a:rPr>
+              <a:t>Elisevier</a:t>
+            </a:r>
+            <a:r>
+              <a:rPr lang="pt-BR" sz="2100" dirty="0" smtClean="0">
+                <a:latin typeface="Arial" pitchFamily="34" charset="0"/>
+                <a:cs typeface="Arial" pitchFamily="34" charset="0"/>
+              </a:rPr>
+              <a:t> 2002.</a:t>
+            </a:r>
+          </a:p>
+          <a:p>
+            <a:pPr>
+              <a:lnSpc>
+                <a:spcPct val="150000"/>
+              </a:lnSpc>
+              <a:buNone/>
+            </a:pPr>
+            <a:r>
+              <a:rPr lang="pt-BR" sz="2100" b="1" dirty="0" smtClean="0">
+                <a:latin typeface="Arial" pitchFamily="34" charset="0"/>
+                <a:cs typeface="Arial" pitchFamily="34" charset="0"/>
+              </a:rPr>
+              <a:t>PRESSMAN</a:t>
+            </a:r>
+            <a:r>
+              <a:rPr lang="pt-BR" sz="2100" dirty="0" smtClean="0">
+                <a:latin typeface="Arial" pitchFamily="34" charset="0"/>
+                <a:cs typeface="Arial" pitchFamily="34" charset="0"/>
+              </a:rPr>
+              <a:t>, Roger S. Engenharia de Software: José Carlos Barbosa dos Santos - </a:t>
+            </a:r>
+            <a:r>
+              <a:rPr lang="pt-BR" sz="2100" dirty="0" err="1" smtClean="0">
+                <a:latin typeface="Arial" pitchFamily="34" charset="0"/>
+                <a:cs typeface="Arial" pitchFamily="34" charset="0"/>
+              </a:rPr>
+              <a:t>Sao</a:t>
+            </a:r>
+            <a:r>
+              <a:rPr lang="pt-BR" sz="2100" dirty="0" smtClean="0">
+                <a:latin typeface="Arial" pitchFamily="34" charset="0"/>
+                <a:cs typeface="Arial" pitchFamily="34" charset="0"/>
+              </a:rPr>
+              <a:t> Paulo : </a:t>
+            </a:r>
+            <a:r>
+              <a:rPr lang="pt-BR" sz="2100" dirty="0" err="1" smtClean="0">
+                <a:latin typeface="Arial" pitchFamily="34" charset="0"/>
+                <a:cs typeface="Arial" pitchFamily="34" charset="0"/>
+              </a:rPr>
+              <a:t>Person</a:t>
+            </a:r>
+            <a:r>
+              <a:rPr lang="pt-BR" sz="2100" dirty="0" smtClean="0">
+                <a:latin typeface="Arial" pitchFamily="34" charset="0"/>
+                <a:cs typeface="Arial" pitchFamily="34" charset="0"/>
+              </a:rPr>
+              <a:t> </a:t>
+            </a:r>
+            <a:r>
+              <a:rPr lang="pt-BR" sz="2100" dirty="0" err="1" smtClean="0">
+                <a:latin typeface="Arial" pitchFamily="34" charset="0"/>
+                <a:cs typeface="Arial" pitchFamily="34" charset="0"/>
+              </a:rPr>
+              <a:t>Makron</a:t>
+            </a:r>
+            <a:r>
+              <a:rPr lang="pt-BR" sz="2100" dirty="0" smtClean="0">
+                <a:latin typeface="Arial" pitchFamily="34" charset="0"/>
+                <a:cs typeface="Arial" pitchFamily="34" charset="0"/>
+              </a:rPr>
+              <a:t> Books, 1995.</a:t>
+            </a:r>
+          </a:p>
+          <a:p>
+            <a:pPr>
+              <a:lnSpc>
+                <a:spcPct val="150000"/>
+              </a:lnSpc>
+              <a:buNone/>
+            </a:pPr>
+            <a:r>
+              <a:rPr lang="en-US" sz="2100" b="1" dirty="0" smtClean="0">
+                <a:latin typeface="Arial" pitchFamily="34" charset="0"/>
+                <a:cs typeface="Arial" pitchFamily="34" charset="0"/>
+              </a:rPr>
+              <a:t>CMMI</a:t>
             </a:r>
             <a:r>
               <a:rPr lang="en-US" sz="2100" dirty="0" smtClean="0">
-                <a:latin typeface="Arial" charset="0"/>
-              </a:rPr>
-              <a:t>2002.</a:t>
-            </a:r>
-          </a:p>
-          <a:p>
-            <a:endParaRPr lang="en-US" sz="2100" dirty="0">
-              <a:latin typeface="Arial" charset="0"/>
-            </a:endParaRPr>
-          </a:p>
-          <a:p>
-            <a:r>
-              <a:rPr lang="en-US" sz="2100" dirty="0">
-                <a:latin typeface="Arial" charset="0"/>
-              </a:rPr>
-              <a:t>[2]	Kim, K.B. and Kim, D.S., Recognition of Car License Using Morphological Information and SOM Algorithm. Journal of Advanced Computational Intelligence and Intelligent in informatics. Vol. 8 No. 4, </a:t>
+                <a:latin typeface="Arial" pitchFamily="34" charset="0"/>
+                <a:cs typeface="Arial" pitchFamily="34" charset="0"/>
+              </a:rPr>
+              <a:t>, CMMI </a:t>
+            </a:r>
+            <a:r>
+              <a:rPr lang="en-US" sz="2100" i="1" dirty="0" smtClean="0">
+                <a:latin typeface="Arial" pitchFamily="34" charset="0"/>
+                <a:cs typeface="Arial" pitchFamily="34" charset="0"/>
+              </a:rPr>
+              <a:t>Product Team</a:t>
             </a:r>
             <a:r>
               <a:rPr lang="en-US" sz="2100" dirty="0" smtClean="0">
-                <a:latin typeface="Arial" charset="0"/>
-              </a:rPr>
-              <a:t>2004</a:t>
-            </a:r>
-            <a:r>
-              <a:rPr lang="pt-BR" sz="2100" dirty="0" smtClean="0">
-                <a:latin typeface="Arial" charset="0"/>
-              </a:rPr>
-              <a:t>.</a:t>
-            </a:r>
-          </a:p>
-          <a:p>
-            <a:endParaRPr lang="en-US" sz="2100" dirty="0" smtClean="0">
-              <a:latin typeface="Arial" pitchFamily="34" charset="0"/>
-              <a:cs typeface="Arial" pitchFamily="34" charset="0"/>
-            </a:endParaRPr>
-          </a:p>
-          <a:p>
+                <a:latin typeface="Arial" pitchFamily="34" charset="0"/>
+                <a:cs typeface="Arial" pitchFamily="34" charset="0"/>
+              </a:rPr>
+              <a:t>, </a:t>
+            </a:r>
+            <a:r>
+              <a:rPr lang="en-US" sz="2100" i="1" dirty="0" smtClean="0">
+                <a:latin typeface="+mj-lt"/>
+                <a:cs typeface="Arial" pitchFamily="34" charset="0"/>
+              </a:rPr>
+              <a:t>"CMMI for Development, Version 1.3"</a:t>
+            </a:r>
             <a:r>
               <a:rPr lang="en-US" sz="2100" dirty="0" smtClean="0">
-                <a:latin typeface="Arial" pitchFamily="34" charset="0"/>
-                <a:cs typeface="Arial" pitchFamily="34" charset="0"/>
-              </a:rPr>
-              <a:t>[3] 	</a:t>
+                <a:latin typeface="+mj-lt"/>
+                <a:cs typeface="Arial" pitchFamily="34" charset="0"/>
+              </a:rPr>
+              <a:t> Software Engineering Institute</a:t>
+            </a:r>
+            <a:r>
+              <a:rPr lang="en-US" sz="2100" dirty="0" smtClean="0">
+                <a:latin typeface="Arial" pitchFamily="34" charset="0"/>
+                <a:cs typeface="Arial" pitchFamily="34" charset="0"/>
+              </a:rPr>
+              <a:t>, Carnegie Mellon University, Pittsburgh, Pennsylvania, </a:t>
+            </a:r>
+            <a:r>
+              <a:rPr lang="en-US" sz="2100" i="1" dirty="0" smtClean="0">
+                <a:latin typeface="Arial" pitchFamily="34" charset="0"/>
+                <a:cs typeface="Arial" pitchFamily="34" charset="0"/>
+              </a:rPr>
+              <a:t>Technical Report </a:t>
+            </a:r>
+            <a:r>
+              <a:rPr lang="en-US" sz="2100" dirty="0" smtClean="0">
+                <a:latin typeface="Arial" pitchFamily="34" charset="0"/>
+                <a:cs typeface="Arial" pitchFamily="34" charset="0"/>
+              </a:rPr>
+              <a:t>CMU/SEI-2010-TR-033, 2010. </a:t>
+            </a:r>
+            <a:r>
+              <a:rPr lang="en-US" sz="2100" dirty="0" smtClean="0">
+                <a:latin typeface="Arial" pitchFamily="34" charset="0"/>
+                <a:cs typeface="Arial" pitchFamily="34" charset="0"/>
+              </a:rPr>
+              <a:t>http</a:t>
+            </a:r>
+            <a:r>
+              <a:rPr lang="en-US" sz="2100" dirty="0" smtClean="0">
+                <a:latin typeface="Arial" pitchFamily="34" charset="0"/>
+                <a:cs typeface="Arial" pitchFamily="34" charset="0"/>
+              </a:rPr>
+              <a:t>://resources.sei.cmu.edu/library/asset-view.cfm?AssetID=9661. </a:t>
             </a:r>
             <a:r>
               <a:rPr lang="en-US" sz="2100" dirty="0" err="1" smtClean="0">
                 <a:latin typeface="Arial" pitchFamily="34" charset="0"/>
                 <a:cs typeface="Arial" pitchFamily="34" charset="0"/>
               </a:rPr>
-              <a:t>Mahini</a:t>
+              <a:t>Acessado</a:t>
             </a:r>
             <a:r>
               <a:rPr lang="en-US" sz="2100" dirty="0" smtClean="0">
                 <a:latin typeface="Arial" pitchFamily="34" charset="0"/>
                 <a:cs typeface="Arial" pitchFamily="34" charset="0"/>
               </a:rPr>
-              <a:t>, H., </a:t>
+              <a:t> </a:t>
             </a:r>
             <a:r>
               <a:rPr lang="en-US" sz="2100" dirty="0" err="1" smtClean="0">
                 <a:latin typeface="Arial" pitchFamily="34" charset="0"/>
                 <a:cs typeface="Arial" pitchFamily="34" charset="0"/>
               </a:rPr>
-              <a:t>Kasaei</a:t>
+              <a:t>em</a:t>
             </a:r>
             <a:r>
               <a:rPr lang="en-US" sz="2100" dirty="0" smtClean="0">
                 <a:latin typeface="Arial" pitchFamily="34" charset="0"/>
                 <a:cs typeface="Arial" pitchFamily="34" charset="0"/>
               </a:rPr>
-              <a:t> S., </a:t>
+              <a:t> 13 </a:t>
             </a:r>
             <a:r>
               <a:rPr lang="en-US" sz="2100" dirty="0" err="1" smtClean="0">
                 <a:latin typeface="Arial" pitchFamily="34" charset="0"/>
                 <a:cs typeface="Arial" pitchFamily="34" charset="0"/>
               </a:rPr>
-              <a:t>Dorri</a:t>
+              <a:t>Março</a:t>
             </a:r>
             <a:r>
               <a:rPr lang="en-US" sz="2100" dirty="0" smtClean="0">
                 <a:latin typeface="Arial" pitchFamily="34" charset="0"/>
                 <a:cs typeface="Arial" pitchFamily="34" charset="0"/>
               </a:rPr>
-              <a:t>, F. and </a:t>
+              <a:t> 2015.</a:t>
+            </a:r>
+          </a:p>
+          <a:p>
+            <a:pPr>
+              <a:lnSpc>
+                <a:spcPct val="150000"/>
+              </a:lnSpc>
+              <a:buNone/>
+            </a:pPr>
+            <a:r>
+              <a:rPr lang="en-US" sz="2100" b="1" dirty="0" smtClean="0">
+                <a:latin typeface="Arial" pitchFamily="34" charset="0"/>
+                <a:cs typeface="Arial" pitchFamily="34" charset="0"/>
+              </a:rPr>
+              <a:t>MANUVANNAN</a:t>
+            </a:r>
+            <a:r>
+              <a:rPr lang="en-US" sz="2100" dirty="0" smtClean="0">
+                <a:latin typeface="Arial" pitchFamily="34" charset="0"/>
+                <a:cs typeface="Arial" pitchFamily="34" charset="0"/>
+              </a:rPr>
+              <a:t> Mr. S., </a:t>
+            </a:r>
+            <a:r>
+              <a:rPr lang="en-US" sz="2100" i="1" dirty="0" smtClean="0">
+                <a:latin typeface="+mn-lt"/>
+                <a:cs typeface="Arial" pitchFamily="34" charset="0"/>
+              </a:rPr>
+              <a:t>Software process and product quality assurance in IT organizations. International Journal of Computer Engineering</a:t>
+            </a:r>
+            <a:r>
+              <a:rPr lang="en-US" sz="2100" dirty="0" smtClean="0">
+                <a:latin typeface="Arial" pitchFamily="34" charset="0"/>
+                <a:cs typeface="Arial" pitchFamily="34" charset="0"/>
+              </a:rPr>
+              <a:t>. Volume 1, </a:t>
+            </a:r>
+            <a:r>
+              <a:rPr lang="en-US" sz="2100" i="1" dirty="0" smtClean="0">
+                <a:latin typeface="+mn-lt"/>
+                <a:cs typeface="Arial" pitchFamily="34" charset="0"/>
+              </a:rPr>
+              <a:t>Number 1, May - June (2010)</a:t>
+            </a:r>
+            <a:r>
+              <a:rPr lang="en-US" sz="2100" dirty="0" smtClean="0">
+                <a:latin typeface="Arial" pitchFamily="34" charset="0"/>
+                <a:cs typeface="Arial" pitchFamily="34" charset="0"/>
+              </a:rPr>
+              <a:t>, pp. 147-157. </a:t>
             </a:r>
             <a:r>
               <a:rPr lang="en-US" sz="2100" dirty="0" err="1" smtClean="0">
                 <a:latin typeface="Arial" pitchFamily="34" charset="0"/>
                 <a:cs typeface="Arial" pitchFamily="34" charset="0"/>
               </a:rPr>
-              <a:t>Dorri</a:t>
+              <a:t>Junho</a:t>
             </a:r>
             <a:r>
               <a:rPr lang="en-US" sz="2100" dirty="0" smtClean="0">
                 <a:latin typeface="Arial" pitchFamily="34" charset="0"/>
                 <a:cs typeface="Arial" pitchFamily="34" charset="0"/>
               </a:rPr>
-              <a:t>, F., </a:t>
-            </a:r>
-            <a:r>
-              <a:rPr lang="en-US" sz="2100" i="1" dirty="0" smtClean="0">
-                <a:latin typeface="Arial" pitchFamily="34" charset="0"/>
-                <a:cs typeface="Arial" pitchFamily="34" charset="0"/>
-              </a:rPr>
-              <a:t>An Efficient Features-Based License Plate Localization Method</a:t>
-            </a:r>
-            <a:r>
-              <a:rPr lang="en-US" sz="2100" dirty="0" smtClean="0">
-                <a:latin typeface="Arial" pitchFamily="34" charset="0"/>
-                <a:cs typeface="Arial" pitchFamily="34" charset="0"/>
-              </a:rPr>
-              <a:t>. 0-7695-2521-0/06/$20.00 (c) 2006 IEEE.</a:t>
+              <a:t> de 2010.</a:t>
             </a:r>
             <a:endParaRPr lang="pt-BR" sz="2100" dirty="0" smtClean="0">
               <a:latin typeface="Arial" pitchFamily="34" charset="0"/>
               <a:cs typeface="Arial" pitchFamily="34" charset="0"/>
-            </a:endParaRPr>
-          </a:p>
-          <a:p>
-            <a:endParaRPr lang="en-US" sz="2100" dirty="0" smtClean="0">
-              <a:latin typeface="Arial" pitchFamily="34" charset="0"/>
-              <a:cs typeface="Arial" pitchFamily="34" charset="0"/>
-            </a:endParaRPr>
-          </a:p>
-          <a:p>
-            <a:r>
-              <a:rPr lang="en-US" sz="2100" dirty="0" smtClean="0">
-                <a:latin typeface="Arial" pitchFamily="34" charset="0"/>
-                <a:cs typeface="Arial" pitchFamily="34" charset="0"/>
-              </a:rPr>
-              <a:t>[4]	</a:t>
-            </a:r>
-            <a:r>
-              <a:rPr lang="en-US" sz="2100" dirty="0" err="1" smtClean="0">
-                <a:latin typeface="Arial" pitchFamily="34" charset="0"/>
-                <a:cs typeface="Arial" pitchFamily="34" charset="0"/>
-              </a:rPr>
-              <a:t>Kasaei</a:t>
-            </a:r>
-            <a:r>
-              <a:rPr lang="en-US" sz="2100" dirty="0" smtClean="0">
-                <a:latin typeface="Arial" pitchFamily="34" charset="0"/>
-                <a:cs typeface="Arial" pitchFamily="34" charset="0"/>
-              </a:rPr>
-              <a:t>, S.H.M., </a:t>
-            </a:r>
-            <a:r>
-              <a:rPr lang="en-US" sz="2100" dirty="0" err="1" smtClean="0">
-                <a:latin typeface="Arial" pitchFamily="34" charset="0"/>
-                <a:cs typeface="Arial" pitchFamily="34" charset="0"/>
-              </a:rPr>
-              <a:t>Kasaei</a:t>
-            </a:r>
-            <a:r>
-              <a:rPr lang="en-US" sz="2100" dirty="0" smtClean="0">
-                <a:latin typeface="Arial" pitchFamily="34" charset="0"/>
-                <a:cs typeface="Arial" pitchFamily="34" charset="0"/>
-              </a:rPr>
-              <a:t>, S.M.M. and </a:t>
-            </a:r>
-            <a:r>
-              <a:rPr lang="en-US" sz="2100" dirty="0" err="1" smtClean="0">
-                <a:latin typeface="Arial" pitchFamily="34" charset="0"/>
-                <a:cs typeface="Arial" pitchFamily="34" charset="0"/>
-              </a:rPr>
-              <a:t>Monadjemi</a:t>
-            </a:r>
-            <a:r>
-              <a:rPr lang="en-US" sz="2100" dirty="0" smtClean="0">
-                <a:latin typeface="Arial" pitchFamily="34" charset="0"/>
-                <a:cs typeface="Arial" pitchFamily="34" charset="0"/>
-              </a:rPr>
-              <a:t>, S.A., </a:t>
-            </a:r>
-            <a:r>
-              <a:rPr lang="en-US" sz="2100" i="1" dirty="0" smtClean="0">
-                <a:latin typeface="Arial" pitchFamily="34" charset="0"/>
-                <a:cs typeface="Arial" pitchFamily="34" charset="0"/>
-              </a:rPr>
-              <a:t>A Novel Morphological Method for Detection and Recognition of Vehicle License Plates</a:t>
-            </a:r>
-            <a:r>
-              <a:rPr lang="en-US" sz="2100" dirty="0" smtClean="0">
-                <a:latin typeface="Arial" pitchFamily="34" charset="0"/>
-                <a:cs typeface="Arial" pitchFamily="34" charset="0"/>
-              </a:rPr>
-              <a:t>. American Journal of Applied Sciences 6 (12): 2066-2070, 2009.</a:t>
-            </a:r>
-          </a:p>
-          <a:p>
-            <a:endParaRPr lang="en-US" sz="2000" dirty="0" smtClean="0"/>
-          </a:p>
-          <a:p>
-            <a:r>
-              <a:rPr lang="en-US" sz="2100" dirty="0" smtClean="0">
-                <a:latin typeface="Arial" pitchFamily="34" charset="0"/>
-                <a:cs typeface="Arial" pitchFamily="34" charset="0"/>
-              </a:rPr>
-              <a:t>[5]	Gonzalez, R.C. and Woods, R. E., </a:t>
-            </a:r>
-            <a:r>
-              <a:rPr lang="en-US" sz="2100" i="1" dirty="0" smtClean="0">
-                <a:latin typeface="Arial" pitchFamily="34" charset="0"/>
-                <a:cs typeface="Arial" pitchFamily="34" charset="0"/>
-              </a:rPr>
-              <a:t>Digital Image Processing. 2</a:t>
-            </a:r>
-            <a:r>
-              <a:rPr lang="en-US" sz="2100" i="1" baseline="30000" dirty="0" smtClean="0">
-                <a:latin typeface="Arial" pitchFamily="34" charset="0"/>
-                <a:cs typeface="Arial" pitchFamily="34" charset="0"/>
-              </a:rPr>
-              <a:t>nd</a:t>
-            </a:r>
-            <a:r>
-              <a:rPr lang="en-US" sz="2100" dirty="0" smtClean="0">
-                <a:latin typeface="Arial" pitchFamily="34" charset="0"/>
-                <a:cs typeface="Arial" pitchFamily="34" charset="0"/>
-              </a:rPr>
-              <a:t>, New Jersey: Prentice Hall, 2002.</a:t>
-            </a:r>
-          </a:p>
-          <a:p>
-            <a:endParaRPr lang="en-US" sz="2100" dirty="0" smtClean="0">
-              <a:latin typeface="Arial" pitchFamily="34" charset="0"/>
-              <a:cs typeface="Arial" pitchFamily="34" charset="0"/>
-            </a:endParaRPr>
-          </a:p>
-          <a:p>
-            <a:r>
-              <a:rPr lang="pt-BR" sz="2100" dirty="0" smtClean="0">
-                <a:latin typeface="Arial" pitchFamily="34" charset="0"/>
-                <a:cs typeface="Arial" pitchFamily="34" charset="0"/>
-              </a:rPr>
-              <a:t>[6]	</a:t>
-            </a:r>
-            <a:r>
-              <a:rPr lang="pt-BR" sz="2100" dirty="0" err="1" smtClean="0">
-                <a:latin typeface="Arial" pitchFamily="34" charset="0"/>
-                <a:cs typeface="Arial" pitchFamily="34" charset="0"/>
-              </a:rPr>
-              <a:t>Guingo</a:t>
-            </a:r>
-            <a:r>
-              <a:rPr lang="pt-BR" sz="2100" dirty="0" smtClean="0">
-                <a:latin typeface="Arial" pitchFamily="34" charset="0"/>
-                <a:cs typeface="Arial" pitchFamily="34" charset="0"/>
-              </a:rPr>
-              <a:t>, </a:t>
-            </a:r>
-            <a:r>
-              <a:rPr lang="pt-BR" sz="2100" dirty="0" err="1" smtClean="0">
-                <a:latin typeface="Arial" pitchFamily="34" charset="0"/>
-                <a:cs typeface="Arial" pitchFamily="34" charset="0"/>
-              </a:rPr>
-              <a:t>B.C.</a:t>
-            </a:r>
-            <a:r>
-              <a:rPr lang="pt-BR" sz="2100" dirty="0" smtClean="0">
-                <a:latin typeface="Arial" pitchFamily="34" charset="0"/>
-                <a:cs typeface="Arial" pitchFamily="34" charset="0"/>
-              </a:rPr>
-              <a:t>, Rodrigues, </a:t>
-            </a:r>
-            <a:r>
-              <a:rPr lang="pt-BR" sz="2100" dirty="0" err="1" smtClean="0">
-                <a:latin typeface="Arial" pitchFamily="34" charset="0"/>
-                <a:cs typeface="Arial" pitchFamily="34" charset="0"/>
-              </a:rPr>
-              <a:t>R.J.</a:t>
-            </a:r>
-            <a:r>
-              <a:rPr lang="pt-BR" sz="2100" dirty="0" smtClean="0">
-                <a:latin typeface="Arial" pitchFamily="34" charset="0"/>
-                <a:cs typeface="Arial" pitchFamily="34" charset="0"/>
-              </a:rPr>
-              <a:t> e Thomé, </a:t>
-            </a:r>
-            <a:r>
-              <a:rPr lang="pt-BR" sz="2100" dirty="0" err="1" smtClean="0">
-                <a:latin typeface="Arial" pitchFamily="34" charset="0"/>
-                <a:cs typeface="Arial" pitchFamily="34" charset="0"/>
-              </a:rPr>
-              <a:t>A.C.G.</a:t>
-            </a:r>
-            <a:r>
-              <a:rPr lang="pt-BR" sz="2100" dirty="0" smtClean="0">
-                <a:latin typeface="Arial" pitchFamily="34" charset="0"/>
-                <a:cs typeface="Arial" pitchFamily="34" charset="0"/>
-              </a:rPr>
-              <a:t>. </a:t>
-            </a:r>
-            <a:r>
-              <a:rPr lang="pt-BR" sz="2100" i="1" dirty="0" smtClean="0">
-                <a:latin typeface="Arial" pitchFamily="34" charset="0"/>
-                <a:cs typeface="Arial" pitchFamily="34" charset="0"/>
-              </a:rPr>
-              <a:t>Reconhecimento automático de placas de veículos automotores através de Redes Neurais artificiais.</a:t>
-            </a:r>
-            <a:r>
-              <a:rPr lang="pt-BR" sz="2100" dirty="0" smtClean="0">
-                <a:latin typeface="Arial" pitchFamily="34" charset="0"/>
-                <a:cs typeface="Arial" pitchFamily="34" charset="0"/>
-              </a:rPr>
-              <a:t> Área de Ensino e Pesquisa, NCE/IM. Universidade Federal do Rio de Janeiro, 2002.</a:t>
-            </a:r>
-            <a:endParaRPr lang="en-US" sz="2100" dirty="0">
-              <a:latin typeface="Arial" pitchFamily="34" charset="0"/>
-              <a:cs typeface="Arial" pitchFamily="34" charset="0"/>
-            </a:endParaRPr>
-          </a:p>
-        </p:txBody>
-      </p:sp>
-      <p:sp>
-        <p:nvSpPr>
-          <p:cNvPr id="2065" name="Text Box 28"/>
-          <p:cNvSpPr txBox="1">
-            <a:spLocks noChangeArrowheads="1"/>
-          </p:cNvSpPr>
-          <p:nvPr/>
-        </p:nvSpPr>
-        <p:spPr bwMode="auto">
-          <a:xfrm>
-            <a:off x="17930217" y="22359968"/>
-            <a:ext cx="13465496" cy="2831544"/>
-          </a:xfrm>
-          <a:prstGeom prst="rect">
-            <a:avLst/>
-          </a:prstGeom>
-          <a:noFill/>
-          <a:ln w="12700">
-            <a:solidFill>
-              <a:schemeClr val="tx1"/>
-            </a:solidFill>
-          </a:ln>
-          <a:extLst>
-            <a:ext uri="{909E8E84-426E-40DD-AFC4-6F175D3DCCD1}">
-              <a14:hiddenFill xmlns:a14="http://schemas.microsoft.com/office/drawing/2010/main" xmlns="">
-                <a:solidFill>
-                  <a:srgbClr val="FFFFFF"/>
-                </a:solidFill>
-              </a14:hiddenFill>
-            </a:ext>
-            <a:ext uri="{91240B29-F687-4F45-9708-019B960494DF}">
-              <a14:hiddenLine xmlns:a14="http://schemas.microsoft.com/office/drawing/2010/main" xmlns="" w="9525" algn="ctr">
-                <a:solidFill>
-                  <a:srgbClr val="000000"/>
-                </a:solidFill>
-                <a:miter lim="800000"/>
-                <a:headEnd/>
-                <a:tailEnd/>
-              </a14:hiddenLine>
-            </a:ext>
-          </a:extLst>
-        </p:spPr>
-        <p:txBody>
-          <a:bodyPr wrap="square">
-            <a:spAutoFit/>
-          </a:bodyPr>
-          <a:lstStyle>
-            <a:lvl1pPr defTabSz="863600" eaLnBrk="0" hangingPunct="0">
-              <a:defRPr sz="2300">
-                <a:solidFill>
-                  <a:schemeClr val="tx1"/>
-                </a:solidFill>
-                <a:latin typeface="Times New Roman" pitchFamily="18" charset="0"/>
-              </a:defRPr>
-            </a:lvl1pPr>
-            <a:lvl2pPr marL="742950" indent="-285750" defTabSz="863600" eaLnBrk="0" hangingPunct="0">
-              <a:defRPr sz="2300">
-                <a:solidFill>
-                  <a:schemeClr val="tx1"/>
-                </a:solidFill>
-                <a:latin typeface="Times New Roman" pitchFamily="18" charset="0"/>
-              </a:defRPr>
-            </a:lvl2pPr>
-            <a:lvl3pPr marL="1143000" indent="-228600" defTabSz="863600" eaLnBrk="0" hangingPunct="0">
-              <a:defRPr sz="2300">
-                <a:solidFill>
-                  <a:schemeClr val="tx1"/>
-                </a:solidFill>
-                <a:latin typeface="Times New Roman" pitchFamily="18" charset="0"/>
-              </a:defRPr>
-            </a:lvl3pPr>
-            <a:lvl4pPr marL="1600200" indent="-228600" defTabSz="863600" eaLnBrk="0" hangingPunct="0">
-              <a:defRPr sz="2300">
-                <a:solidFill>
-                  <a:schemeClr val="tx1"/>
-                </a:solidFill>
-                <a:latin typeface="Times New Roman" pitchFamily="18" charset="0"/>
-              </a:defRPr>
-            </a:lvl4pPr>
-            <a:lvl5pPr marL="2057400" indent="-228600" defTabSz="863600" eaLnBrk="0" hangingPunct="0">
-              <a:defRPr sz="2300">
-                <a:solidFill>
-                  <a:schemeClr val="tx1"/>
-                </a:solidFill>
-                <a:latin typeface="Times New Roman" pitchFamily="18" charset="0"/>
-              </a:defRPr>
-            </a:lvl5pPr>
-            <a:lvl6pPr marL="2514600" indent="-228600" defTabSz="863600" eaLnBrk="0" fontAlgn="base" hangingPunct="0">
-              <a:spcBef>
-                <a:spcPct val="0"/>
-              </a:spcBef>
-              <a:spcAft>
-                <a:spcPct val="0"/>
-              </a:spcAft>
-              <a:defRPr sz="2300">
-                <a:solidFill>
-                  <a:schemeClr val="tx1"/>
-                </a:solidFill>
-                <a:latin typeface="Times New Roman" pitchFamily="18" charset="0"/>
-              </a:defRPr>
-            </a:lvl6pPr>
-            <a:lvl7pPr marL="2971800" indent="-228600" defTabSz="863600" eaLnBrk="0" fontAlgn="base" hangingPunct="0">
-              <a:spcBef>
-                <a:spcPct val="0"/>
-              </a:spcBef>
-              <a:spcAft>
-                <a:spcPct val="0"/>
-              </a:spcAft>
-              <a:defRPr sz="2300">
-                <a:solidFill>
-                  <a:schemeClr val="tx1"/>
-                </a:solidFill>
-                <a:latin typeface="Times New Roman" pitchFamily="18" charset="0"/>
-              </a:defRPr>
-            </a:lvl7pPr>
-            <a:lvl8pPr marL="3429000" indent="-228600" defTabSz="863600" eaLnBrk="0" fontAlgn="base" hangingPunct="0">
-              <a:spcBef>
-                <a:spcPct val="0"/>
-              </a:spcBef>
-              <a:spcAft>
-                <a:spcPct val="0"/>
-              </a:spcAft>
-              <a:defRPr sz="2300">
-                <a:solidFill>
-                  <a:schemeClr val="tx1"/>
-                </a:solidFill>
-                <a:latin typeface="Times New Roman" pitchFamily="18" charset="0"/>
-              </a:defRPr>
-            </a:lvl8pPr>
-            <a:lvl9pPr marL="3886200" indent="-228600" defTabSz="863600" eaLnBrk="0" fontAlgn="base" hangingPunct="0">
-              <a:spcBef>
-                <a:spcPct val="0"/>
-              </a:spcBef>
-              <a:spcAft>
-                <a:spcPct val="0"/>
-              </a:spcAft>
-              <a:defRPr sz="2300">
-                <a:solidFill>
-                  <a:schemeClr val="tx1"/>
-                </a:solidFill>
-                <a:latin typeface="Times New Roman" pitchFamily="18" charset="0"/>
-              </a:defRPr>
-            </a:lvl9pPr>
-          </a:lstStyle>
-          <a:p>
-            <a:pPr algn="ctr"/>
-            <a:r>
-              <a:rPr lang="pt-BR" sz="4800" b="1" dirty="0" smtClean="0">
-                <a:latin typeface="Arial" charset="0"/>
-              </a:rPr>
-              <a:t>Resultados</a:t>
-            </a:r>
-            <a:endParaRPr lang="pt-BR" sz="4800" dirty="0" smtClean="0">
-              <a:latin typeface="Arial" charset="0"/>
-            </a:endParaRPr>
-          </a:p>
-          <a:p>
-            <a:pPr algn="just"/>
-            <a:r>
-              <a:rPr lang="pt-BR" sz="3200" dirty="0" smtClean="0">
-                <a:latin typeface="Arial" charset="0"/>
-              </a:rPr>
-              <a:t>	Foram obtidos bons índices de acertos  nas  etapas de extração e reconhecimento. Com isso  os resultados de ambas as etapas, são considerados expressivos visto a complexidade do problema em relação ao nível de amadurecimento da pesquisa. </a:t>
-            </a:r>
-            <a:endParaRPr lang="pt-BR" sz="3200" dirty="0">
-              <a:latin typeface="Arial" charset="0"/>
             </a:endParaRPr>
           </a:p>
         </p:txBody>
@@ -5223,8 +4968,8 @@
         </p:nvSpPr>
         <p:spPr bwMode="auto">
           <a:xfrm>
-            <a:off x="1872433" y="14977915"/>
-            <a:ext cx="10657184" cy="6324808"/>
+            <a:off x="1800425" y="14257834"/>
+            <a:ext cx="10441160" cy="6324808"/>
           </a:xfrm>
           <a:prstGeom prst="rect">
             <a:avLst/>
@@ -5238,14 +4983,14 @@
           </a:ln>
           <a:extLst>
             <a:ext uri="{909E8E84-426E-40DD-AFC4-6F175D3DCCD1}">
-              <a14:hiddenFill xmlns:a14="http://schemas.microsoft.com/office/drawing/2010/main" xmlns="">
+              <a14:hiddenFill xmlns="" xmlns:a14="http://schemas.microsoft.com/office/drawing/2010/main">
                 <a:solidFill>
                   <a:srgbClr val="FFFFFF"/>
                 </a:solidFill>
               </a14:hiddenFill>
             </a:ext>
             <a:ext uri="{91240B29-F687-4F45-9708-019B960494DF}">
-              <a14:hiddenLine xmlns:a14="http://schemas.microsoft.com/office/drawing/2010/main" xmlns="" w="9525" algn="ctr">
+              <a14:hiddenLine xmlns="" xmlns:a14="http://schemas.microsoft.com/office/drawing/2010/main" w="9525" algn="ctr">
                 <a:solidFill>
                   <a:srgbClr val="000000"/>
                 </a:solidFill>
@@ -5384,49 +5129,7 @@
                 <a:latin typeface="Arial" pitchFamily="34" charset="0"/>
                 <a:cs typeface="Arial" pitchFamily="34" charset="0"/>
               </a:rPr>
-              <a:t>Neste </a:t>
-            </a:r>
-            <a:r>
-              <a:rPr lang="pt-BR" sz="3200" dirty="0" smtClean="0">
-                <a:latin typeface="Arial" pitchFamily="34" charset="0"/>
-                <a:cs typeface="Arial" pitchFamily="34" charset="0"/>
-              </a:rPr>
-              <a:t>trabalho é </a:t>
-            </a:r>
-            <a:r>
-              <a:rPr lang="pt-BR" sz="3200" dirty="0" smtClean="0">
-                <a:latin typeface="Arial" pitchFamily="34" charset="0"/>
-                <a:cs typeface="Arial" pitchFamily="34" charset="0"/>
-              </a:rPr>
-              <a:t>apresentado </a:t>
-            </a:r>
-            <a:r>
-              <a:rPr lang="pt-BR" sz="3200" dirty="0" smtClean="0">
-                <a:latin typeface="Arial" pitchFamily="34" charset="0"/>
-                <a:cs typeface="Arial" pitchFamily="34" charset="0"/>
-              </a:rPr>
-              <a:t>uma visão geral sobre o processo de garantia da qualidade de software propondo um guia geral para estabelecer um conjunto de papéis e atividades com o objetivo de fornecer um guia para as empresas que buscam estabelecer qualidade nos processos de construção de software. </a:t>
-            </a:r>
-            <a:r>
-              <a:rPr lang="pt-BR" sz="3200" dirty="0" smtClean="0">
-                <a:latin typeface="Arial" pitchFamily="34" charset="0"/>
-                <a:cs typeface="Arial" pitchFamily="34" charset="0"/>
-              </a:rPr>
-              <a:t>É descrito </a:t>
-            </a:r>
-            <a:r>
-              <a:rPr lang="pt-BR" sz="3200" dirty="0" smtClean="0">
-                <a:latin typeface="Arial" pitchFamily="34" charset="0"/>
-                <a:cs typeface="Arial" pitchFamily="34" charset="0"/>
-              </a:rPr>
-              <a:t>com ênfase o modelo CMMI-DEV, considerado um dos melhores modelos de qualidade para empresas de produtos e serviços, sendo também utilizado como base para o método proposto</a:t>
-            </a:r>
-            <a:r>
-              <a:rPr lang="pt-BR" sz="3200" dirty="0" smtClean="0">
-                <a:latin typeface="Arial" pitchFamily="34" charset="0"/>
-                <a:cs typeface="Arial" pitchFamily="34" charset="0"/>
-              </a:rPr>
-              <a:t>.</a:t>
+              <a:t>Neste trabalho é apresentado uma visão geral sobre o processo de garantia da qualidade de software propondo um guia geral para estabelecer um conjunto de papéis e atividades com o objetivo de fornecer um guia para as empresas que buscam estabelecer qualidade nos processos de construção de software. É descrito com ênfase o modelo CMMI-DEV, considerado um dos melhores modelos de qualidade para empresas de produtos e serviços, sendo também utilizado como base para o método proposto.</a:t>
             </a:r>
             <a:endParaRPr lang="pt-BR" sz="3200" dirty="0">
               <a:latin typeface="Arial" pitchFamily="34" charset="0"/>
@@ -5462,7 +5165,7 @@
           </a:ln>
           <a:extLst>
             <a:ext uri="{909E8E84-426E-40DD-AFC4-6F175D3DCCD1}">
-              <a14:hiddenFill xmlns:a14="http://schemas.microsoft.com/office/drawing/2010/main" xmlns="">
+              <a14:hiddenFill xmlns="" xmlns:a14="http://schemas.microsoft.com/office/drawing/2010/main">
                 <a:solidFill>
                   <a:srgbClr val="FFFFFF"/>
                 </a:solidFill>
@@ -5493,8 +5196,8 @@
         </p:nvSpPr>
         <p:spPr bwMode="auto">
           <a:xfrm>
-            <a:off x="1872433" y="27230195"/>
-            <a:ext cx="16262978" cy="1815882"/>
+            <a:off x="12457609" y="14257834"/>
+            <a:ext cx="18146241" cy="16173658"/>
           </a:xfrm>
           <a:prstGeom prst="rect">
             <a:avLst/>
@@ -5511,14 +5214,14 @@
           </a:ln>
           <a:extLst>
             <a:ext uri="{909E8E84-426E-40DD-AFC4-6F175D3DCCD1}">
-              <a14:hiddenFill xmlns:a14="http://schemas.microsoft.com/office/drawing/2010/main" xmlns="">
+              <a14:hiddenFill xmlns="" xmlns:a14="http://schemas.microsoft.com/office/drawing/2010/main">
                 <a:solidFill>
                   <a:srgbClr val="FFFFFF"/>
                 </a:solidFill>
               </a14:hiddenFill>
             </a:ext>
             <a:ext uri="{91240B29-F687-4F45-9708-019B960494DF}">
-              <a14:hiddenLine xmlns:a14="http://schemas.microsoft.com/office/drawing/2010/main" xmlns="" w="9525" algn="ctr">
+              <a14:hiddenLine xmlns="" xmlns:a14="http://schemas.microsoft.com/office/drawing/2010/main" w="9525" algn="ctr">
                 <a:solidFill>
                   <a:srgbClr val="000000"/>
                 </a:solidFill>
@@ -5632,16 +5335,17 @@
             </a:lvl9pPr>
           </a:lstStyle>
           <a:p>
-            <a:pPr algn="ctr"/>
-            <a:r>
-              <a:rPr lang="pt-BR" sz="4800" b="1" dirty="0" smtClean="0">
+            <a:pPr algn="ctr">
+              <a:spcAft>
+                <a:spcPts val="4200"/>
+              </a:spcAft>
+            </a:pPr>
+            <a:r>
+              <a:rPr lang="pt-BR" sz="5000" b="1" dirty="0" smtClean="0">
                 <a:latin typeface="Arial" charset="0"/>
               </a:rPr>
               <a:t>Método proposto</a:t>
             </a:r>
-            <a:endParaRPr lang="pt-BR" sz="3200" b="1" dirty="0" smtClean="0">
-              <a:latin typeface="Arial" charset="0"/>
-            </a:endParaRPr>
           </a:p>
           <a:p>
             <a:pPr algn="just">
@@ -5652,180 +5356,480 @@
               <a:rPr lang="pt-BR" sz="3200" dirty="0" smtClean="0">
                 <a:latin typeface="Arial" charset="0"/>
               </a:rPr>
-              <a:t>		O método proposto consiste em duas etapas principais: (1) Extração da placa de licenciamento do veículo e (2) reconhecimento, conforme a figura 1.</a:t>
-            </a:r>
-            <a:endParaRPr lang="pt-BR" sz="3200" dirty="0"/>
-          </a:p>
-        </p:txBody>
-      </p:sp>
-      <p:sp>
-        <p:nvSpPr>
-          <p:cNvPr id="200" name="Text Box 372"/>
-          <p:cNvSpPr txBox="1">
-            <a:spLocks noChangeArrowheads="1"/>
-          </p:cNvSpPr>
-          <p:nvPr/>
-        </p:nvSpPr>
-        <p:spPr bwMode="auto">
-          <a:xfrm>
-            <a:off x="1800425" y="29235498"/>
-            <a:ext cx="16273808" cy="1569660"/>
-          </a:xfrm>
-          <a:prstGeom prst="rect">
-            <a:avLst/>
-          </a:prstGeom>
-          <a:solidFill>
-            <a:schemeClr val="bg1">
-              <a:alpha val="42000"/>
-            </a:schemeClr>
-          </a:solidFill>
-          <a:ln w="9525">
-            <a:solidFill>
-              <a:schemeClr val="tx1"/>
-            </a:solidFill>
-          </a:ln>
-          <a:extLst>
-            <a:ext uri="{909E8E84-426E-40DD-AFC4-6F175D3DCCD1}">
-              <a14:hiddenFill xmlns:a14="http://schemas.microsoft.com/office/drawing/2010/main" xmlns="">
-                <a:solidFill>
-                  <a:srgbClr val="FFFFFF"/>
-                </a:solidFill>
-              </a14:hiddenFill>
-            </a:ext>
-            <a:ext uri="{91240B29-F687-4F45-9708-019B960494DF}">
-              <a14:hiddenLine xmlns:a14="http://schemas.microsoft.com/office/drawing/2010/main" xmlns="" w="9525" algn="ctr">
-                <a:solidFill>
-                  <a:srgbClr val="000000"/>
-                </a:solidFill>
-                <a:miter lim="800000"/>
-                <a:headEnd/>
-                <a:tailEnd/>
-              </a14:hiddenLine>
-            </a:ext>
-          </a:extLst>
-        </p:spPr>
-        <p:txBody>
-          <a:bodyPr wrap="square">
-            <a:spAutoFit/>
-          </a:bodyPr>
-          <a:lstStyle>
-            <a:lvl1pPr marL="9525" indent="-9525" defTabSz="863600" eaLnBrk="0" hangingPunct="0">
-              <a:defRPr sz="2300">
-                <a:solidFill>
-                  <a:schemeClr val="tx1"/>
-                </a:solidFill>
-                <a:latin typeface="Times New Roman" pitchFamily="18" charset="0"/>
-              </a:defRPr>
-            </a:lvl1pPr>
-            <a:lvl2pPr marL="1008063" indent="-285750" defTabSz="863600" eaLnBrk="0" hangingPunct="0">
-              <a:defRPr sz="2300">
-                <a:solidFill>
-                  <a:schemeClr val="tx1"/>
-                </a:solidFill>
-                <a:latin typeface="Times New Roman" pitchFamily="18" charset="0"/>
-              </a:defRPr>
-            </a:lvl2pPr>
-            <a:lvl3pPr marL="1416050" indent="-228600" defTabSz="863600" eaLnBrk="0" hangingPunct="0">
-              <a:defRPr sz="2300">
-                <a:solidFill>
-                  <a:schemeClr val="tx1"/>
-                </a:solidFill>
-                <a:latin typeface="Times New Roman" pitchFamily="18" charset="0"/>
-              </a:defRPr>
-            </a:lvl3pPr>
-            <a:lvl4pPr marL="1824038" indent="-228600" defTabSz="863600" eaLnBrk="0" hangingPunct="0">
-              <a:defRPr sz="2300">
-                <a:solidFill>
-                  <a:schemeClr val="tx1"/>
-                </a:solidFill>
-                <a:latin typeface="Times New Roman" pitchFamily="18" charset="0"/>
-              </a:defRPr>
-            </a:lvl4pPr>
-            <a:lvl5pPr marL="2232025" indent="-228600" defTabSz="863600" eaLnBrk="0" hangingPunct="0">
-              <a:defRPr sz="2300">
-                <a:solidFill>
-                  <a:schemeClr val="tx1"/>
-                </a:solidFill>
-                <a:latin typeface="Times New Roman" pitchFamily="18" charset="0"/>
-              </a:defRPr>
-            </a:lvl5pPr>
-            <a:lvl6pPr marL="2689225" indent="-228600" defTabSz="863600" eaLnBrk="0" fontAlgn="base" hangingPunct="0">
-              <a:spcBef>
-                <a:spcPct val="0"/>
-              </a:spcBef>
-              <a:spcAft>
-                <a:spcPct val="0"/>
-              </a:spcAft>
-              <a:defRPr sz="2300">
-                <a:solidFill>
-                  <a:schemeClr val="tx1"/>
-                </a:solidFill>
-                <a:latin typeface="Times New Roman" pitchFamily="18" charset="0"/>
-              </a:defRPr>
-            </a:lvl6pPr>
-            <a:lvl7pPr marL="3146425" indent="-228600" defTabSz="863600" eaLnBrk="0" fontAlgn="base" hangingPunct="0">
-              <a:spcBef>
-                <a:spcPct val="0"/>
-              </a:spcBef>
-              <a:spcAft>
-                <a:spcPct val="0"/>
-              </a:spcAft>
-              <a:defRPr sz="2300">
-                <a:solidFill>
-                  <a:schemeClr val="tx1"/>
-                </a:solidFill>
-                <a:latin typeface="Times New Roman" pitchFamily="18" charset="0"/>
-              </a:defRPr>
-            </a:lvl7pPr>
-            <a:lvl8pPr marL="3603625" indent="-228600" defTabSz="863600" eaLnBrk="0" fontAlgn="base" hangingPunct="0">
-              <a:spcBef>
-                <a:spcPct val="0"/>
-              </a:spcBef>
-              <a:spcAft>
-                <a:spcPct val="0"/>
-              </a:spcAft>
-              <a:defRPr sz="2300">
-                <a:solidFill>
-                  <a:schemeClr val="tx1"/>
-                </a:solidFill>
-                <a:latin typeface="Times New Roman" pitchFamily="18" charset="0"/>
-              </a:defRPr>
-            </a:lvl8pPr>
-            <a:lvl9pPr marL="4060825" indent="-228600" defTabSz="863600" eaLnBrk="0" fontAlgn="base" hangingPunct="0">
-              <a:spcBef>
-                <a:spcPct val="0"/>
-              </a:spcBef>
-              <a:spcAft>
-                <a:spcPct val="0"/>
-              </a:spcAft>
-              <a:defRPr sz="2300">
-                <a:solidFill>
-                  <a:schemeClr val="tx1"/>
-                </a:solidFill>
-                <a:latin typeface="Times New Roman" pitchFamily="18" charset="0"/>
-              </a:defRPr>
-            </a:lvl9pPr>
-          </a:lstStyle>
-          <a:p>
-            <a:pPr marL="514350" indent="-514350" algn="just">
+              <a:t>		</a:t>
+            </a:r>
+            <a:r>
+              <a:rPr lang="pt-BR" sz="3200" dirty="0" smtClean="0">
+                <a:latin typeface="Arial" pitchFamily="34" charset="0"/>
+                <a:cs typeface="Arial" pitchFamily="34" charset="0"/>
+              </a:rPr>
+              <a:t>É proposta </a:t>
+            </a:r>
+            <a:r>
+              <a:rPr lang="pt-BR" sz="3200" dirty="0" smtClean="0">
+                <a:latin typeface="Arial" pitchFamily="34" charset="0"/>
+                <a:cs typeface="Arial" pitchFamily="34" charset="0"/>
+              </a:rPr>
+              <a:t>uma estrutura de </a:t>
+            </a:r>
+            <a:r>
+              <a:rPr lang="pt-BR" sz="3200" dirty="0" smtClean="0">
+                <a:latin typeface="Arial" pitchFamily="34" charset="0"/>
+                <a:cs typeface="Arial" pitchFamily="34" charset="0"/>
+              </a:rPr>
+              <a:t>artefatos e </a:t>
+            </a:r>
+            <a:r>
+              <a:rPr lang="pt-BR" sz="3200" dirty="0" smtClean="0">
+                <a:latin typeface="Arial" pitchFamily="34" charset="0"/>
+                <a:cs typeface="Arial" pitchFamily="34" charset="0"/>
+              </a:rPr>
+              <a:t>atividades, para que se tenha um guia inicial, uma visão </a:t>
+            </a:r>
+            <a:r>
+              <a:rPr lang="pt-BR" sz="3200" dirty="0" smtClean="0">
+                <a:latin typeface="Arial" pitchFamily="34" charset="0"/>
+                <a:cs typeface="Arial" pitchFamily="34" charset="0"/>
+              </a:rPr>
+              <a:t>geral para estabelecer um processo de garantia da qualidade de Software, em conformidade com o modelo de referência CMMI-DEV. </a:t>
+            </a:r>
+          </a:p>
+          <a:p>
+            <a:pPr algn="just">
               <a:buFont typeface="Wingdings" pitchFamily="2" charset="2"/>
+              <a:buNone/>
+            </a:pPr>
+            <a:r>
+              <a:rPr lang="pt-BR" sz="3200" dirty="0" smtClean="0">
+                <a:latin typeface="Arial" pitchFamily="34" charset="0"/>
+                <a:cs typeface="Arial" pitchFamily="34" charset="0"/>
+              </a:rPr>
+              <a:t>		O modelo </a:t>
+            </a:r>
+            <a:r>
+              <a:rPr lang="pt-BR" sz="3200" dirty="0" smtClean="0">
+                <a:latin typeface="Arial" pitchFamily="34" charset="0"/>
+                <a:cs typeface="Arial" pitchFamily="34" charset="0"/>
+              </a:rPr>
+              <a:t>propõe a criação de um órgão ou departamento com papéis e responsabilidade independente da área de produção ou desenvolvimento do </a:t>
+            </a:r>
+            <a:r>
+              <a:rPr lang="pt-BR" sz="3200" dirty="0" smtClean="0">
+                <a:latin typeface="Arial" pitchFamily="34" charset="0"/>
+                <a:cs typeface="Arial" pitchFamily="34" charset="0"/>
+              </a:rPr>
+              <a:t>produto de software </a:t>
+            </a:r>
+            <a:r>
+              <a:rPr lang="pt-BR" sz="3200" dirty="0" smtClean="0">
+                <a:latin typeface="Arial" pitchFamily="34" charset="0"/>
+                <a:cs typeface="Arial" pitchFamily="34" charset="0"/>
+              </a:rPr>
+              <a:t>a fim de executar um conjunto de processos estabelecidos pela </a:t>
+            </a:r>
+            <a:r>
+              <a:rPr lang="pt-BR" sz="3200" dirty="0" smtClean="0">
+                <a:latin typeface="Arial" pitchFamily="34" charset="0"/>
+                <a:cs typeface="Arial" pitchFamily="34" charset="0"/>
+              </a:rPr>
+              <a:t>organização. </a:t>
+            </a:r>
+            <a:r>
+              <a:rPr lang="pt-BR" sz="3200" dirty="0" smtClean="0">
+                <a:latin typeface="Arial" pitchFamily="34" charset="0"/>
+                <a:cs typeface="Arial" pitchFamily="34" charset="0"/>
+              </a:rPr>
+              <a:t>para que esteja em conformidade com as práticas específicas contidas na área de processo PPQA do CMMI-DEV (CMMI, 2010</a:t>
+            </a:r>
+            <a:r>
+              <a:rPr lang="pt-BR" sz="3200" dirty="0" smtClean="0">
+                <a:latin typeface="Arial" pitchFamily="34" charset="0"/>
+                <a:cs typeface="Arial" pitchFamily="34" charset="0"/>
+              </a:rPr>
+              <a:t>).</a:t>
+            </a:r>
+          </a:p>
+          <a:p>
+            <a:pPr algn="just">
+              <a:buFont typeface="Wingdings" pitchFamily="2" charset="2"/>
+              <a:buNone/>
+            </a:pPr>
+            <a:r>
+              <a:rPr lang="pt-BR" sz="3200" dirty="0" smtClean="0">
+                <a:latin typeface="Arial" pitchFamily="34" charset="0"/>
+                <a:cs typeface="Arial" pitchFamily="34" charset="0"/>
+              </a:rPr>
+              <a:t>	</a:t>
+            </a:r>
+            <a:r>
+              <a:rPr lang="pt-BR" sz="3200" dirty="0" smtClean="0">
+                <a:latin typeface="Arial" pitchFamily="34" charset="0"/>
+                <a:cs typeface="Arial" pitchFamily="34" charset="0"/>
+              </a:rPr>
+              <a:t>	Artefatos: </a:t>
+            </a:r>
+            <a:r>
+              <a:rPr lang="pt-BR" sz="3200" dirty="0" smtClean="0">
+                <a:latin typeface="Arial" pitchFamily="34" charset="0"/>
+                <a:cs typeface="Arial" pitchFamily="34" charset="0"/>
+              </a:rPr>
+              <a:t>podem </a:t>
+            </a:r>
+            <a:r>
+              <a:rPr lang="pt-BR" sz="3200" dirty="0" smtClean="0">
+                <a:latin typeface="Arial" pitchFamily="34" charset="0"/>
+                <a:cs typeface="Arial" pitchFamily="34" charset="0"/>
+              </a:rPr>
+              <a:t>ser classificados em 02 (dois) tipos. Entrada e </a:t>
+            </a:r>
+            <a:r>
+              <a:rPr lang="pt-BR" sz="3200" dirty="0" smtClean="0">
+                <a:latin typeface="Arial" pitchFamily="34" charset="0"/>
+                <a:cs typeface="Arial" pitchFamily="34" charset="0"/>
+              </a:rPr>
+              <a:t>Saída.</a:t>
+            </a:r>
+          </a:p>
+          <a:p>
+            <a:pPr lvl="2"/>
+            <a:r>
+              <a:rPr lang="pt-BR" sz="3200" b="1" dirty="0" smtClean="0">
+                <a:latin typeface="Arial" pitchFamily="34" charset="0"/>
+                <a:cs typeface="Arial" pitchFamily="34" charset="0"/>
+              </a:rPr>
+              <a:t>Entrada</a:t>
+            </a:r>
+            <a:r>
+              <a:rPr lang="pt-BR" sz="3200" dirty="0" smtClean="0">
+                <a:latin typeface="Arial" pitchFamily="34" charset="0"/>
+                <a:cs typeface="Arial" pitchFamily="34" charset="0"/>
+              </a:rPr>
+              <a:t>:</a:t>
+            </a:r>
+          </a:p>
+          <a:p>
+            <a:pPr lvl="4"/>
+            <a:r>
+              <a:rPr lang="pt-BR" sz="3200" dirty="0" smtClean="0">
+                <a:latin typeface="Arial" pitchFamily="34" charset="0"/>
+                <a:cs typeface="Arial" pitchFamily="34" charset="0"/>
+              </a:rPr>
+              <a:t>Plano de projeto (PRPL)</a:t>
+            </a:r>
+          </a:p>
+          <a:p>
+            <a:pPr lvl="4"/>
+            <a:r>
+              <a:rPr lang="pt-BR" sz="3200" dirty="0" smtClean="0">
+                <a:latin typeface="Arial" pitchFamily="34" charset="0"/>
+                <a:cs typeface="Arial" pitchFamily="34" charset="0"/>
+              </a:rPr>
+              <a:t>Documentação de processos (PDOC)</a:t>
+            </a:r>
+          </a:p>
+          <a:p>
+            <a:pPr lvl="4"/>
+            <a:r>
+              <a:rPr lang="en-US" sz="3200" i="1" dirty="0" smtClean="0">
+                <a:latin typeface="Arial" pitchFamily="34" charset="0"/>
+                <a:cs typeface="Arial" pitchFamily="34" charset="0"/>
+              </a:rPr>
+              <a:t>Checklist</a:t>
+            </a:r>
+            <a:r>
+              <a:rPr lang="en-US" sz="3200" dirty="0" smtClean="0">
+                <a:latin typeface="Arial" pitchFamily="34" charset="0"/>
+                <a:cs typeface="Arial" pitchFamily="34" charset="0"/>
+              </a:rPr>
+              <a:t> (P-CHK)</a:t>
+            </a:r>
+            <a:endParaRPr lang="pt-BR" sz="3200" dirty="0" smtClean="0">
+              <a:latin typeface="Arial" pitchFamily="34" charset="0"/>
+              <a:cs typeface="Arial" pitchFamily="34" charset="0"/>
+            </a:endParaRPr>
+          </a:p>
+          <a:p>
+            <a:pPr lvl="2"/>
+            <a:r>
+              <a:rPr lang="pt-BR" sz="3200" dirty="0" smtClean="0">
+                <a:latin typeface="Arial" pitchFamily="34" charset="0"/>
+                <a:cs typeface="Arial" pitchFamily="34" charset="0"/>
+              </a:rPr>
+              <a:t>	</a:t>
+            </a:r>
+            <a:r>
+              <a:rPr lang="pt-BR" sz="3200" b="1" dirty="0" smtClean="0">
+                <a:latin typeface="Arial" pitchFamily="34" charset="0"/>
+                <a:cs typeface="Arial" pitchFamily="34" charset="0"/>
+              </a:rPr>
+              <a:t>Saída:</a:t>
+            </a:r>
+            <a:endParaRPr lang="pt-BR" sz="3200" dirty="0" smtClean="0">
+              <a:latin typeface="Arial" pitchFamily="34" charset="0"/>
+              <a:cs typeface="Arial" pitchFamily="34" charset="0"/>
+            </a:endParaRPr>
+          </a:p>
+          <a:p>
+            <a:pPr lvl="4"/>
+            <a:r>
+              <a:rPr lang="pt-BR" sz="3200" dirty="0" smtClean="0">
+                <a:latin typeface="Arial" pitchFamily="34" charset="0"/>
+                <a:cs typeface="Arial" pitchFamily="34" charset="0"/>
+              </a:rPr>
+              <a:t>Plano de qualidade (QAPL)</a:t>
+            </a:r>
+          </a:p>
+          <a:p>
+            <a:pPr lvl="4"/>
+            <a:r>
+              <a:rPr lang="pt-BR" sz="3200" dirty="0" smtClean="0">
+                <a:latin typeface="Arial" pitchFamily="34" charset="0"/>
+                <a:cs typeface="Arial" pitchFamily="34" charset="0"/>
+              </a:rPr>
+              <a:t>Relatório periódico da Garantia da Qualidade (RP-STQA)</a:t>
+            </a:r>
+          </a:p>
+          <a:p>
+            <a:pPr lvl="4"/>
+            <a:r>
+              <a:rPr lang="pt-BR" sz="3200" dirty="0" smtClean="0">
+                <a:latin typeface="Arial" pitchFamily="34" charset="0"/>
+                <a:cs typeface="Arial" pitchFamily="34" charset="0"/>
+              </a:rPr>
+              <a:t>Relatório de não conformidades (RP-NC)</a:t>
+            </a:r>
+          </a:p>
+          <a:p>
+            <a:pPr lvl="4"/>
+            <a:r>
+              <a:rPr lang="pt-BR" sz="3200" dirty="0" smtClean="0">
+                <a:latin typeface="Arial" pitchFamily="34" charset="0"/>
+                <a:cs typeface="Arial" pitchFamily="34" charset="0"/>
+              </a:rPr>
+              <a:t>Relatório sobre lições aprendidas (RP-LL</a:t>
+            </a:r>
+            <a:r>
+              <a:rPr lang="pt-BR" sz="3200" dirty="0" smtClean="0">
+                <a:latin typeface="Arial" pitchFamily="34" charset="0"/>
+                <a:cs typeface="Arial" pitchFamily="34" charset="0"/>
+              </a:rPr>
+              <a:t>)</a:t>
+            </a:r>
+          </a:p>
+          <a:p>
+            <a:pPr lvl="4"/>
+            <a:endParaRPr lang="pt-BR" sz="3200" dirty="0" smtClean="0">
+              <a:latin typeface="Arial" pitchFamily="34" charset="0"/>
+              <a:cs typeface="Arial" pitchFamily="34" charset="0"/>
+            </a:endParaRPr>
+          </a:p>
+          <a:p>
+            <a:pPr marL="0" lvl="4" indent="0"/>
+            <a:r>
+              <a:rPr lang="pt-BR" sz="3200" dirty="0" smtClean="0">
+                <a:latin typeface="Arial" pitchFamily="34" charset="0"/>
+                <a:cs typeface="Arial" pitchFamily="34" charset="0"/>
+              </a:rPr>
+              <a:t>	Atividades: são estruturadas </a:t>
+            </a:r>
+            <a:r>
+              <a:rPr lang="pt-BR" sz="3200" dirty="0" smtClean="0">
+                <a:latin typeface="Arial" pitchFamily="34" charset="0"/>
+                <a:cs typeface="Arial" pitchFamily="34" charset="0"/>
+              </a:rPr>
+              <a:t>para atender as demandas da empresa, contudo, com o foco em atender as avaliações do </a:t>
+            </a:r>
+            <a:r>
+              <a:rPr lang="pt-BR" sz="3200" dirty="0" smtClean="0">
+                <a:latin typeface="Arial" pitchFamily="34" charset="0"/>
+                <a:cs typeface="Arial" pitchFamily="34" charset="0"/>
+              </a:rPr>
+              <a:t>SEI </a:t>
+            </a:r>
+            <a:r>
+              <a:rPr lang="pt-BR" sz="3200" i="1" dirty="0" smtClean="0">
+                <a:latin typeface="+mn-lt"/>
+                <a:cs typeface="Arial" pitchFamily="34" charset="0"/>
+              </a:rPr>
+              <a:t>(Software </a:t>
+            </a:r>
+            <a:r>
+              <a:rPr lang="pt-BR" sz="3200" i="1" dirty="0" err="1" smtClean="0">
+                <a:latin typeface="+mn-lt"/>
+                <a:cs typeface="Arial" pitchFamily="34" charset="0"/>
+              </a:rPr>
+              <a:t>Engineering</a:t>
+            </a:r>
+            <a:r>
+              <a:rPr lang="pt-BR" sz="3200" i="1" dirty="0" smtClean="0">
+                <a:latin typeface="+mn-lt"/>
+                <a:cs typeface="Arial" pitchFamily="34" charset="0"/>
+              </a:rPr>
+              <a:t> </a:t>
+            </a:r>
+            <a:r>
+              <a:rPr lang="pt-BR" sz="3200" i="1" dirty="0" err="1" smtClean="0">
+                <a:latin typeface="+mn-lt"/>
+                <a:cs typeface="Arial" pitchFamily="34" charset="0"/>
+              </a:rPr>
+              <a:t>Institute</a:t>
+            </a:r>
+            <a:r>
+              <a:rPr lang="pt-BR" sz="3200" i="1" dirty="0" smtClean="0">
+                <a:latin typeface="+mn-lt"/>
+                <a:cs typeface="Arial" pitchFamily="34" charset="0"/>
+              </a:rPr>
+              <a:t>).</a:t>
+            </a:r>
+          </a:p>
+          <a:p>
+            <a:pPr marL="0" lvl="4" indent="0"/>
+            <a:r>
+              <a:rPr lang="pt-BR" sz="3200" dirty="0" smtClean="0">
+                <a:latin typeface="Arial" pitchFamily="34" charset="0"/>
+                <a:cs typeface="Arial" pitchFamily="34" charset="0"/>
+              </a:rPr>
+              <a:t>	</a:t>
+            </a:r>
+            <a:endParaRPr lang="pt-BR" sz="3200" dirty="0" smtClean="0">
+              <a:latin typeface="Arial" pitchFamily="34" charset="0"/>
+              <a:cs typeface="Arial" pitchFamily="34" charset="0"/>
+            </a:endParaRPr>
+          </a:p>
+          <a:p>
+            <a:pPr marL="1512888" lvl="1" indent="-514350">
+              <a:buFont typeface="+mj-lt"/>
               <a:buAutoNum type="arabicPeriod"/>
             </a:pPr>
             <a:r>
-              <a:rPr lang="pt-BR" sz="3200" b="1" dirty="0" smtClean="0">
-                <a:latin typeface="Arial" charset="0"/>
-              </a:rPr>
-              <a:t>Extração da Placa</a:t>
-            </a:r>
-          </a:p>
-          <a:p>
-            <a:pPr marL="514350" indent="-514350" algn="just"/>
-            <a:r>
               <a:rPr lang="pt-BR" sz="3200" dirty="0" smtClean="0">
-                <a:latin typeface="Arial" charset="0"/>
-              </a:rPr>
-              <a:t>	A extração da placa é baseada na utilização de operadores morfológicos. Este procedimento pode ser divido em 7 partes,  como ilustrado na figura 2.</a:t>
-            </a:r>
+                <a:latin typeface="Arial" pitchFamily="34" charset="0"/>
+                <a:cs typeface="Arial" pitchFamily="34" charset="0"/>
+              </a:rPr>
+              <a:t>Elaborar </a:t>
+            </a:r>
+            <a:r>
+              <a:rPr lang="pt-BR" sz="3200" dirty="0" smtClean="0">
+                <a:latin typeface="Arial" pitchFamily="34" charset="0"/>
+                <a:cs typeface="Arial" pitchFamily="34" charset="0"/>
+              </a:rPr>
+              <a:t>plano de qualidade</a:t>
+            </a:r>
+          </a:p>
+          <a:p>
+            <a:pPr marL="1455738" lvl="1" indent="-457200">
+              <a:buFont typeface="+mj-lt"/>
+              <a:buAutoNum type="arabicPeriod"/>
+            </a:pPr>
+            <a:r>
+              <a:rPr lang="pt-BR" sz="3200" dirty="0" smtClean="0">
+                <a:latin typeface="Arial" pitchFamily="34" charset="0"/>
+                <a:cs typeface="Arial" pitchFamily="34" charset="0"/>
+              </a:rPr>
+              <a:t>Avaliar objetivamente os produtos de trabalho e serviços</a:t>
+            </a:r>
+          </a:p>
+          <a:p>
+            <a:pPr marL="1455738" lvl="1" indent="-457200">
+              <a:buFont typeface="+mj-lt"/>
+              <a:buAutoNum type="arabicPeriod"/>
+            </a:pPr>
+            <a:r>
+              <a:rPr lang="pt-BR" sz="3200" dirty="0" smtClean="0">
+                <a:latin typeface="Arial" pitchFamily="34" charset="0"/>
+                <a:cs typeface="Arial" pitchFamily="34" charset="0"/>
+              </a:rPr>
+              <a:t>Avaliar objetivamente os processos</a:t>
+            </a:r>
+          </a:p>
+          <a:p>
+            <a:pPr marL="1455738" lvl="1" indent="-457200">
+              <a:buFont typeface="+mj-lt"/>
+              <a:buAutoNum type="arabicPeriod"/>
+            </a:pPr>
+            <a:r>
+              <a:rPr lang="pt-BR" sz="3200" dirty="0" smtClean="0">
+                <a:latin typeface="Arial" pitchFamily="34" charset="0"/>
+                <a:cs typeface="Arial" pitchFamily="34" charset="0"/>
+              </a:rPr>
+              <a:t>Aprovar produto final para entrega</a:t>
+            </a:r>
+          </a:p>
+          <a:p>
+            <a:pPr marL="1455738" lvl="1" indent="-457200">
+              <a:buFont typeface="+mj-lt"/>
+              <a:buAutoNum type="arabicPeriod"/>
+            </a:pPr>
+            <a:r>
+              <a:rPr lang="pt-BR" sz="3200" dirty="0" smtClean="0">
+                <a:latin typeface="Arial" pitchFamily="34" charset="0"/>
+                <a:cs typeface="Arial" pitchFamily="34" charset="0"/>
+              </a:rPr>
+              <a:t>Elaborar relatório periódico de garantia da qualidade</a:t>
+            </a:r>
+          </a:p>
+          <a:p>
+            <a:pPr marL="1455738" lvl="1" indent="-457200">
+              <a:buFont typeface="+mj-lt"/>
+              <a:buAutoNum type="arabicPeriod"/>
+            </a:pPr>
+            <a:r>
+              <a:rPr lang="pt-BR" sz="3200" dirty="0" smtClean="0">
+                <a:latin typeface="Arial" pitchFamily="34" charset="0"/>
+                <a:cs typeface="Arial" pitchFamily="34" charset="0"/>
+              </a:rPr>
+              <a:t>Elaborar relatório de não conformidades</a:t>
+            </a:r>
+          </a:p>
+          <a:p>
+            <a:pPr marL="1455738" lvl="1" indent="-457200">
+              <a:buFont typeface="+mj-lt"/>
+              <a:buAutoNum type="arabicPeriod"/>
+            </a:pPr>
+            <a:r>
+              <a:rPr lang="pt-BR" sz="3200" dirty="0" smtClean="0">
+                <a:latin typeface="Arial" pitchFamily="34" charset="0"/>
+                <a:cs typeface="Arial" pitchFamily="34" charset="0"/>
+              </a:rPr>
+              <a:t>Elaborar relatório de lições aprendidas do projeto</a:t>
+            </a:r>
+          </a:p>
+          <a:p>
+            <a:pPr marL="1455738" lvl="1" indent="-457200">
+              <a:buFont typeface="+mj-lt"/>
+              <a:buAutoNum type="arabicPeriod"/>
+            </a:pPr>
+            <a:r>
+              <a:rPr lang="pt-BR" sz="3200" dirty="0" smtClean="0">
+                <a:latin typeface="Arial" pitchFamily="34" charset="0"/>
+                <a:cs typeface="Arial" pitchFamily="34" charset="0"/>
+              </a:rPr>
+              <a:t>Disponibilizar materiais de treinamento para os integrantes do projeto</a:t>
+            </a:r>
+          </a:p>
+          <a:p>
+            <a:pPr marL="1455738" lvl="1" indent="-457200">
+              <a:buFont typeface="+mj-lt"/>
+              <a:buAutoNum type="arabicPeriod"/>
+            </a:pPr>
+            <a:r>
+              <a:rPr lang="pt-BR" sz="3200" dirty="0" smtClean="0">
+                <a:latin typeface="Arial" pitchFamily="34" charset="0"/>
+                <a:cs typeface="Arial" pitchFamily="34" charset="0"/>
+              </a:rPr>
+              <a:t>Prestar suporte a todos os envolvidos no </a:t>
+            </a:r>
+            <a:r>
+              <a:rPr lang="pt-BR" sz="3200" dirty="0" smtClean="0">
+                <a:latin typeface="Arial" pitchFamily="34" charset="0"/>
+                <a:cs typeface="Arial" pitchFamily="34" charset="0"/>
+              </a:rPr>
+              <a:t>projeto</a:t>
+            </a:r>
+            <a:endParaRPr lang="pt-BR" sz="3200" dirty="0">
+              <a:latin typeface="Arial" pitchFamily="34" charset="0"/>
+              <a:cs typeface="Arial" pitchFamily="34" charset="0"/>
+            </a:endParaRPr>
           </a:p>
         </p:txBody>
       </p:sp>
@@ -5839,8 +5843,8 @@
         </p:nvSpPr>
         <p:spPr bwMode="auto">
           <a:xfrm>
-            <a:off x="17988545" y="25360364"/>
-            <a:ext cx="13429774" cy="3323987"/>
+            <a:off x="1872433" y="30675658"/>
+            <a:ext cx="10441160" cy="4093428"/>
           </a:xfrm>
           <a:prstGeom prst="rect">
             <a:avLst/>
@@ -5853,14 +5857,14 @@
           </a:ln>
           <a:extLst>
             <a:ext uri="{909E8E84-426E-40DD-AFC4-6F175D3DCCD1}">
-              <a14:hiddenFill xmlns:a14="http://schemas.microsoft.com/office/drawing/2010/main" xmlns="">
+              <a14:hiddenFill xmlns="" xmlns:a14="http://schemas.microsoft.com/office/drawing/2010/main">
                 <a:solidFill>
                   <a:srgbClr val="FFFFFF"/>
                 </a:solidFill>
               </a14:hiddenFill>
             </a:ext>
             <a:ext uri="{91240B29-F687-4F45-9708-019B960494DF}">
-              <a14:hiddenLine xmlns:a14="http://schemas.microsoft.com/office/drawing/2010/main" xmlns="" w="9525" algn="ctr">
+              <a14:hiddenLine xmlns="" xmlns:a14="http://schemas.microsoft.com/office/drawing/2010/main" w="9525" algn="ctr">
                 <a:solidFill>
                   <a:srgbClr val="000000"/>
                 </a:solidFill>
@@ -5974,7 +5978,11 @@
             </a:lvl9pPr>
           </a:lstStyle>
           <a:p>
-            <a:pPr algn="ctr"/>
+            <a:pPr algn="ctr">
+              <a:spcAft>
+                <a:spcPts val="2400"/>
+              </a:spcAft>
+            </a:pPr>
             <a:r>
               <a:rPr lang="pt-BR" sz="4800" b="1" dirty="0" smtClean="0">
                 <a:latin typeface="Arial" charset="0"/>
@@ -5983,12 +5991,53 @@
             </a:r>
           </a:p>
           <a:p>
-            <a:pPr algn="just"/>
             <a:r>
               <a:rPr lang="pt-BR" sz="3200" dirty="0" smtClean="0">
                 <a:latin typeface="Arial" charset="0"/>
               </a:rPr>
-              <a:t>	O método proposto pode alcançar melhores resultados, com aumento na qualidade das imagens, sendo realizado aquisição das imagens em equipamentos configurados de maneira específica para esta aplicação, assim como, a aplicação de outras técnicas em conjunto na etapa de reconhecimento.</a:t>
+              <a:t>	</a:t>
+            </a:r>
+            <a:r>
+              <a:rPr lang="pt-BR" sz="3200" dirty="0" smtClean="0">
+                <a:latin typeface="Arial" pitchFamily="34" charset="0"/>
+                <a:cs typeface="Arial" pitchFamily="34" charset="0"/>
+              </a:rPr>
+              <a:t>Podemos concluir que hoje existem diversos modelos e normas referentes à </a:t>
+            </a:r>
+            <a:r>
+              <a:rPr lang="pt-BR" sz="3200" dirty="0" smtClean="0">
+                <a:latin typeface="Arial" pitchFamily="34" charset="0"/>
+                <a:cs typeface="Arial" pitchFamily="34" charset="0"/>
+              </a:rPr>
+              <a:t>qualidade de </a:t>
+            </a:r>
+            <a:r>
+              <a:rPr lang="pt-BR" sz="3200" dirty="0" smtClean="0">
+                <a:latin typeface="Arial" pitchFamily="34" charset="0"/>
+                <a:cs typeface="Arial" pitchFamily="34" charset="0"/>
+              </a:rPr>
+              <a:t>software </a:t>
+            </a:r>
+            <a:r>
+              <a:rPr lang="pt-BR" sz="3200" dirty="0" smtClean="0">
+                <a:latin typeface="Arial" pitchFamily="34" charset="0"/>
+                <a:cs typeface="Arial" pitchFamily="34" charset="0"/>
+              </a:rPr>
+              <a:t>como CMMI-DEV e ISO/IEC 25000, </a:t>
+            </a:r>
+            <a:r>
+              <a:rPr lang="pt-BR" sz="3200" dirty="0" smtClean="0">
+                <a:latin typeface="Arial" pitchFamily="34" charset="0"/>
+                <a:cs typeface="Arial" pitchFamily="34" charset="0"/>
+              </a:rPr>
+              <a:t>no entanto, há uma grande necessidade de modelos que propõe uma forma de estabelecer de forma prática, com descrições e </a:t>
+            </a:r>
+            <a:r>
+              <a:rPr lang="pt-BR" sz="3200" dirty="0" smtClean="0">
+                <a:latin typeface="Arial" pitchFamily="34" charset="0"/>
+                <a:cs typeface="Arial" pitchFamily="34" charset="0"/>
+              </a:rPr>
+              <a:t>exemplos.</a:t>
             </a:r>
             <a:endParaRPr lang="pt-BR" sz="3200" dirty="0">
               <a:latin typeface="Arial" charset="0"/>
@@ -5996,6 +6045,1168 @@
           </a:p>
         </p:txBody>
       </p:sp>
+      <p:graphicFrame>
+        <p:nvGraphicFramePr>
+          <p:cNvPr id="15" name="Tabela 14"/>
+          <p:cNvGraphicFramePr>
+            <a:graphicFrameLocks noGrp="1"/>
+          </p:cNvGraphicFramePr>
+          <p:nvPr/>
+        </p:nvGraphicFramePr>
+        <p:xfrm>
+          <a:off x="2088457" y="21010903"/>
+          <a:ext cx="9937104" cy="9073008"/>
+        </p:xfrm>
+        <a:graphic>
+          <a:graphicData uri="http://schemas.openxmlformats.org/drawingml/2006/table">
+            <a:tbl>
+              <a:tblPr/>
+              <a:tblGrid>
+                <a:gridCol w="4968552"/>
+                <a:gridCol w="4968552"/>
+              </a:tblGrid>
+              <a:tr h="883945">
+                <a:tc gridSpan="2">
+                  <a:txBody>
+                    <a:bodyPr/>
+                    <a:lstStyle/>
+                    <a:p>
+                      <a:pPr algn="ctr">
+                        <a:spcAft>
+                          <a:spcPts val="0"/>
+                        </a:spcAft>
+                      </a:pPr>
+                      <a:r>
+                        <a:rPr lang="pt-BR" sz="1800" dirty="0">
+                          <a:latin typeface="Times New Roman"/>
+                          <a:ea typeface="Times New Roman"/>
+                        </a:rPr>
+                        <a:t/>
+                      </a:r>
+                      <a:br>
+                        <a:rPr lang="pt-BR" sz="1800" dirty="0">
+                          <a:latin typeface="Times New Roman"/>
+                          <a:ea typeface="Times New Roman"/>
+                        </a:rPr>
+                      </a:br>
+                      <a:r>
+                        <a:rPr lang="pt-BR" sz="1800" dirty="0">
+                          <a:latin typeface="Arial"/>
+                          <a:ea typeface="Times New Roman"/>
+                        </a:rPr>
+                        <a:t/>
+                      </a:r>
+                      <a:br>
+                        <a:rPr lang="pt-BR" sz="1800" dirty="0">
+                          <a:latin typeface="Arial"/>
+                          <a:ea typeface="Times New Roman"/>
+                        </a:rPr>
+                      </a:br>
+                      <a:r>
+                        <a:rPr lang="pt-BR" sz="2800" b="1" dirty="0">
+                          <a:solidFill>
+                            <a:srgbClr val="000000"/>
+                          </a:solidFill>
+                          <a:latin typeface="Arial"/>
+                          <a:ea typeface="Times New Roman"/>
+                        </a:rPr>
+                        <a:t>Aderência do método proposto</a:t>
+                      </a:r>
+                      <a:endParaRPr lang="pt-BR" sz="2800" dirty="0">
+                        <a:latin typeface="Times New Roman"/>
+                        <a:ea typeface="Times New Roman"/>
+                      </a:endParaRPr>
+                    </a:p>
+                  </a:txBody>
+                  <a:tcPr marL="44450" marR="44450" marT="0" marB="0" anchor="ctr">
+                    <a:lnL>
+                      <a:noFill/>
+                    </a:lnL>
+                    <a:lnR>
+                      <a:noFill/>
+                    </a:lnR>
+                    <a:lnT w="38100" cap="flat" cmpd="sng" algn="ctr">
+                      <a:solidFill>
+                        <a:srgbClr val="000000"/>
+                      </a:solidFill>
+                      <a:prstDash val="solid"/>
+                      <a:round/>
+                      <a:headEnd type="none" w="med" len="med"/>
+                      <a:tailEnd type="none" w="med" len="med"/>
+                    </a:lnT>
+                    <a:lnB w="12700" cap="flat" cmpd="sng" algn="ctr">
+                      <a:solidFill>
+                        <a:srgbClr val="000000"/>
+                      </a:solidFill>
+                      <a:prstDash val="solid"/>
+                      <a:round/>
+                      <a:headEnd type="none" w="med" len="med"/>
+                      <a:tailEnd type="none" w="med" len="med"/>
+                    </a:lnB>
+                  </a:tcPr>
+                </a:tc>
+                <a:tc hMerge="1">
+                  <a:txBody>
+                    <a:bodyPr/>
+                    <a:lstStyle/>
+                    <a:p>
+                      <a:endParaRPr lang="pt-BR"/>
+                    </a:p>
+                  </a:txBody>
+                  <a:tcPr/>
+                </a:tc>
+              </a:tr>
+              <a:tr h="759641">
+                <a:tc>
+                  <a:txBody>
+                    <a:bodyPr/>
+                    <a:lstStyle/>
+                    <a:p>
+                      <a:pPr algn="ctr">
+                        <a:spcAft>
+                          <a:spcPts val="0"/>
+                        </a:spcAft>
+                      </a:pPr>
+                      <a:r>
+                        <a:rPr lang="pt-BR" sz="2800" b="1" dirty="0">
+                          <a:solidFill>
+                            <a:srgbClr val="000000"/>
+                          </a:solidFill>
+                          <a:latin typeface="Arial"/>
+                          <a:ea typeface="Times New Roman"/>
+                        </a:rPr>
+                        <a:t>CMMI-DEV - PPQA</a:t>
+                      </a:r>
+                      <a:endParaRPr lang="pt-BR" sz="2800" dirty="0">
+                        <a:latin typeface="Times New Roman"/>
+                        <a:ea typeface="Times New Roman"/>
+                      </a:endParaRPr>
+                    </a:p>
+                  </a:txBody>
+                  <a:tcPr marL="44450" marR="44450" marT="0" marB="0" anchor="ctr">
+                    <a:lnL>
+                      <a:noFill/>
+                    </a:lnL>
+                    <a:lnR>
+                      <a:noFill/>
+                    </a:lnR>
+                    <a:lnT w="12700" cap="flat" cmpd="sng" algn="ctr">
+                      <a:solidFill>
+                        <a:srgbClr val="000000"/>
+                      </a:solidFill>
+                      <a:prstDash val="solid"/>
+                      <a:round/>
+                      <a:headEnd type="none" w="med" len="med"/>
+                      <a:tailEnd type="none" w="med" len="med"/>
+                    </a:lnT>
+                    <a:lnB w="12700" cap="flat" cmpd="sng" algn="ctr">
+                      <a:solidFill>
+                        <a:srgbClr val="000000"/>
+                      </a:solidFill>
+                      <a:prstDash val="solid"/>
+                      <a:round/>
+                      <a:headEnd type="none" w="med" len="med"/>
+                      <a:tailEnd type="none" w="med" len="med"/>
+                    </a:lnB>
+                  </a:tcPr>
+                </a:tc>
+                <a:tc>
+                  <a:txBody>
+                    <a:bodyPr/>
+                    <a:lstStyle/>
+                    <a:p>
+                      <a:pPr algn="ctr">
+                        <a:spcAft>
+                          <a:spcPts val="0"/>
+                        </a:spcAft>
+                      </a:pPr>
+                      <a:r>
+                        <a:rPr lang="pt-BR" sz="2800" b="1" dirty="0">
+                          <a:solidFill>
+                            <a:srgbClr val="000000"/>
+                          </a:solidFill>
+                          <a:latin typeface="Arial"/>
+                          <a:ea typeface="Times New Roman"/>
+                        </a:rPr>
+                        <a:t>Abordagem proposta</a:t>
+                      </a:r>
+                      <a:endParaRPr lang="pt-BR" sz="2800" dirty="0">
+                        <a:latin typeface="Times New Roman"/>
+                        <a:ea typeface="Times New Roman"/>
+                      </a:endParaRPr>
+                    </a:p>
+                  </a:txBody>
+                  <a:tcPr marL="44450" marR="44450" marT="0" marB="0" anchor="ctr">
+                    <a:lnL>
+                      <a:noFill/>
+                    </a:lnL>
+                    <a:lnR>
+                      <a:noFill/>
+                    </a:lnR>
+                    <a:lnT w="12700" cap="flat" cmpd="sng" algn="ctr">
+                      <a:solidFill>
+                        <a:srgbClr val="000000"/>
+                      </a:solidFill>
+                      <a:prstDash val="solid"/>
+                      <a:round/>
+                      <a:headEnd type="none" w="med" len="med"/>
+                      <a:tailEnd type="none" w="med" len="med"/>
+                    </a:lnT>
+                    <a:lnB w="12700" cap="flat" cmpd="sng" algn="ctr">
+                      <a:solidFill>
+                        <a:srgbClr val="000000"/>
+                      </a:solidFill>
+                      <a:prstDash val="solid"/>
+                      <a:round/>
+                      <a:headEnd type="none" w="med" len="med"/>
+                      <a:tailEnd type="none" w="med" len="med"/>
+                    </a:lnB>
+                  </a:tcPr>
+                </a:tc>
+              </a:tr>
+              <a:tr h="1300976">
+                <a:tc>
+                  <a:txBody>
+                    <a:bodyPr/>
+                    <a:lstStyle/>
+                    <a:p>
+                      <a:pPr>
+                        <a:lnSpc>
+                          <a:spcPct val="115000"/>
+                        </a:lnSpc>
+                        <a:spcAft>
+                          <a:spcPts val="0"/>
+                        </a:spcAft>
+                      </a:pPr>
+                      <a:r>
+                        <a:rPr lang="pt-BR" sz="1800" b="1">
+                          <a:solidFill>
+                            <a:srgbClr val="000000"/>
+                          </a:solidFill>
+                          <a:latin typeface="Arial"/>
+                          <a:ea typeface="Times New Roman"/>
+                        </a:rPr>
+                        <a:t>SP 1.1</a:t>
+                      </a:r>
+                      <a:r>
+                        <a:rPr lang="pt-BR" sz="1800">
+                          <a:solidFill>
+                            <a:srgbClr val="000000"/>
+                          </a:solidFill>
+                          <a:latin typeface="Arial"/>
+                          <a:ea typeface="Times New Roman"/>
+                        </a:rPr>
+                        <a:t> Avaliar objetivamente processos realizados selecionado contra descrições aplicáveis processo, padrões e procedimentos.</a:t>
+                      </a:r>
+                      <a:endParaRPr lang="pt-BR" sz="1800">
+                        <a:latin typeface="Times New Roman"/>
+                        <a:ea typeface="Times New Roman"/>
+                      </a:endParaRPr>
+                    </a:p>
+                  </a:txBody>
+                  <a:tcPr marL="44450" marR="44450" marT="0" marB="0" anchor="ctr">
+                    <a:lnL>
+                      <a:noFill/>
+                    </a:lnL>
+                    <a:lnR w="12700" cap="flat" cmpd="sng" algn="ctr">
+                      <a:solidFill>
+                        <a:srgbClr val="000000"/>
+                      </a:solidFill>
+                      <a:prstDash val="solid"/>
+                      <a:round/>
+                      <a:headEnd type="none" w="med" len="med"/>
+                      <a:tailEnd type="none" w="med" len="med"/>
+                    </a:lnR>
+                    <a:lnT w="12700" cap="flat" cmpd="sng" algn="ctr">
+                      <a:solidFill>
+                        <a:srgbClr val="000000"/>
+                      </a:solidFill>
+                      <a:prstDash val="solid"/>
+                      <a:round/>
+                      <a:headEnd type="none" w="med" len="med"/>
+                      <a:tailEnd type="none" w="med" len="med"/>
+                    </a:lnT>
+                    <a:lnB w="12700" cap="flat" cmpd="sng" algn="ctr">
+                      <a:solidFill>
+                        <a:srgbClr val="000000"/>
+                      </a:solidFill>
+                      <a:prstDash val="solid"/>
+                      <a:round/>
+                      <a:headEnd type="none" w="med" len="med"/>
+                      <a:tailEnd type="none" w="med" len="med"/>
+                    </a:lnB>
+                  </a:tcPr>
+                </a:tc>
+                <a:tc>
+                  <a:txBody>
+                    <a:bodyPr/>
+                    <a:lstStyle/>
+                    <a:p>
+                      <a:pPr algn="just">
+                        <a:spcAft>
+                          <a:spcPts val="0"/>
+                        </a:spcAft>
+                      </a:pPr>
+                      <a:r>
+                        <a:rPr lang="pt-BR" sz="1800" b="1" dirty="0">
+                          <a:solidFill>
+                            <a:srgbClr val="000000"/>
+                          </a:solidFill>
+                          <a:latin typeface="Arial"/>
+                          <a:ea typeface="Arial"/>
+                        </a:rPr>
+                        <a:t>3.    Avaliar objetivamente os processos.</a:t>
+                      </a:r>
+                      <a:endParaRPr lang="pt-BR" sz="1800" dirty="0">
+                        <a:latin typeface="Times New Roman"/>
+                        <a:ea typeface="Times New Roman"/>
+                      </a:endParaRPr>
+                    </a:p>
+                  </a:txBody>
+                  <a:tcPr marL="44450" marR="44450" marT="0" marB="0" anchor="ctr">
+                    <a:lnL w="12700" cap="flat" cmpd="sng" algn="ctr">
+                      <a:solidFill>
+                        <a:srgbClr val="000000"/>
+                      </a:solidFill>
+                      <a:prstDash val="solid"/>
+                      <a:round/>
+                      <a:headEnd type="none" w="med" len="med"/>
+                      <a:tailEnd type="none" w="med" len="med"/>
+                    </a:lnL>
+                    <a:lnR>
+                      <a:noFill/>
+                    </a:lnR>
+                    <a:lnT w="12700" cap="flat" cmpd="sng" algn="ctr">
+                      <a:solidFill>
+                        <a:srgbClr val="000000"/>
+                      </a:solidFill>
+                      <a:prstDash val="solid"/>
+                      <a:round/>
+                      <a:headEnd type="none" w="med" len="med"/>
+                      <a:tailEnd type="none" w="med" len="med"/>
+                    </a:lnT>
+                    <a:lnB w="12700" cap="flat" cmpd="sng" algn="ctr">
+                      <a:solidFill>
+                        <a:srgbClr val="000000"/>
+                      </a:solidFill>
+                      <a:prstDash val="solid"/>
+                      <a:round/>
+                      <a:headEnd type="none" w="med" len="med"/>
+                      <a:tailEnd type="none" w="med" len="med"/>
+                    </a:lnB>
+                  </a:tcPr>
+                </a:tc>
+              </a:tr>
+              <a:tr h="1300976">
+                <a:tc>
+                  <a:txBody>
+                    <a:bodyPr/>
+                    <a:lstStyle/>
+                    <a:p>
+                      <a:pPr>
+                        <a:lnSpc>
+                          <a:spcPct val="115000"/>
+                        </a:lnSpc>
+                        <a:spcAft>
+                          <a:spcPts val="0"/>
+                        </a:spcAft>
+                      </a:pPr>
+                      <a:r>
+                        <a:rPr lang="pt-BR" sz="1800" b="1">
+                          <a:solidFill>
+                            <a:srgbClr val="000000"/>
+                          </a:solidFill>
+                          <a:latin typeface="Arial"/>
+                          <a:ea typeface="Times New Roman"/>
+                        </a:rPr>
+                        <a:t>SP 1.2</a:t>
+                      </a:r>
+                      <a:r>
+                        <a:rPr lang="pt-BR" sz="1800">
+                          <a:solidFill>
+                            <a:srgbClr val="000000"/>
+                          </a:solidFill>
+                          <a:latin typeface="Arial"/>
+                          <a:ea typeface="Times New Roman"/>
+                        </a:rPr>
+                        <a:t> Avaliar objetivamente produtos de trabalho selecionado contra as descrições aplicáveis processo, padrões e procedimentos.</a:t>
+                      </a:r>
+                      <a:endParaRPr lang="pt-BR" sz="1800">
+                        <a:latin typeface="Times New Roman"/>
+                        <a:ea typeface="Times New Roman"/>
+                      </a:endParaRPr>
+                    </a:p>
+                  </a:txBody>
+                  <a:tcPr marL="44450" marR="44450" marT="0" marB="0" anchor="ctr">
+                    <a:lnL>
+                      <a:noFill/>
+                    </a:lnL>
+                    <a:lnR w="12700" cap="flat" cmpd="sng" algn="ctr">
+                      <a:solidFill>
+                        <a:srgbClr val="000000"/>
+                      </a:solidFill>
+                      <a:prstDash val="solid"/>
+                      <a:round/>
+                      <a:headEnd type="none" w="med" len="med"/>
+                      <a:tailEnd type="none" w="med" len="med"/>
+                    </a:lnR>
+                    <a:lnT w="12700" cap="flat" cmpd="sng" algn="ctr">
+                      <a:solidFill>
+                        <a:srgbClr val="000000"/>
+                      </a:solidFill>
+                      <a:prstDash val="solid"/>
+                      <a:round/>
+                      <a:headEnd type="none" w="med" len="med"/>
+                      <a:tailEnd type="none" w="med" len="med"/>
+                    </a:lnT>
+                    <a:lnB w="12700" cap="flat" cmpd="sng" algn="ctr">
+                      <a:solidFill>
+                        <a:srgbClr val="000000"/>
+                      </a:solidFill>
+                      <a:prstDash val="solid"/>
+                      <a:round/>
+                      <a:headEnd type="none" w="med" len="med"/>
+                      <a:tailEnd type="none" w="med" len="med"/>
+                    </a:lnB>
+                  </a:tcPr>
+                </a:tc>
+                <a:tc>
+                  <a:txBody>
+                    <a:bodyPr/>
+                    <a:lstStyle/>
+                    <a:p>
+                      <a:pPr algn="just">
+                        <a:spcAft>
+                          <a:spcPts val="0"/>
+                        </a:spcAft>
+                      </a:pPr>
+                      <a:r>
+                        <a:rPr lang="pt-BR" sz="1800" b="1" dirty="0">
+                          <a:solidFill>
+                            <a:srgbClr val="000000"/>
+                          </a:solidFill>
+                          <a:latin typeface="Arial"/>
+                          <a:ea typeface="Arial"/>
+                        </a:rPr>
+                        <a:t>2.    Avaliar objetivamente os produtos de trabalho e serviços.</a:t>
+                      </a:r>
+                      <a:endParaRPr lang="pt-BR" sz="1800" dirty="0">
+                        <a:latin typeface="Times New Roman"/>
+                        <a:ea typeface="Times New Roman"/>
+                      </a:endParaRPr>
+                    </a:p>
+                  </a:txBody>
+                  <a:tcPr marL="44450" marR="44450" marT="0" marB="0" anchor="ctr">
+                    <a:lnL w="12700" cap="flat" cmpd="sng" algn="ctr">
+                      <a:solidFill>
+                        <a:srgbClr val="000000"/>
+                      </a:solidFill>
+                      <a:prstDash val="solid"/>
+                      <a:round/>
+                      <a:headEnd type="none" w="med" len="med"/>
+                      <a:tailEnd type="none" w="med" len="med"/>
+                    </a:lnL>
+                    <a:lnR>
+                      <a:noFill/>
+                    </a:lnR>
+                    <a:lnT w="12700" cap="flat" cmpd="sng" algn="ctr">
+                      <a:solidFill>
+                        <a:srgbClr val="000000"/>
+                      </a:solidFill>
+                      <a:prstDash val="solid"/>
+                      <a:round/>
+                      <a:headEnd type="none" w="med" len="med"/>
+                      <a:tailEnd type="none" w="med" len="med"/>
+                    </a:lnT>
+                    <a:lnB w="12700" cap="flat" cmpd="sng" algn="ctr">
+                      <a:solidFill>
+                        <a:srgbClr val="000000"/>
+                      </a:solidFill>
+                      <a:prstDash val="solid"/>
+                      <a:round/>
+                      <a:headEnd type="none" w="med" len="med"/>
+                      <a:tailEnd type="none" w="med" len="med"/>
+                    </a:lnB>
+                  </a:tcPr>
+                </a:tc>
+              </a:tr>
+              <a:tr h="1058893">
+                <a:tc>
+                  <a:txBody>
+                    <a:bodyPr/>
+                    <a:lstStyle/>
+                    <a:p>
+                      <a:pPr>
+                        <a:lnSpc>
+                          <a:spcPct val="115000"/>
+                        </a:lnSpc>
+                        <a:spcAft>
+                          <a:spcPts val="0"/>
+                        </a:spcAft>
+                      </a:pPr>
+                      <a:r>
+                        <a:rPr lang="pt-BR" sz="1800" b="1">
+                          <a:solidFill>
+                            <a:srgbClr val="000000"/>
+                          </a:solidFill>
+                          <a:latin typeface="Arial"/>
+                          <a:ea typeface="Times New Roman"/>
+                        </a:rPr>
+                        <a:t>SP 2.1</a:t>
+                      </a:r>
+                      <a:r>
+                        <a:rPr lang="pt-BR" sz="1800">
+                          <a:solidFill>
+                            <a:srgbClr val="000000"/>
+                          </a:solidFill>
+                          <a:latin typeface="Arial"/>
+                          <a:ea typeface="Times New Roman"/>
+                        </a:rPr>
+                        <a:t> Comunicar problemas de qualidade e garantir a resolução dos problemas de não conformidade com a equipe e gestores.</a:t>
+                      </a:r>
+                      <a:endParaRPr lang="pt-BR" sz="1800">
+                        <a:latin typeface="Times New Roman"/>
+                        <a:ea typeface="Times New Roman"/>
+                      </a:endParaRPr>
+                    </a:p>
+                  </a:txBody>
+                  <a:tcPr marL="44450" marR="44450" marT="0" marB="0" anchor="ctr">
+                    <a:lnL>
+                      <a:noFill/>
+                    </a:lnL>
+                    <a:lnR w="12700" cap="flat" cmpd="sng" algn="ctr">
+                      <a:solidFill>
+                        <a:srgbClr val="000000"/>
+                      </a:solidFill>
+                      <a:prstDash val="solid"/>
+                      <a:round/>
+                      <a:headEnd type="none" w="med" len="med"/>
+                      <a:tailEnd type="none" w="med" len="med"/>
+                    </a:lnR>
+                    <a:lnT w="12700" cap="flat" cmpd="sng" algn="ctr">
+                      <a:solidFill>
+                        <a:srgbClr val="000000"/>
+                      </a:solidFill>
+                      <a:prstDash val="solid"/>
+                      <a:round/>
+                      <a:headEnd type="none" w="med" len="med"/>
+                      <a:tailEnd type="none" w="med" len="med"/>
+                    </a:lnT>
+                    <a:lnB w="12700" cap="flat" cmpd="sng" algn="ctr">
+                      <a:solidFill>
+                        <a:srgbClr val="000000"/>
+                      </a:solidFill>
+                      <a:prstDash val="solid"/>
+                      <a:round/>
+                      <a:headEnd type="none" w="med" len="med"/>
+                      <a:tailEnd type="none" w="med" len="med"/>
+                    </a:lnB>
+                  </a:tcPr>
+                </a:tc>
+                <a:tc>
+                  <a:txBody>
+                    <a:bodyPr/>
+                    <a:lstStyle/>
+                    <a:p>
+                      <a:pPr algn="just">
+                        <a:spcAft>
+                          <a:spcPts val="0"/>
+                        </a:spcAft>
+                      </a:pPr>
+                      <a:r>
+                        <a:rPr lang="pt-BR" sz="1800" b="1" dirty="0">
+                          <a:solidFill>
+                            <a:srgbClr val="000000"/>
+                          </a:solidFill>
+                          <a:latin typeface="Arial"/>
+                          <a:ea typeface="Arial"/>
+                        </a:rPr>
+                        <a:t>6.    Elaborar relatório de não conformidades.</a:t>
+                      </a:r>
+                      <a:endParaRPr lang="pt-BR" sz="1800" dirty="0">
+                        <a:latin typeface="Times New Roman"/>
+                        <a:ea typeface="Times New Roman"/>
+                      </a:endParaRPr>
+                    </a:p>
+                  </a:txBody>
+                  <a:tcPr marL="44450" marR="44450" marT="0" marB="0" anchor="ctr">
+                    <a:lnL w="12700" cap="flat" cmpd="sng" algn="ctr">
+                      <a:solidFill>
+                        <a:srgbClr val="000000"/>
+                      </a:solidFill>
+                      <a:prstDash val="solid"/>
+                      <a:round/>
+                      <a:headEnd type="none" w="med" len="med"/>
+                      <a:tailEnd type="none" w="med" len="med"/>
+                    </a:lnL>
+                    <a:lnR>
+                      <a:noFill/>
+                    </a:lnR>
+                    <a:lnT w="12700" cap="flat" cmpd="sng" algn="ctr">
+                      <a:solidFill>
+                        <a:srgbClr val="000000"/>
+                      </a:solidFill>
+                      <a:prstDash val="solid"/>
+                      <a:round/>
+                      <a:headEnd type="none" w="med" len="med"/>
+                      <a:tailEnd type="none" w="med" len="med"/>
+                    </a:lnT>
+                    <a:lnB w="12700" cap="flat" cmpd="sng" algn="ctr">
+                      <a:solidFill>
+                        <a:srgbClr val="000000"/>
+                      </a:solidFill>
+                      <a:prstDash val="solid"/>
+                      <a:round/>
+                      <a:headEnd type="none" w="med" len="med"/>
+                      <a:tailEnd type="none" w="med" len="med"/>
+                    </a:lnB>
+                  </a:tcPr>
+                </a:tc>
+              </a:tr>
+              <a:tr h="288675">
+                <a:tc rowSpan="3">
+                  <a:txBody>
+                    <a:bodyPr/>
+                    <a:lstStyle/>
+                    <a:p>
+                      <a:pPr>
+                        <a:lnSpc>
+                          <a:spcPct val="115000"/>
+                        </a:lnSpc>
+                        <a:spcAft>
+                          <a:spcPts val="0"/>
+                        </a:spcAft>
+                      </a:pPr>
+                      <a:r>
+                        <a:rPr lang="pt-BR" sz="1800" b="1">
+                          <a:solidFill>
+                            <a:srgbClr val="000000"/>
+                          </a:solidFill>
+                          <a:latin typeface="Arial"/>
+                          <a:ea typeface="Times New Roman"/>
+                        </a:rPr>
+                        <a:t>SP 2.2</a:t>
+                      </a:r>
+                      <a:r>
+                        <a:rPr lang="pt-BR" sz="1800">
+                          <a:solidFill>
+                            <a:srgbClr val="000000"/>
+                          </a:solidFill>
+                          <a:latin typeface="Arial"/>
+                          <a:ea typeface="Times New Roman"/>
+                        </a:rPr>
+                        <a:t> Estabelecer e manter registros das atividades de garantia de qualidade.</a:t>
+                      </a:r>
+                      <a:endParaRPr lang="pt-BR" sz="1800">
+                        <a:latin typeface="Times New Roman"/>
+                        <a:ea typeface="Times New Roman"/>
+                      </a:endParaRPr>
+                    </a:p>
+                  </a:txBody>
+                  <a:tcPr marL="44450" marR="44450" marT="0" marB="0" anchor="ctr">
+                    <a:lnL>
+                      <a:noFill/>
+                    </a:lnL>
+                    <a:lnR w="12700" cap="flat" cmpd="sng" algn="ctr">
+                      <a:solidFill>
+                        <a:srgbClr val="000000"/>
+                      </a:solidFill>
+                      <a:prstDash val="solid"/>
+                      <a:round/>
+                      <a:headEnd type="none" w="med" len="med"/>
+                      <a:tailEnd type="none" w="med" len="med"/>
+                    </a:lnR>
+                    <a:lnT w="12700" cap="flat" cmpd="sng" algn="ctr">
+                      <a:solidFill>
+                        <a:srgbClr val="000000"/>
+                      </a:solidFill>
+                      <a:prstDash val="solid"/>
+                      <a:round/>
+                      <a:headEnd type="none" w="med" len="med"/>
+                      <a:tailEnd type="none" w="med" len="med"/>
+                    </a:lnT>
+                    <a:lnB w="12700" cap="flat" cmpd="sng" algn="ctr">
+                      <a:solidFill>
+                        <a:srgbClr val="000000"/>
+                      </a:solidFill>
+                      <a:prstDash val="solid"/>
+                      <a:round/>
+                      <a:headEnd type="none" w="med" len="med"/>
+                      <a:tailEnd type="none" w="med" len="med"/>
+                    </a:lnB>
+                  </a:tcPr>
+                </a:tc>
+                <a:tc>
+                  <a:txBody>
+                    <a:bodyPr/>
+                    <a:lstStyle/>
+                    <a:p>
+                      <a:pPr algn="just">
+                        <a:spcAft>
+                          <a:spcPts val="0"/>
+                        </a:spcAft>
+                      </a:pPr>
+                      <a:r>
+                        <a:rPr lang="pt-BR" sz="1800" b="1">
+                          <a:solidFill>
+                            <a:srgbClr val="000000"/>
+                          </a:solidFill>
+                          <a:latin typeface="Arial"/>
+                          <a:ea typeface="Arial"/>
+                        </a:rPr>
+                        <a:t>1.    Elaborar plano de qualidade.</a:t>
+                      </a:r>
+                      <a:endParaRPr lang="pt-BR" sz="1800">
+                        <a:latin typeface="Times New Roman"/>
+                        <a:ea typeface="Times New Roman"/>
+                      </a:endParaRPr>
+                    </a:p>
+                  </a:txBody>
+                  <a:tcPr marL="44450" marR="44450" marT="0" marB="0" anchor="ctr">
+                    <a:lnL w="12700" cap="flat" cmpd="sng" algn="ctr">
+                      <a:solidFill>
+                        <a:srgbClr val="000000"/>
+                      </a:solidFill>
+                      <a:prstDash val="solid"/>
+                      <a:round/>
+                      <a:headEnd type="none" w="med" len="med"/>
+                      <a:tailEnd type="none" w="med" len="med"/>
+                    </a:lnL>
+                    <a:lnR>
+                      <a:noFill/>
+                    </a:lnR>
+                    <a:lnT w="12700" cap="flat" cmpd="sng" algn="ctr">
+                      <a:solidFill>
+                        <a:srgbClr val="000000"/>
+                      </a:solidFill>
+                      <a:prstDash val="solid"/>
+                      <a:round/>
+                      <a:headEnd type="none" w="med" len="med"/>
+                      <a:tailEnd type="none" w="med" len="med"/>
+                    </a:lnT>
+                    <a:lnB w="12700" cap="flat" cmpd="sng" algn="ctr">
+                      <a:solidFill>
+                        <a:srgbClr val="000000"/>
+                      </a:solidFill>
+                      <a:prstDash val="solid"/>
+                      <a:round/>
+                      <a:headEnd type="none" w="med" len="med"/>
+                      <a:tailEnd type="none" w="med" len="med"/>
+                    </a:lnB>
+                  </a:tcPr>
+                </a:tc>
+              </a:tr>
+              <a:tr h="577350">
+                <a:tc vMerge="1">
+                  <a:txBody>
+                    <a:bodyPr/>
+                    <a:lstStyle/>
+                    <a:p>
+                      <a:endParaRPr lang="pt-BR"/>
+                    </a:p>
+                  </a:txBody>
+                  <a:tcPr/>
+                </a:tc>
+                <a:tc>
+                  <a:txBody>
+                    <a:bodyPr/>
+                    <a:lstStyle/>
+                    <a:p>
+                      <a:pPr algn="just">
+                        <a:spcAft>
+                          <a:spcPts val="0"/>
+                        </a:spcAft>
+                      </a:pPr>
+                      <a:r>
+                        <a:rPr lang="pt-BR" sz="1800" b="1" dirty="0">
+                          <a:solidFill>
+                            <a:srgbClr val="000000"/>
+                          </a:solidFill>
+                          <a:latin typeface="Arial"/>
+                          <a:ea typeface="Arial"/>
+                        </a:rPr>
+                        <a:t>5.    Elaborar relatório periódico de garantia da qualidade.</a:t>
+                      </a:r>
+                      <a:endParaRPr lang="pt-BR" sz="1800" dirty="0">
+                        <a:latin typeface="Times New Roman"/>
+                        <a:ea typeface="Times New Roman"/>
+                      </a:endParaRPr>
+                    </a:p>
+                  </a:txBody>
+                  <a:tcPr marL="44450" marR="44450" marT="0" marB="0" anchor="ctr">
+                    <a:lnL w="12700" cap="flat" cmpd="sng" algn="ctr">
+                      <a:solidFill>
+                        <a:srgbClr val="000000"/>
+                      </a:solidFill>
+                      <a:prstDash val="solid"/>
+                      <a:round/>
+                      <a:headEnd type="none" w="med" len="med"/>
+                      <a:tailEnd type="none" w="med" len="med"/>
+                    </a:lnL>
+                    <a:lnR>
+                      <a:noFill/>
+                    </a:lnR>
+                    <a:lnT w="12700" cap="flat" cmpd="sng" algn="ctr">
+                      <a:solidFill>
+                        <a:srgbClr val="000000"/>
+                      </a:solidFill>
+                      <a:prstDash val="solid"/>
+                      <a:round/>
+                      <a:headEnd type="none" w="med" len="med"/>
+                      <a:tailEnd type="none" w="med" len="med"/>
+                    </a:lnT>
+                    <a:lnB w="12700" cap="flat" cmpd="sng" algn="ctr">
+                      <a:solidFill>
+                        <a:srgbClr val="000000"/>
+                      </a:solidFill>
+                      <a:prstDash val="solid"/>
+                      <a:round/>
+                      <a:headEnd type="none" w="med" len="med"/>
+                      <a:tailEnd type="none" w="med" len="med"/>
+                    </a:lnB>
+                  </a:tcPr>
+                </a:tc>
+              </a:tr>
+              <a:tr h="577350">
+                <a:tc vMerge="1">
+                  <a:txBody>
+                    <a:bodyPr/>
+                    <a:lstStyle/>
+                    <a:p>
+                      <a:endParaRPr lang="pt-BR"/>
+                    </a:p>
+                  </a:txBody>
+                  <a:tcPr/>
+                </a:tc>
+                <a:tc>
+                  <a:txBody>
+                    <a:bodyPr/>
+                    <a:lstStyle/>
+                    <a:p>
+                      <a:pPr algn="just">
+                        <a:spcAft>
+                          <a:spcPts val="0"/>
+                        </a:spcAft>
+                      </a:pPr>
+                      <a:r>
+                        <a:rPr lang="pt-BR" sz="1800" b="1" dirty="0">
+                          <a:solidFill>
+                            <a:srgbClr val="000000"/>
+                          </a:solidFill>
+                          <a:latin typeface="Arial"/>
+                          <a:ea typeface="Arial"/>
+                        </a:rPr>
+                        <a:t>7.    Elaborar relatório de lições aprendidas do projeto.</a:t>
+                      </a:r>
+                      <a:endParaRPr lang="pt-BR" sz="1800" dirty="0">
+                        <a:latin typeface="Times New Roman"/>
+                        <a:ea typeface="Times New Roman"/>
+                      </a:endParaRPr>
+                    </a:p>
+                  </a:txBody>
+                  <a:tcPr marL="44450" marR="44450" marT="0" marB="0" anchor="ctr">
+                    <a:lnL w="12700" cap="flat" cmpd="sng" algn="ctr">
+                      <a:solidFill>
+                        <a:srgbClr val="000000"/>
+                      </a:solidFill>
+                      <a:prstDash val="solid"/>
+                      <a:round/>
+                      <a:headEnd type="none" w="med" len="med"/>
+                      <a:tailEnd type="none" w="med" len="med"/>
+                    </a:lnL>
+                    <a:lnR>
+                      <a:noFill/>
+                    </a:lnR>
+                    <a:lnT w="12700" cap="flat" cmpd="sng" algn="ctr">
+                      <a:solidFill>
+                        <a:srgbClr val="000000"/>
+                      </a:solidFill>
+                      <a:prstDash val="solid"/>
+                      <a:round/>
+                      <a:headEnd type="none" w="med" len="med"/>
+                      <a:tailEnd type="none" w="med" len="med"/>
+                    </a:lnT>
+                    <a:lnB w="12700" cap="flat" cmpd="sng" algn="ctr">
+                      <a:solidFill>
+                        <a:srgbClr val="000000"/>
+                      </a:solidFill>
+                      <a:prstDash val="solid"/>
+                      <a:round/>
+                      <a:headEnd type="none" w="med" len="med"/>
+                      <a:tailEnd type="none" w="med" len="med"/>
+                    </a:lnB>
+                  </a:tcPr>
+                </a:tc>
+              </a:tr>
+              <a:tr h="497219">
+                <a:tc rowSpan="3">
+                  <a:txBody>
+                    <a:bodyPr/>
+                    <a:lstStyle/>
+                    <a:p>
+                      <a:pPr>
+                        <a:lnSpc>
+                          <a:spcPct val="115000"/>
+                        </a:lnSpc>
+                        <a:spcAft>
+                          <a:spcPts val="0"/>
+                        </a:spcAft>
+                      </a:pPr>
+                      <a:r>
+                        <a:rPr lang="pt-BR" sz="1800" i="1" dirty="0">
+                          <a:solidFill>
+                            <a:srgbClr val="000000"/>
+                          </a:solidFill>
+                          <a:latin typeface="Arial"/>
+                          <a:ea typeface="Times New Roman"/>
+                        </a:rPr>
+                        <a:t>Extra - Atividade de Suporte e Informativas</a:t>
+                      </a:r>
+                      <a:endParaRPr lang="pt-BR" sz="1800" dirty="0">
+                        <a:latin typeface="Times New Roman"/>
+                        <a:ea typeface="Times New Roman"/>
+                      </a:endParaRPr>
+                    </a:p>
+                  </a:txBody>
+                  <a:tcPr marL="44450" marR="44450" marT="0" marB="0" anchor="ctr">
+                    <a:lnL>
+                      <a:noFill/>
+                    </a:lnL>
+                    <a:lnR w="12700" cap="flat" cmpd="sng" algn="ctr">
+                      <a:solidFill>
+                        <a:srgbClr val="000000"/>
+                      </a:solidFill>
+                      <a:prstDash val="solid"/>
+                      <a:round/>
+                      <a:headEnd type="none" w="med" len="med"/>
+                      <a:tailEnd type="none" w="med" len="med"/>
+                    </a:lnR>
+                    <a:lnT w="12700" cap="flat" cmpd="sng" algn="ctr">
+                      <a:solidFill>
+                        <a:srgbClr val="000000"/>
+                      </a:solidFill>
+                      <a:prstDash val="solid"/>
+                      <a:round/>
+                      <a:headEnd type="none" w="med" len="med"/>
+                      <a:tailEnd type="none" w="med" len="med"/>
+                    </a:lnT>
+                    <a:lnB w="19050" cap="flat" cmpd="sng" algn="ctr">
+                      <a:solidFill>
+                        <a:srgbClr val="000000"/>
+                      </a:solidFill>
+                      <a:prstDash val="solid"/>
+                      <a:round/>
+                      <a:headEnd type="none" w="med" len="med"/>
+                      <a:tailEnd type="none" w="med" len="med"/>
+                    </a:lnB>
+                  </a:tcPr>
+                </a:tc>
+                <a:tc>
+                  <a:txBody>
+                    <a:bodyPr/>
+                    <a:lstStyle/>
+                    <a:p>
+                      <a:pPr algn="just">
+                        <a:spcAft>
+                          <a:spcPts val="0"/>
+                        </a:spcAft>
+                      </a:pPr>
+                      <a:r>
+                        <a:rPr lang="pt-BR" sz="1800" b="1" dirty="0">
+                          <a:solidFill>
+                            <a:srgbClr val="000000"/>
+                          </a:solidFill>
+                          <a:latin typeface="Arial"/>
+                          <a:ea typeface="Arial"/>
+                        </a:rPr>
+                        <a:t>4.    Aprovar produto final para entrega.</a:t>
+                      </a:r>
+                      <a:endParaRPr lang="pt-BR" sz="1800" dirty="0">
+                        <a:latin typeface="Times New Roman"/>
+                        <a:ea typeface="Times New Roman"/>
+                      </a:endParaRPr>
+                    </a:p>
+                  </a:txBody>
+                  <a:tcPr marL="44450" marR="44450" marT="0" marB="0" anchor="ctr">
+                    <a:lnL w="12700" cap="flat" cmpd="sng" algn="ctr">
+                      <a:solidFill>
+                        <a:srgbClr val="000000"/>
+                      </a:solidFill>
+                      <a:prstDash val="solid"/>
+                      <a:round/>
+                      <a:headEnd type="none" w="med" len="med"/>
+                      <a:tailEnd type="none" w="med" len="med"/>
+                    </a:lnL>
+                    <a:lnR>
+                      <a:noFill/>
+                    </a:lnR>
+                    <a:lnT w="12700" cap="flat" cmpd="sng" algn="ctr">
+                      <a:solidFill>
+                        <a:srgbClr val="000000"/>
+                      </a:solidFill>
+                      <a:prstDash val="solid"/>
+                      <a:round/>
+                      <a:headEnd type="none" w="med" len="med"/>
+                      <a:tailEnd type="none" w="med" len="med"/>
+                    </a:lnT>
+                    <a:lnB w="12700" cap="flat" cmpd="sng" algn="ctr">
+                      <a:solidFill>
+                        <a:srgbClr val="000000"/>
+                      </a:solidFill>
+                      <a:prstDash val="solid"/>
+                      <a:round/>
+                      <a:headEnd type="none" w="med" len="med"/>
+                      <a:tailEnd type="none" w="med" len="med"/>
+                    </a:lnB>
+                  </a:tcPr>
+                </a:tc>
+              </a:tr>
+              <a:tr h="866025">
+                <a:tc vMerge="1">
+                  <a:txBody>
+                    <a:bodyPr/>
+                    <a:lstStyle/>
+                    <a:p>
+                      <a:endParaRPr lang="pt-BR"/>
+                    </a:p>
+                  </a:txBody>
+                  <a:tcPr/>
+                </a:tc>
+                <a:tc>
+                  <a:txBody>
+                    <a:bodyPr/>
+                    <a:lstStyle/>
+                    <a:p>
+                      <a:pPr algn="just">
+                        <a:spcAft>
+                          <a:spcPts val="0"/>
+                        </a:spcAft>
+                      </a:pPr>
+                      <a:r>
+                        <a:rPr lang="pt-BR" sz="1800" b="1">
+                          <a:solidFill>
+                            <a:srgbClr val="000000"/>
+                          </a:solidFill>
+                          <a:latin typeface="Arial"/>
+                          <a:ea typeface="Arial"/>
+                        </a:rPr>
+                        <a:t>8.    Disponibilizar materiais de treinamento para os integrantes do projeto.</a:t>
+                      </a:r>
+                      <a:endParaRPr lang="pt-BR" sz="1800">
+                        <a:latin typeface="Times New Roman"/>
+                        <a:ea typeface="Times New Roman"/>
+                      </a:endParaRPr>
+                    </a:p>
+                  </a:txBody>
+                  <a:tcPr marL="44450" marR="44450" marT="0" marB="0" anchor="ctr">
+                    <a:lnL w="12700" cap="flat" cmpd="sng" algn="ctr">
+                      <a:solidFill>
+                        <a:srgbClr val="000000"/>
+                      </a:solidFill>
+                      <a:prstDash val="solid"/>
+                      <a:round/>
+                      <a:headEnd type="none" w="med" len="med"/>
+                      <a:tailEnd type="none" w="med" len="med"/>
+                    </a:lnL>
+                    <a:lnR>
+                      <a:noFill/>
+                    </a:lnR>
+                    <a:lnT w="12700" cap="flat" cmpd="sng" algn="ctr">
+                      <a:solidFill>
+                        <a:srgbClr val="000000"/>
+                      </a:solidFill>
+                      <a:prstDash val="solid"/>
+                      <a:round/>
+                      <a:headEnd type="none" w="med" len="med"/>
+                      <a:tailEnd type="none" w="med" len="med"/>
+                    </a:lnT>
+                    <a:lnB w="12700" cap="flat" cmpd="sng" algn="ctr">
+                      <a:solidFill>
+                        <a:srgbClr val="000000"/>
+                      </a:solidFill>
+                      <a:prstDash val="solid"/>
+                      <a:round/>
+                      <a:headEnd type="none" w="med" len="med"/>
+                      <a:tailEnd type="none" w="med" len="med"/>
+                    </a:lnB>
+                  </a:tcPr>
+                </a:tc>
+              </a:tr>
+              <a:tr h="870543">
+                <a:tc vMerge="1">
+                  <a:txBody>
+                    <a:bodyPr/>
+                    <a:lstStyle/>
+                    <a:p>
+                      <a:endParaRPr lang="pt-BR"/>
+                    </a:p>
+                  </a:txBody>
+                  <a:tcPr/>
+                </a:tc>
+                <a:tc>
+                  <a:txBody>
+                    <a:bodyPr/>
+                    <a:lstStyle/>
+                    <a:p>
+                      <a:pPr algn="just">
+                        <a:spcAft>
+                          <a:spcPts val="0"/>
+                        </a:spcAft>
+                      </a:pPr>
+                      <a:r>
+                        <a:rPr lang="pt-BR" sz="1800" b="1" dirty="0">
+                          <a:solidFill>
+                            <a:srgbClr val="000000"/>
+                          </a:solidFill>
+                          <a:latin typeface="Arial"/>
+                          <a:ea typeface="Arial"/>
+                        </a:rPr>
+                        <a:t>9.    Prestar suporte a todos os envolvidos no projeto.</a:t>
+                      </a:r>
+                      <a:endParaRPr lang="pt-BR" sz="1800" dirty="0">
+                        <a:latin typeface="Times New Roman"/>
+                        <a:ea typeface="Times New Roman"/>
+                      </a:endParaRPr>
+                    </a:p>
+                  </a:txBody>
+                  <a:tcPr marL="44450" marR="44450" marT="0" marB="0" anchor="ctr">
+                    <a:lnL w="12700" cap="flat" cmpd="sng" algn="ctr">
+                      <a:solidFill>
+                        <a:srgbClr val="000000"/>
+                      </a:solidFill>
+                      <a:prstDash val="solid"/>
+                      <a:round/>
+                      <a:headEnd type="none" w="med" len="med"/>
+                      <a:tailEnd type="none" w="med" len="med"/>
+                    </a:lnL>
+                    <a:lnR>
+                      <a:noFill/>
+                    </a:lnR>
+                    <a:lnT w="12700" cap="flat" cmpd="sng" algn="ctr">
+                      <a:solidFill>
+                        <a:srgbClr val="000000"/>
+                      </a:solidFill>
+                      <a:prstDash val="solid"/>
+                      <a:round/>
+                      <a:headEnd type="none" w="med" len="med"/>
+                      <a:tailEnd type="none" w="med" len="med"/>
+                    </a:lnT>
+                    <a:lnB w="19050" cap="flat" cmpd="sng" algn="ctr">
+                      <a:solidFill>
+                        <a:srgbClr val="000000"/>
+                      </a:solidFill>
+                      <a:prstDash val="solid"/>
+                      <a:round/>
+                      <a:headEnd type="none" w="med" len="med"/>
+                      <a:tailEnd type="none" w="med" len="med"/>
+                    </a:lnB>
+                  </a:tcPr>
+                </a:tc>
+              </a:tr>
+            </a:tbl>
+          </a:graphicData>
+        </a:graphic>
+      </p:graphicFrame>
     </p:spTree>
   </p:cSld>
   <p:clrMapOvr>

</xml_diff>